<commit_message>
Updated Visualization of elbow calculation in PPTX
</commit_message>
<xml_diff>
--- a/PepperRightArmInverseKinematicsCalculation.pptx
+++ b/PepperRightArmInverseKinematicsCalculation.pptx
@@ -5,14 +5,16 @@
     <p:sldMasterId id="2147483648" r:id="rId1"/>
   </p:sldMasterIdLst>
   <p:sldIdLst>
-    <p:sldId id="256" r:id="rId2"/>
-    <p:sldId id="257" r:id="rId3"/>
-    <p:sldId id="258" r:id="rId4"/>
-    <p:sldId id="260" r:id="rId5"/>
-    <p:sldId id="261" r:id="rId6"/>
-    <p:sldId id="262" r:id="rId7"/>
-    <p:sldId id="263" r:id="rId8"/>
-    <p:sldId id="264" r:id="rId9"/>
+    <p:sldId id="265" r:id="rId2"/>
+    <p:sldId id="256" r:id="rId3"/>
+    <p:sldId id="266" r:id="rId4"/>
+    <p:sldId id="257" r:id="rId5"/>
+    <p:sldId id="258" r:id="rId6"/>
+    <p:sldId id="260" r:id="rId7"/>
+    <p:sldId id="261" r:id="rId8"/>
+    <p:sldId id="262" r:id="rId9"/>
+    <p:sldId id="263" r:id="rId10"/>
+    <p:sldId id="264" r:id="rId11"/>
   </p:sldIdLst>
   <p:sldSz cx="12192000" cy="6858000"/>
   <p:notesSz cx="6858000" cy="9144000"/>
@@ -250,7 +252,7 @@
           <a:p>
             <a:fld id="{EAB8C8D1-352E-48E5-BFF0-CE55578B5725}" type="datetimeFigureOut">
               <a:rPr lang="en-US" smtClean="0"/>
-              <a:t>1/3/2021</a:t>
+              <a:t>1/8/2021</a:t>
             </a:fld>
             <a:endParaRPr lang="en-US"/>
           </a:p>
@@ -420,7 +422,7 @@
           <a:p>
             <a:fld id="{EAB8C8D1-352E-48E5-BFF0-CE55578B5725}" type="datetimeFigureOut">
               <a:rPr lang="en-US" smtClean="0"/>
-              <a:t>1/3/2021</a:t>
+              <a:t>1/8/2021</a:t>
             </a:fld>
             <a:endParaRPr lang="en-US"/>
           </a:p>
@@ -600,7 +602,7 @@
           <a:p>
             <a:fld id="{EAB8C8D1-352E-48E5-BFF0-CE55578B5725}" type="datetimeFigureOut">
               <a:rPr lang="en-US" smtClean="0"/>
-              <a:t>1/3/2021</a:t>
+              <a:t>1/8/2021</a:t>
             </a:fld>
             <a:endParaRPr lang="en-US"/>
           </a:p>
@@ -770,7 +772,7 @@
           <a:p>
             <a:fld id="{EAB8C8D1-352E-48E5-BFF0-CE55578B5725}" type="datetimeFigureOut">
               <a:rPr lang="en-US" smtClean="0"/>
-              <a:t>1/3/2021</a:t>
+              <a:t>1/8/2021</a:t>
             </a:fld>
             <a:endParaRPr lang="en-US"/>
           </a:p>
@@ -1016,7 +1018,7 @@
           <a:p>
             <a:fld id="{EAB8C8D1-352E-48E5-BFF0-CE55578B5725}" type="datetimeFigureOut">
               <a:rPr lang="en-US" smtClean="0"/>
-              <a:t>1/3/2021</a:t>
+              <a:t>1/8/2021</a:t>
             </a:fld>
             <a:endParaRPr lang="en-US"/>
           </a:p>
@@ -1248,7 +1250,7 @@
           <a:p>
             <a:fld id="{EAB8C8D1-352E-48E5-BFF0-CE55578B5725}" type="datetimeFigureOut">
               <a:rPr lang="en-US" smtClean="0"/>
-              <a:t>1/3/2021</a:t>
+              <a:t>1/8/2021</a:t>
             </a:fld>
             <a:endParaRPr lang="en-US"/>
           </a:p>
@@ -1615,7 +1617,7 @@
           <a:p>
             <a:fld id="{EAB8C8D1-352E-48E5-BFF0-CE55578B5725}" type="datetimeFigureOut">
               <a:rPr lang="en-US" smtClean="0"/>
-              <a:t>1/3/2021</a:t>
+              <a:t>1/8/2021</a:t>
             </a:fld>
             <a:endParaRPr lang="en-US"/>
           </a:p>
@@ -1733,7 +1735,7 @@
           <a:p>
             <a:fld id="{EAB8C8D1-352E-48E5-BFF0-CE55578B5725}" type="datetimeFigureOut">
               <a:rPr lang="en-US" smtClean="0"/>
-              <a:t>1/3/2021</a:t>
+              <a:t>1/8/2021</a:t>
             </a:fld>
             <a:endParaRPr lang="en-US"/>
           </a:p>
@@ -1828,7 +1830,7 @@
           <a:p>
             <a:fld id="{EAB8C8D1-352E-48E5-BFF0-CE55578B5725}" type="datetimeFigureOut">
               <a:rPr lang="en-US" smtClean="0"/>
-              <a:t>1/3/2021</a:t>
+              <a:t>1/8/2021</a:t>
             </a:fld>
             <a:endParaRPr lang="en-US"/>
           </a:p>
@@ -2105,7 +2107,7 @@
           <a:p>
             <a:fld id="{EAB8C8D1-352E-48E5-BFF0-CE55578B5725}" type="datetimeFigureOut">
               <a:rPr lang="en-US" smtClean="0"/>
-              <a:t>1/3/2021</a:t>
+              <a:t>1/8/2021</a:t>
             </a:fld>
             <a:endParaRPr lang="en-US"/>
           </a:p>
@@ -2358,7 +2360,7 @@
           <a:p>
             <a:fld id="{EAB8C8D1-352E-48E5-BFF0-CE55578B5725}" type="datetimeFigureOut">
               <a:rPr lang="en-US" smtClean="0"/>
-              <a:t>1/3/2021</a:t>
+              <a:t>1/8/2021</a:t>
             </a:fld>
             <a:endParaRPr lang="en-US"/>
           </a:p>
@@ -2571,7 +2573,7 @@
           <a:p>
             <a:fld id="{EAB8C8D1-352E-48E5-BFF0-CE55578B5725}" type="datetimeFigureOut">
               <a:rPr lang="en-US" smtClean="0"/>
-              <a:t>1/3/2021</a:t>
+              <a:t>1/8/2021</a:t>
             </a:fld>
             <a:endParaRPr lang="en-US"/>
           </a:p>
@@ -2978,6 +2980,690 @@
       </p:grpSpPr>
       <p:sp>
         <p:nvSpPr>
+          <p:cNvPr id="2" name="Title 1"/>
+          <p:cNvSpPr>
+            <a:spLocks noGrp="1"/>
+          </p:cNvSpPr>
+          <p:nvPr>
+            <p:ph type="ctrTitle"/>
+          </p:nvPr>
+        </p:nvSpPr>
+        <p:spPr>
+          <a:xfrm>
+            <a:off x="1524000" y="1122363"/>
+            <a:ext cx="10519954" cy="2387600"/>
+          </a:xfrm>
+        </p:spPr>
+        <p:txBody>
+          <a:bodyPr>
+            <a:normAutofit/>
+          </a:bodyPr>
+          <a:lstStyle/>
+          <a:p>
+            <a:r>
+              <a:rPr lang="de-DE" sz="4400" dirty="0" err="1" smtClean="0"/>
+              <a:t>inverseKinematik</a:t>
+            </a:r>
+            <a:r>
+              <a:rPr lang="de-DE" sz="4400" dirty="0" smtClean="0"/>
+              <a:t>(x, y, z, </a:t>
+            </a:r>
+            <a:r>
+              <a:rPr lang="de-DE" sz="4400" dirty="0" err="1" smtClean="0"/>
+              <a:t>rx</a:t>
+            </a:r>
+            <a:r>
+              <a:rPr lang="de-DE" sz="4400" dirty="0" smtClean="0"/>
+              <a:t>, </a:t>
+            </a:r>
+            <a:r>
+              <a:rPr lang="de-DE" sz="4400" dirty="0" err="1" smtClean="0"/>
+              <a:t>ry</a:t>
+            </a:r>
+            <a:r>
+              <a:rPr lang="de-DE" sz="4400" dirty="0" smtClean="0"/>
+              <a:t>, </a:t>
+            </a:r>
+            <a:r>
+              <a:rPr lang="de-DE" sz="4400" dirty="0" err="1" smtClean="0"/>
+              <a:t>rz</a:t>
+            </a:r>
+            <a:r>
+              <a:rPr lang="de-DE" sz="4400" dirty="0" smtClean="0"/>
+              <a:t>) -&gt; a0, …, a4</a:t>
+            </a:r>
+            <a:br>
+              <a:rPr lang="de-DE" sz="4400" dirty="0" smtClean="0"/>
+            </a:br>
+            <a:r>
+              <a:rPr lang="de-DE" sz="4400" dirty="0" err="1" smtClean="0"/>
+              <a:t>inverseKinematik</a:t>
+            </a:r>
+            <a:r>
+              <a:rPr lang="de-DE" sz="4400" dirty="0" smtClean="0"/>
+              <a:t>(x, y, z, </a:t>
+            </a:r>
+            <a:r>
+              <a:rPr lang="de-DE" sz="4400" dirty="0" err="1" smtClean="0"/>
+              <a:t>rx</a:t>
+            </a:r>
+            <a:r>
+              <a:rPr lang="de-DE" sz="4400" dirty="0" smtClean="0"/>
+              <a:t>, </a:t>
+            </a:r>
+            <a:r>
+              <a:rPr lang="de-DE" sz="4400" dirty="0" err="1" smtClean="0"/>
+              <a:t>ry</a:t>
+            </a:r>
+            <a:r>
+              <a:rPr lang="de-DE" sz="4400" dirty="0" smtClean="0"/>
+              <a:t>, </a:t>
+            </a:r>
+            <a:r>
+              <a:rPr lang="de-DE" sz="4400" dirty="0" err="1" smtClean="0"/>
+              <a:t>rz</a:t>
+            </a:r>
+            <a:r>
+              <a:rPr lang="de-DE" sz="4400" dirty="0" smtClean="0"/>
+              <a:t>) -&gt; a0, …, a5</a:t>
+            </a:r>
+            <a:endParaRPr lang="en-US" sz="4400" dirty="0"/>
+          </a:p>
+        </p:txBody>
+      </p:sp>
+      <p:sp>
+        <p:nvSpPr>
+          <p:cNvPr id="3" name="Subtitle 2"/>
+          <p:cNvSpPr>
+            <a:spLocks noGrp="1"/>
+          </p:cNvSpPr>
+          <p:nvPr>
+            <p:ph type="subTitle" idx="1"/>
+          </p:nvPr>
+        </p:nvSpPr>
+        <p:spPr/>
+        <p:txBody>
+          <a:bodyPr/>
+          <a:lstStyle/>
+          <a:p>
+            <a:endParaRPr lang="en-US"/>
+          </a:p>
+        </p:txBody>
+      </p:sp>
+    </p:spTree>
+    <p:extLst>
+      <p:ext uri="{BB962C8B-B14F-4D97-AF65-F5344CB8AC3E}">
+        <p14:creationId xmlns:p14="http://schemas.microsoft.com/office/powerpoint/2010/main" val="1826890358"/>
+      </p:ext>
+    </p:extLst>
+  </p:cSld>
+  <p:clrMapOvr>
+    <a:masterClrMapping/>
+  </p:clrMapOvr>
+</p:sld>
+</file>
+
+<file path=ppt/slides/slide10.xml><?xml version="1.0" encoding="utf-8"?>
+<p:sld xmlns:a="http://schemas.openxmlformats.org/drawingml/2006/main" xmlns:r="http://schemas.openxmlformats.org/officeDocument/2006/relationships" xmlns:p="http://schemas.openxmlformats.org/presentationml/2006/main">
+  <p:cSld>
+    <p:spTree>
+      <p:nvGrpSpPr>
+        <p:cNvPr id="1" name=""/>
+        <p:cNvGrpSpPr/>
+        <p:nvPr/>
+      </p:nvGrpSpPr>
+      <p:grpSpPr>
+        <a:xfrm>
+          <a:off x="0" y="0"/>
+          <a:ext cx="0" cy="0"/>
+          <a:chOff x="0" y="0"/>
+          <a:chExt cx="0" cy="0"/>
+        </a:xfrm>
+      </p:grpSpPr>
+      <p:pic>
+        <p:nvPicPr>
+          <p:cNvPr id="4" name="Picture 3"/>
+          <p:cNvPicPr>
+            <a:picLocks noChangeAspect="1"/>
+          </p:cNvPicPr>
+          <p:nvPr/>
+        </p:nvPicPr>
+        <p:blipFill>
+          <a:blip r:embed="rId2"/>
+          <a:stretch>
+            <a:fillRect/>
+          </a:stretch>
+        </p:blipFill>
+        <p:spPr>
+          <a:xfrm>
+            <a:off x="5775447" y="123044"/>
+            <a:ext cx="7105650" cy="6143625"/>
+          </a:xfrm>
+          <a:prstGeom prst="rect">
+            <a:avLst/>
+          </a:prstGeom>
+        </p:spPr>
+      </p:pic>
+      <p:sp>
+        <p:nvSpPr>
+          <p:cNvPr id="2" name="Title 1"/>
+          <p:cNvSpPr>
+            <a:spLocks noGrp="1"/>
+          </p:cNvSpPr>
+          <p:nvPr>
+            <p:ph type="title"/>
+          </p:nvPr>
+        </p:nvSpPr>
+        <p:spPr/>
+        <p:txBody>
+          <a:bodyPr/>
+          <a:lstStyle/>
+          <a:p>
+            <a:r>
+              <a:rPr lang="de-DE" sz="4000" dirty="0" err="1" smtClean="0"/>
+              <a:t>angles</a:t>
+            </a:r>
+            <a:r>
+              <a:rPr lang="de-DE" sz="4000" dirty="0" smtClean="0"/>
+              <a:t>[4]</a:t>
+            </a:r>
+            <a:br>
+              <a:rPr lang="de-DE" sz="4000" dirty="0" smtClean="0"/>
+            </a:br>
+            <a:r>
+              <a:rPr lang="de-DE" sz="4000" dirty="0" err="1" smtClean="0"/>
+              <a:t>RWristYaw</a:t>
+            </a:r>
+            <a:endParaRPr lang="en-US" dirty="0"/>
+          </a:p>
+        </p:txBody>
+      </p:sp>
+      <p:sp>
+        <p:nvSpPr>
+          <p:cNvPr id="9" name="Freeform 8"/>
+          <p:cNvSpPr/>
+          <p:nvPr/>
+        </p:nvSpPr>
+        <p:spPr>
+          <a:xfrm>
+            <a:off x="9039074" y="4466883"/>
+            <a:ext cx="471902" cy="829310"/>
+          </a:xfrm>
+          <a:custGeom>
+            <a:avLst/>
+            <a:gdLst>
+              <a:gd name="connsiteX0" fmla="*/ 0 w 177800"/>
+              <a:gd name="connsiteY0" fmla="*/ 7088 h 80748"/>
+              <a:gd name="connsiteX1" fmla="*/ 76200 w 177800"/>
+              <a:gd name="connsiteY1" fmla="*/ 7088 h 80748"/>
+              <a:gd name="connsiteX2" fmla="*/ 177800 w 177800"/>
+              <a:gd name="connsiteY2" fmla="*/ 80748 h 80748"/>
+              <a:gd name="connsiteX0" fmla="*/ 0 w 177800"/>
+              <a:gd name="connsiteY0" fmla="*/ 0 h 73660"/>
+              <a:gd name="connsiteX1" fmla="*/ 177800 w 177800"/>
+              <a:gd name="connsiteY1" fmla="*/ 73660 h 73660"/>
+              <a:gd name="connsiteX0" fmla="*/ 0 w 177800"/>
+              <a:gd name="connsiteY0" fmla="*/ 1331 h 74991"/>
+              <a:gd name="connsiteX1" fmla="*/ 177800 w 177800"/>
+              <a:gd name="connsiteY1" fmla="*/ 74991 h 74991"/>
+              <a:gd name="connsiteX0" fmla="*/ 0 w 177800"/>
+              <a:gd name="connsiteY0" fmla="*/ 1851 h 75511"/>
+              <a:gd name="connsiteX1" fmla="*/ 177800 w 177800"/>
+              <a:gd name="connsiteY1" fmla="*/ 75511 h 75511"/>
+              <a:gd name="connsiteX0" fmla="*/ 31384 w 68335"/>
+              <a:gd name="connsiteY0" fmla="*/ 455 h 226515"/>
+              <a:gd name="connsiteX1" fmla="*/ 3444 w 68335"/>
+              <a:gd name="connsiteY1" fmla="*/ 226515 h 226515"/>
+              <a:gd name="connsiteX0" fmla="*/ 270708 w 288897"/>
+              <a:gd name="connsiteY0" fmla="*/ 570 h 185990"/>
+              <a:gd name="connsiteX1" fmla="*/ 1468 w 288897"/>
+              <a:gd name="connsiteY1" fmla="*/ 185990 h 185990"/>
+              <a:gd name="connsiteX0" fmla="*/ 270800 w 282446"/>
+              <a:gd name="connsiteY0" fmla="*/ 0 h 185420"/>
+              <a:gd name="connsiteX1" fmla="*/ 1560 w 282446"/>
+              <a:gd name="connsiteY1" fmla="*/ 185420 h 185420"/>
+              <a:gd name="connsiteX0" fmla="*/ 269240 w 285877"/>
+              <a:gd name="connsiteY0" fmla="*/ 0 h 209999"/>
+              <a:gd name="connsiteX1" fmla="*/ 0 w 285877"/>
+              <a:gd name="connsiteY1" fmla="*/ 185420 h 209999"/>
+              <a:gd name="connsiteX0" fmla="*/ 299720 w 314870"/>
+              <a:gd name="connsiteY0" fmla="*/ 0 h 196161"/>
+              <a:gd name="connsiteX1" fmla="*/ 0 w 314870"/>
+              <a:gd name="connsiteY1" fmla="*/ 170180 h 196161"/>
+              <a:gd name="connsiteX0" fmla="*/ 299720 w 318396"/>
+              <a:gd name="connsiteY0" fmla="*/ 0 h 170668"/>
+              <a:gd name="connsiteX1" fmla="*/ 0 w 318396"/>
+              <a:gd name="connsiteY1" fmla="*/ 170180 h 170668"/>
+              <a:gd name="connsiteX0" fmla="*/ 299720 w 299720"/>
+              <a:gd name="connsiteY0" fmla="*/ 0 h 170869"/>
+              <a:gd name="connsiteX1" fmla="*/ 0 w 299720"/>
+              <a:gd name="connsiteY1" fmla="*/ 170180 h 170869"/>
+              <a:gd name="connsiteX0" fmla="*/ 427736 w 427736"/>
+              <a:gd name="connsiteY0" fmla="*/ 122428 h 152138"/>
+              <a:gd name="connsiteX1" fmla="*/ 0 w 427736"/>
+              <a:gd name="connsiteY1" fmla="*/ 0 h 152138"/>
+              <a:gd name="connsiteX0" fmla="*/ 220472 w 220472"/>
+              <a:gd name="connsiteY0" fmla="*/ 134620 h 163165"/>
+              <a:gd name="connsiteX1" fmla="*/ 0 w 220472"/>
+              <a:gd name="connsiteY1" fmla="*/ 0 h 163165"/>
+              <a:gd name="connsiteX0" fmla="*/ 220472 w 220472"/>
+              <a:gd name="connsiteY0" fmla="*/ 134620 h 134620"/>
+              <a:gd name="connsiteX1" fmla="*/ 0 w 220472"/>
+              <a:gd name="connsiteY1" fmla="*/ 0 h 134620"/>
+              <a:gd name="connsiteX0" fmla="*/ 247142 w 247142"/>
+              <a:gd name="connsiteY0" fmla="*/ 22318 h 22318"/>
+              <a:gd name="connsiteX1" fmla="*/ 0 w 247142"/>
+              <a:gd name="connsiteY1" fmla="*/ 21048 h 22318"/>
+              <a:gd name="connsiteX0" fmla="*/ 247142 w 247142"/>
+              <a:gd name="connsiteY0" fmla="*/ 38978 h 38978"/>
+              <a:gd name="connsiteX1" fmla="*/ 0 w 247142"/>
+              <a:gd name="connsiteY1" fmla="*/ 37708 h 38978"/>
+              <a:gd name="connsiteX0" fmla="*/ 273812 w 273812"/>
+              <a:gd name="connsiteY0" fmla="*/ 40903 h 40903"/>
+              <a:gd name="connsiteX1" fmla="*/ 0 w 273812"/>
+              <a:gd name="connsiteY1" fmla="*/ 35823 h 40903"/>
+              <a:gd name="connsiteX0" fmla="*/ 273812 w 273812"/>
+              <a:gd name="connsiteY0" fmla="*/ 40903 h 40903"/>
+              <a:gd name="connsiteX1" fmla="*/ 0 w 273812"/>
+              <a:gd name="connsiteY1" fmla="*/ 35823 h 40903"/>
+              <a:gd name="connsiteX0" fmla="*/ 261620 w 261620"/>
+              <a:gd name="connsiteY0" fmla="*/ 267229 h 267229"/>
+              <a:gd name="connsiteX1" fmla="*/ 0 w 261620"/>
+              <a:gd name="connsiteY1" fmla="*/ 6117 h 267229"/>
+              <a:gd name="connsiteX0" fmla="*/ 9669 w 373549"/>
+              <a:gd name="connsiteY0" fmla="*/ 526462 h 526462"/>
+              <a:gd name="connsiteX1" fmla="*/ 363745 w 373549"/>
+              <a:gd name="connsiteY1" fmla="*/ 3222 h 526462"/>
+              <a:gd name="connsiteX0" fmla="*/ 8650 w 440077"/>
+              <a:gd name="connsiteY0" fmla="*/ 484815 h 484815"/>
+              <a:gd name="connsiteX1" fmla="*/ 431306 w 440077"/>
+              <a:gd name="connsiteY1" fmla="*/ 3485 h 484815"/>
+              <a:gd name="connsiteX0" fmla="*/ 0 w 438613"/>
+              <a:gd name="connsiteY0" fmla="*/ 484293 h 486109"/>
+              <a:gd name="connsiteX1" fmla="*/ 422656 w 438613"/>
+              <a:gd name="connsiteY1" fmla="*/ 2963 h 486109"/>
+              <a:gd name="connsiteX0" fmla="*/ 0 w 422656"/>
+              <a:gd name="connsiteY0" fmla="*/ 481330 h 484115"/>
+              <a:gd name="connsiteX1" fmla="*/ 422656 w 422656"/>
+              <a:gd name="connsiteY1" fmla="*/ 0 h 484115"/>
+              <a:gd name="connsiteX0" fmla="*/ 0 w 422656"/>
+              <a:gd name="connsiteY0" fmla="*/ 481330 h 481330"/>
+              <a:gd name="connsiteX1" fmla="*/ 422656 w 422656"/>
+              <a:gd name="connsiteY1" fmla="*/ 0 h 481330"/>
+              <a:gd name="connsiteX0" fmla="*/ 0 w 5340096"/>
+              <a:gd name="connsiteY0" fmla="*/ 1357 h 1693764"/>
+              <a:gd name="connsiteX1" fmla="*/ 5340096 w 5340096"/>
+              <a:gd name="connsiteY1" fmla="*/ 1684107 h 1693764"/>
+              <a:gd name="connsiteX0" fmla="*/ 207291 w 282514"/>
+              <a:gd name="connsiteY0" fmla="*/ 2818 h 699072"/>
+              <a:gd name="connsiteX1" fmla="*/ 27 w 282514"/>
+              <a:gd name="connsiteY1" fmla="*/ 679728 h 699072"/>
+              <a:gd name="connsiteX0" fmla="*/ 425722 w 481739"/>
+              <a:gd name="connsiteY0" fmla="*/ 2757 h 718946"/>
+              <a:gd name="connsiteX1" fmla="*/ 18 w 481739"/>
+              <a:gd name="connsiteY1" fmla="*/ 699987 h 718946"/>
+              <a:gd name="connsiteX0" fmla="*/ 428146 w 428146"/>
+              <a:gd name="connsiteY0" fmla="*/ 0 h 717772"/>
+              <a:gd name="connsiteX1" fmla="*/ 2442 w 428146"/>
+              <a:gd name="connsiteY1" fmla="*/ 697230 h 717772"/>
+              <a:gd name="connsiteX0" fmla="*/ 489611 w 489611"/>
+              <a:gd name="connsiteY0" fmla="*/ 0 h 697230"/>
+              <a:gd name="connsiteX1" fmla="*/ 63907 w 489611"/>
+              <a:gd name="connsiteY1" fmla="*/ 697230 h 697230"/>
+              <a:gd name="connsiteX0" fmla="*/ 536220 w 536220"/>
+              <a:gd name="connsiteY0" fmla="*/ 0 h 808990"/>
+              <a:gd name="connsiteX1" fmla="*/ 54636 w 536220"/>
+              <a:gd name="connsiteY1" fmla="*/ 808990 h 808990"/>
+              <a:gd name="connsiteX0" fmla="*/ 507364 w 507364"/>
+              <a:gd name="connsiteY0" fmla="*/ 0 h 808990"/>
+              <a:gd name="connsiteX1" fmla="*/ 25780 w 507364"/>
+              <a:gd name="connsiteY1" fmla="*/ 808990 h 808990"/>
+              <a:gd name="connsiteX0" fmla="*/ 485030 w 485030"/>
+              <a:gd name="connsiteY0" fmla="*/ 0 h 819150"/>
+              <a:gd name="connsiteX1" fmla="*/ 28846 w 485030"/>
+              <a:gd name="connsiteY1" fmla="*/ 819150 h 819150"/>
+              <a:gd name="connsiteX0" fmla="*/ 471902 w 471902"/>
+              <a:gd name="connsiteY0" fmla="*/ 0 h 829310"/>
+              <a:gd name="connsiteX1" fmla="*/ 30958 w 471902"/>
+              <a:gd name="connsiteY1" fmla="*/ 829310 h 829310"/>
+            </a:gdLst>
+            <a:ahLst/>
+            <a:cxnLst>
+              <a:cxn ang="0">
+                <a:pos x="connsiteX0" y="connsiteY0"/>
+              </a:cxn>
+              <a:cxn ang="0">
+                <a:pos x="connsiteX1" y="connsiteY1"/>
+              </a:cxn>
+            </a:cxnLst>
+            <a:rect l="l" t="t" r="r" b="b"/>
+            <a:pathLst>
+              <a:path w="471902" h="829310">
+                <a:moveTo>
+                  <a:pt x="471902" y="0"/>
+                </a:moveTo>
+                <a:cubicBezTo>
+                  <a:pt x="2849" y="22013"/>
+                  <a:pt x="-49264" y="487257"/>
+                  <a:pt x="30958" y="829310"/>
+                </a:cubicBezTo>
+              </a:path>
+            </a:pathLst>
+          </a:custGeom>
+          <a:noFill/>
+          <a:ln>
+            <a:solidFill>
+              <a:schemeClr val="tx1"/>
+            </a:solidFill>
+          </a:ln>
+        </p:spPr>
+        <p:style>
+          <a:lnRef idx="2">
+            <a:schemeClr val="accent1">
+              <a:shade val="50000"/>
+            </a:schemeClr>
+          </a:lnRef>
+          <a:fillRef idx="1">
+            <a:schemeClr val="accent1"/>
+          </a:fillRef>
+          <a:effectRef idx="0">
+            <a:schemeClr val="accent1"/>
+          </a:effectRef>
+          <a:fontRef idx="minor">
+            <a:schemeClr val="lt1"/>
+          </a:fontRef>
+        </p:style>
+        <p:txBody>
+          <a:bodyPr rtlCol="0" anchor="ctr"/>
+          <a:lstStyle/>
+          <a:p>
+            <a:pPr algn="ctr"/>
+            <a:endParaRPr lang="en-US"/>
+          </a:p>
+        </p:txBody>
+      </p:sp>
+      <p:sp>
+        <p:nvSpPr>
+          <p:cNvPr id="11" name="TextBox 10"/>
+          <p:cNvSpPr txBox="1"/>
+          <p:nvPr/>
+        </p:nvSpPr>
+        <p:spPr>
+          <a:xfrm>
+            <a:off x="9369139" y="5150520"/>
+            <a:ext cx="534185" cy="369332"/>
+          </a:xfrm>
+          <a:prstGeom prst="rect">
+            <a:avLst/>
+          </a:prstGeom>
+          <a:noFill/>
+        </p:spPr>
+        <p:txBody>
+          <a:bodyPr wrap="none" rtlCol="0">
+            <a:spAutoFit/>
+          </a:bodyPr>
+          <a:lstStyle/>
+          <a:p>
+            <a:r>
+              <a:rPr lang="de-DE" dirty="0" smtClean="0"/>
+              <a:t>TCP</a:t>
+            </a:r>
+            <a:endParaRPr lang="en-US" dirty="0"/>
+          </a:p>
+        </p:txBody>
+      </p:sp>
+      <p:sp>
+        <p:nvSpPr>
+          <p:cNvPr id="12" name="TextBox 11"/>
+          <p:cNvSpPr txBox="1"/>
+          <p:nvPr/>
+        </p:nvSpPr>
+        <p:spPr>
+          <a:xfrm>
+            <a:off x="6621625" y="4134515"/>
+            <a:ext cx="760849" cy="369332"/>
+          </a:xfrm>
+          <a:prstGeom prst="rect">
+            <a:avLst/>
+          </a:prstGeom>
+          <a:noFill/>
+        </p:spPr>
+        <p:txBody>
+          <a:bodyPr wrap="none" rtlCol="0">
+            <a:spAutoFit/>
+          </a:bodyPr>
+          <a:lstStyle/>
+          <a:p>
+            <a:r>
+              <a:rPr lang="de-DE" dirty="0" err="1" smtClean="0"/>
+              <a:t>elbow</a:t>
+            </a:r>
+            <a:endParaRPr lang="en-US" dirty="0"/>
+          </a:p>
+        </p:txBody>
+      </p:sp>
+      <p:sp>
+        <p:nvSpPr>
+          <p:cNvPr id="13" name="TextBox 12"/>
+          <p:cNvSpPr txBox="1"/>
+          <p:nvPr/>
+        </p:nvSpPr>
+        <p:spPr>
+          <a:xfrm>
+            <a:off x="8148831" y="3164145"/>
+            <a:ext cx="1306768" cy="369332"/>
+          </a:xfrm>
+          <a:prstGeom prst="rect">
+            <a:avLst/>
+          </a:prstGeom>
+          <a:noFill/>
+        </p:spPr>
+        <p:txBody>
+          <a:bodyPr wrap="none" rtlCol="0">
+            <a:spAutoFit/>
+          </a:bodyPr>
+          <a:lstStyle/>
+          <a:p>
+            <a:r>
+              <a:rPr lang="de-DE" dirty="0" err="1" smtClean="0"/>
+              <a:t>circleCenter</a:t>
+            </a:r>
+            <a:endParaRPr lang="en-US" dirty="0"/>
+          </a:p>
+        </p:txBody>
+      </p:sp>
+      <p:cxnSp>
+        <p:nvCxnSpPr>
+          <p:cNvPr id="15" name="Straight Arrow Connector 14"/>
+          <p:cNvCxnSpPr/>
+          <p:nvPr/>
+        </p:nvCxnSpPr>
+        <p:spPr>
+          <a:xfrm flipH="1" flipV="1">
+            <a:off x="9509760" y="3785616"/>
+            <a:ext cx="12954" cy="1297002"/>
+          </a:xfrm>
+          <a:prstGeom prst="straightConnector1">
+            <a:avLst/>
+          </a:prstGeom>
+          <a:ln w="12700">
+            <a:solidFill>
+              <a:schemeClr val="tx1"/>
+            </a:solidFill>
+            <a:tailEnd type="triangle"/>
+          </a:ln>
+        </p:spPr>
+        <p:style>
+          <a:lnRef idx="1">
+            <a:schemeClr val="accent1"/>
+          </a:lnRef>
+          <a:fillRef idx="0">
+            <a:schemeClr val="accent1"/>
+          </a:fillRef>
+          <a:effectRef idx="0">
+            <a:schemeClr val="accent1"/>
+          </a:effectRef>
+          <a:fontRef idx="minor">
+            <a:schemeClr val="tx1"/>
+          </a:fontRef>
+        </p:style>
+      </p:cxnSp>
+      <p:sp>
+        <p:nvSpPr>
+          <p:cNvPr id="24" name="TextBox 23"/>
+          <p:cNvSpPr txBox="1"/>
+          <p:nvPr/>
+        </p:nvSpPr>
+        <p:spPr>
+          <a:xfrm>
+            <a:off x="6246964" y="1393343"/>
+            <a:ext cx="292068" cy="369332"/>
+          </a:xfrm>
+          <a:prstGeom prst="rect">
+            <a:avLst/>
+          </a:prstGeom>
+          <a:noFill/>
+        </p:spPr>
+        <p:txBody>
+          <a:bodyPr wrap="none" rtlCol="0">
+            <a:spAutoFit/>
+          </a:bodyPr>
+          <a:lstStyle/>
+          <a:p>
+            <a:r>
+              <a:rPr lang="de-DE" dirty="0" smtClean="0"/>
+              <a:t>Z</a:t>
+            </a:r>
+            <a:endParaRPr lang="en-US" dirty="0"/>
+          </a:p>
+        </p:txBody>
+      </p:sp>
+      <p:sp>
+        <p:nvSpPr>
+          <p:cNvPr id="25" name="TextBox 24"/>
+          <p:cNvSpPr txBox="1"/>
+          <p:nvPr/>
+        </p:nvSpPr>
+        <p:spPr>
+          <a:xfrm>
+            <a:off x="7277007" y="2576837"/>
+            <a:ext cx="304892" cy="369332"/>
+          </a:xfrm>
+          <a:prstGeom prst="rect">
+            <a:avLst/>
+          </a:prstGeom>
+          <a:noFill/>
+        </p:spPr>
+        <p:txBody>
+          <a:bodyPr wrap="none" rtlCol="0">
+            <a:spAutoFit/>
+          </a:bodyPr>
+          <a:lstStyle/>
+          <a:p>
+            <a:r>
+              <a:rPr lang="de-DE" dirty="0"/>
+              <a:t>X</a:t>
+            </a:r>
+            <a:endParaRPr lang="en-US" dirty="0"/>
+          </a:p>
+        </p:txBody>
+      </p:sp>
+      <p:sp>
+        <p:nvSpPr>
+          <p:cNvPr id="33" name="TextBox 32"/>
+          <p:cNvSpPr txBox="1"/>
+          <p:nvPr/>
+        </p:nvSpPr>
+        <p:spPr>
+          <a:xfrm>
+            <a:off x="9068181" y="4530741"/>
+            <a:ext cx="394660" cy="369332"/>
+          </a:xfrm>
+          <a:prstGeom prst="rect">
+            <a:avLst/>
+          </a:prstGeom>
+          <a:noFill/>
+        </p:spPr>
+        <p:txBody>
+          <a:bodyPr wrap="none" rtlCol="0">
+            <a:spAutoFit/>
+          </a:bodyPr>
+          <a:lstStyle/>
+          <a:p>
+            <a:r>
+              <a:rPr lang="el-GR" dirty="0" smtClean="0"/>
+              <a:t>α</a:t>
+            </a:r>
+            <a:r>
+              <a:rPr lang="de-DE" baseline="-25000" dirty="0" smtClean="0"/>
+              <a:t>4</a:t>
+            </a:r>
+            <a:endParaRPr lang="en-US" baseline="-25000" dirty="0"/>
+          </a:p>
+        </p:txBody>
+      </p:sp>
+      <p:sp>
+        <p:nvSpPr>
+          <p:cNvPr id="26" name="TextBox 25"/>
+          <p:cNvSpPr txBox="1"/>
+          <p:nvPr/>
+        </p:nvSpPr>
+        <p:spPr>
+          <a:xfrm>
+            <a:off x="8907376" y="4019082"/>
+            <a:ext cx="349776" cy="369332"/>
+          </a:xfrm>
+          <a:prstGeom prst="rect">
+            <a:avLst/>
+          </a:prstGeom>
+          <a:noFill/>
+        </p:spPr>
+        <p:txBody>
+          <a:bodyPr wrap="none" rtlCol="0">
+            <a:spAutoFit/>
+          </a:bodyPr>
+          <a:lstStyle/>
+          <a:p>
+            <a:r>
+              <a:rPr lang="de-DE" dirty="0" smtClean="0"/>
+              <a:t>w</a:t>
+            </a:r>
+            <a:endParaRPr lang="en-US" baseline="-25000" dirty="0"/>
+          </a:p>
+        </p:txBody>
+      </p:sp>
+    </p:spTree>
+    <p:extLst>
+      <p:ext uri="{BB962C8B-B14F-4D97-AF65-F5344CB8AC3E}">
+        <p14:creationId xmlns:p14="http://schemas.microsoft.com/office/powerpoint/2010/main" val="3702311234"/>
+      </p:ext>
+    </p:extLst>
+  </p:cSld>
+  <p:clrMapOvr>
+    <a:masterClrMapping/>
+  </p:clrMapOvr>
+</p:sld>
+</file>
+
+<file path=ppt/slides/slide2.xml><?xml version="1.0" encoding="utf-8"?>
+<p:sld xmlns:a="http://schemas.openxmlformats.org/drawingml/2006/main" xmlns:r="http://schemas.openxmlformats.org/officeDocument/2006/relationships" xmlns:p="http://schemas.openxmlformats.org/presentationml/2006/main">
+  <p:cSld>
+    <p:spTree>
+      <p:nvGrpSpPr>
+        <p:cNvPr id="1" name=""/>
+        <p:cNvGrpSpPr/>
+        <p:nvPr/>
+      </p:nvGrpSpPr>
+      <p:grpSpPr>
+        <a:xfrm>
+          <a:off x="0" y="0"/>
+          <a:ext cx="0" cy="0"/>
+          <a:chOff x="0" y="0"/>
+          <a:chExt cx="0" cy="0"/>
+        </a:xfrm>
+      </p:grpSpPr>
+      <p:sp>
+        <p:nvSpPr>
           <p:cNvPr id="4" name="TextBox 3"/>
           <p:cNvSpPr txBox="1"/>
           <p:nvPr/>
@@ -3210,570 +3896,555 @@
           </a:prstGeom>
         </p:spPr>
       </p:pic>
-      <p:grpSp>
-        <p:nvGrpSpPr>
-          <p:cNvPr id="20" name="Group 19"/>
-          <p:cNvGrpSpPr/>
-          <p:nvPr/>
-        </p:nvGrpSpPr>
-        <p:grpSpPr>
-          <a:xfrm>
-            <a:off x="1185396" y="3572191"/>
-            <a:ext cx="2201145" cy="1090616"/>
-            <a:chOff x="1185396" y="3572191"/>
-            <a:chExt cx="2201145" cy="1090616"/>
-          </a:xfrm>
-        </p:grpSpPr>
-        <p:sp>
-          <p:nvSpPr>
-            <p:cNvPr id="13" name="TextBox 12"/>
-            <p:cNvSpPr txBox="1"/>
-            <p:nvPr/>
-          </p:nvSpPr>
-          <p:spPr>
-            <a:xfrm rot="2700000">
-              <a:off x="1413201" y="3455973"/>
-              <a:ext cx="413896" cy="646331"/>
-            </a:xfrm>
-            <a:prstGeom prst="rect">
-              <a:avLst/>
-            </a:prstGeom>
-            <a:noFill/>
-          </p:spPr>
-          <p:txBody>
-            <a:bodyPr wrap="none" rtlCol="0">
-              <a:spAutoFit/>
-            </a:bodyPr>
-            <a:lstStyle/>
-            <a:p>
-              <a:r>
-                <a:rPr lang="de-DE" sz="3600" b="1" dirty="0" smtClean="0">
-                  <a:solidFill>
-                    <a:srgbClr val="0070C0"/>
-                  </a:solidFill>
-                </a:rPr>
-                <a:t>+</a:t>
-              </a:r>
-              <a:endParaRPr lang="en-US" b="1" dirty="0">
+      <p:sp>
+        <p:nvSpPr>
+          <p:cNvPr id="13" name="TextBox 12"/>
+          <p:cNvSpPr txBox="1"/>
+          <p:nvPr/>
+        </p:nvSpPr>
+        <p:spPr>
+          <a:xfrm rot="2700000">
+            <a:off x="1413201" y="3455973"/>
+            <a:ext cx="413896" cy="646331"/>
+          </a:xfrm>
+          <a:prstGeom prst="rect">
+            <a:avLst/>
+          </a:prstGeom>
+          <a:noFill/>
+        </p:spPr>
+        <p:txBody>
+          <a:bodyPr wrap="none" rtlCol="0">
+            <a:spAutoFit/>
+          </a:bodyPr>
+          <a:lstStyle/>
+          <a:p>
+            <a:r>
+              <a:rPr lang="de-DE" sz="3600" b="1" dirty="0" smtClean="0">
                 <a:solidFill>
                   <a:srgbClr val="0070C0"/>
                 </a:solidFill>
-              </a:endParaRPr>
-            </a:p>
-          </p:txBody>
-        </p:sp>
-        <p:sp>
-          <p:nvSpPr>
-            <p:cNvPr id="15" name="Freeform 14"/>
-            <p:cNvSpPr/>
-            <p:nvPr/>
-          </p:nvSpPr>
-          <p:spPr>
-            <a:xfrm rot="2007833">
-              <a:off x="1185396" y="3739592"/>
-              <a:ext cx="2201145" cy="923215"/>
-            </a:xfrm>
-            <a:custGeom>
-              <a:avLst/>
-              <a:gdLst>
-                <a:gd name="connsiteX0" fmla="*/ 38836 w 2192054"/>
-                <a:gd name="connsiteY0" fmla="*/ 401136 h 941723"/>
-                <a:gd name="connsiteX1" fmla="*/ 38836 w 2192054"/>
-                <a:gd name="connsiteY1" fmla="*/ 467176 h 941723"/>
-                <a:gd name="connsiteX2" fmla="*/ 429996 w 2192054"/>
-                <a:gd name="connsiteY2" fmla="*/ 863416 h 941723"/>
-                <a:gd name="connsiteX3" fmla="*/ 1049756 w 2192054"/>
-                <a:gd name="connsiteY3" fmla="*/ 858336 h 941723"/>
-                <a:gd name="connsiteX4" fmla="*/ 1989556 w 2192054"/>
-                <a:gd name="connsiteY4" fmla="*/ 914216 h 941723"/>
-                <a:gd name="connsiteX5" fmla="*/ 2187676 w 2192054"/>
-                <a:gd name="connsiteY5" fmla="*/ 360496 h 941723"/>
-                <a:gd name="connsiteX6" fmla="*/ 1887956 w 2192054"/>
-                <a:gd name="connsiteY6" fmla="*/ 25216 h 941723"/>
-                <a:gd name="connsiteX7" fmla="*/ 836396 w 2192054"/>
-                <a:gd name="connsiteY7" fmla="*/ 25216 h 941723"/>
-                <a:gd name="connsiteX8" fmla="*/ 257276 w 2192054"/>
-                <a:gd name="connsiteY8" fmla="*/ 35376 h 941723"/>
-                <a:gd name="connsiteX9" fmla="*/ 38836 w 2192054"/>
-                <a:gd name="connsiteY9" fmla="*/ 401136 h 941723"/>
-                <a:gd name="connsiteX0" fmla="*/ 21253 w 2218286"/>
-                <a:gd name="connsiteY0" fmla="*/ 359226 h 941723"/>
-                <a:gd name="connsiteX1" fmla="*/ 65068 w 2218286"/>
-                <a:gd name="connsiteY1" fmla="*/ 467176 h 941723"/>
-                <a:gd name="connsiteX2" fmla="*/ 456228 w 2218286"/>
-                <a:gd name="connsiteY2" fmla="*/ 863416 h 941723"/>
-                <a:gd name="connsiteX3" fmla="*/ 1075988 w 2218286"/>
-                <a:gd name="connsiteY3" fmla="*/ 858336 h 941723"/>
-                <a:gd name="connsiteX4" fmla="*/ 2015788 w 2218286"/>
-                <a:gd name="connsiteY4" fmla="*/ 914216 h 941723"/>
-                <a:gd name="connsiteX5" fmla="*/ 2213908 w 2218286"/>
-                <a:gd name="connsiteY5" fmla="*/ 360496 h 941723"/>
-                <a:gd name="connsiteX6" fmla="*/ 1914188 w 2218286"/>
-                <a:gd name="connsiteY6" fmla="*/ 25216 h 941723"/>
-                <a:gd name="connsiteX7" fmla="*/ 862628 w 2218286"/>
-                <a:gd name="connsiteY7" fmla="*/ 25216 h 941723"/>
-                <a:gd name="connsiteX8" fmla="*/ 283508 w 2218286"/>
-                <a:gd name="connsiteY8" fmla="*/ 35376 h 941723"/>
-                <a:gd name="connsiteX9" fmla="*/ 21253 w 2218286"/>
-                <a:gd name="connsiteY9" fmla="*/ 359226 h 941723"/>
-                <a:gd name="connsiteX0" fmla="*/ 22016 w 2219049"/>
-                <a:gd name="connsiteY0" fmla="*/ 359226 h 941723"/>
-                <a:gd name="connsiteX1" fmla="*/ 63926 w 2219049"/>
-                <a:gd name="connsiteY1" fmla="*/ 587191 h 941723"/>
-                <a:gd name="connsiteX2" fmla="*/ 456991 w 2219049"/>
-                <a:gd name="connsiteY2" fmla="*/ 863416 h 941723"/>
-                <a:gd name="connsiteX3" fmla="*/ 1076751 w 2219049"/>
-                <a:gd name="connsiteY3" fmla="*/ 858336 h 941723"/>
-                <a:gd name="connsiteX4" fmla="*/ 2016551 w 2219049"/>
-                <a:gd name="connsiteY4" fmla="*/ 914216 h 941723"/>
-                <a:gd name="connsiteX5" fmla="*/ 2214671 w 2219049"/>
-                <a:gd name="connsiteY5" fmla="*/ 360496 h 941723"/>
-                <a:gd name="connsiteX6" fmla="*/ 1914951 w 2219049"/>
-                <a:gd name="connsiteY6" fmla="*/ 25216 h 941723"/>
-                <a:gd name="connsiteX7" fmla="*/ 863391 w 2219049"/>
-                <a:gd name="connsiteY7" fmla="*/ 25216 h 941723"/>
-                <a:gd name="connsiteX8" fmla="*/ 284271 w 2219049"/>
-                <a:gd name="connsiteY8" fmla="*/ 35376 h 941723"/>
-                <a:gd name="connsiteX9" fmla="*/ 22016 w 2219049"/>
-                <a:gd name="connsiteY9" fmla="*/ 359226 h 941723"/>
-                <a:gd name="connsiteX0" fmla="*/ 20452 w 2223200"/>
-                <a:gd name="connsiteY0" fmla="*/ 309696 h 941723"/>
-                <a:gd name="connsiteX1" fmla="*/ 68077 w 2223200"/>
-                <a:gd name="connsiteY1" fmla="*/ 587191 h 941723"/>
-                <a:gd name="connsiteX2" fmla="*/ 461142 w 2223200"/>
-                <a:gd name="connsiteY2" fmla="*/ 863416 h 941723"/>
-                <a:gd name="connsiteX3" fmla="*/ 1080902 w 2223200"/>
-                <a:gd name="connsiteY3" fmla="*/ 858336 h 941723"/>
-                <a:gd name="connsiteX4" fmla="*/ 2020702 w 2223200"/>
-                <a:gd name="connsiteY4" fmla="*/ 914216 h 941723"/>
-                <a:gd name="connsiteX5" fmla="*/ 2218822 w 2223200"/>
-                <a:gd name="connsiteY5" fmla="*/ 360496 h 941723"/>
-                <a:gd name="connsiteX6" fmla="*/ 1919102 w 2223200"/>
-                <a:gd name="connsiteY6" fmla="*/ 25216 h 941723"/>
-                <a:gd name="connsiteX7" fmla="*/ 867542 w 2223200"/>
-                <a:gd name="connsiteY7" fmla="*/ 25216 h 941723"/>
-                <a:gd name="connsiteX8" fmla="*/ 288422 w 2223200"/>
-                <a:gd name="connsiteY8" fmla="*/ 35376 h 941723"/>
-                <a:gd name="connsiteX9" fmla="*/ 20452 w 2223200"/>
-                <a:gd name="connsiteY9" fmla="*/ 309696 h 941723"/>
-                <a:gd name="connsiteX0" fmla="*/ 37321 w 2240069"/>
-                <a:gd name="connsiteY0" fmla="*/ 309696 h 941723"/>
-                <a:gd name="connsiteX1" fmla="*/ 84946 w 2240069"/>
-                <a:gd name="connsiteY1" fmla="*/ 587191 h 941723"/>
-                <a:gd name="connsiteX2" fmla="*/ 478011 w 2240069"/>
-                <a:gd name="connsiteY2" fmla="*/ 863416 h 941723"/>
-                <a:gd name="connsiteX3" fmla="*/ 1097771 w 2240069"/>
-                <a:gd name="connsiteY3" fmla="*/ 858336 h 941723"/>
-                <a:gd name="connsiteX4" fmla="*/ 2037571 w 2240069"/>
-                <a:gd name="connsiteY4" fmla="*/ 914216 h 941723"/>
-                <a:gd name="connsiteX5" fmla="*/ 2235691 w 2240069"/>
-                <a:gd name="connsiteY5" fmla="*/ 360496 h 941723"/>
-                <a:gd name="connsiteX6" fmla="*/ 1935971 w 2240069"/>
-                <a:gd name="connsiteY6" fmla="*/ 25216 h 941723"/>
-                <a:gd name="connsiteX7" fmla="*/ 884411 w 2240069"/>
-                <a:gd name="connsiteY7" fmla="*/ 25216 h 941723"/>
-                <a:gd name="connsiteX8" fmla="*/ 305291 w 2240069"/>
-                <a:gd name="connsiteY8" fmla="*/ 35376 h 941723"/>
-                <a:gd name="connsiteX9" fmla="*/ 37321 w 2240069"/>
-                <a:gd name="connsiteY9" fmla="*/ 309696 h 941723"/>
-                <a:gd name="connsiteX0" fmla="*/ 51135 w 2210068"/>
-                <a:gd name="connsiteY0" fmla="*/ 222066 h 941723"/>
-                <a:gd name="connsiteX1" fmla="*/ 54945 w 2210068"/>
-                <a:gd name="connsiteY1" fmla="*/ 587191 h 941723"/>
-                <a:gd name="connsiteX2" fmla="*/ 448010 w 2210068"/>
-                <a:gd name="connsiteY2" fmla="*/ 863416 h 941723"/>
-                <a:gd name="connsiteX3" fmla="*/ 1067770 w 2210068"/>
-                <a:gd name="connsiteY3" fmla="*/ 858336 h 941723"/>
-                <a:gd name="connsiteX4" fmla="*/ 2007570 w 2210068"/>
-                <a:gd name="connsiteY4" fmla="*/ 914216 h 941723"/>
-                <a:gd name="connsiteX5" fmla="*/ 2205690 w 2210068"/>
-                <a:gd name="connsiteY5" fmla="*/ 360496 h 941723"/>
-                <a:gd name="connsiteX6" fmla="*/ 1905970 w 2210068"/>
-                <a:gd name="connsiteY6" fmla="*/ 25216 h 941723"/>
-                <a:gd name="connsiteX7" fmla="*/ 854410 w 2210068"/>
-                <a:gd name="connsiteY7" fmla="*/ 25216 h 941723"/>
-                <a:gd name="connsiteX8" fmla="*/ 275290 w 2210068"/>
-                <a:gd name="connsiteY8" fmla="*/ 35376 h 941723"/>
-                <a:gd name="connsiteX9" fmla="*/ 51135 w 2210068"/>
-                <a:gd name="connsiteY9" fmla="*/ 222066 h 941723"/>
-                <a:gd name="connsiteX0" fmla="*/ 52647 w 2211580"/>
-                <a:gd name="connsiteY0" fmla="*/ 222066 h 941723"/>
-                <a:gd name="connsiteX1" fmla="*/ 56457 w 2211580"/>
-                <a:gd name="connsiteY1" fmla="*/ 587191 h 941723"/>
-                <a:gd name="connsiteX2" fmla="*/ 449522 w 2211580"/>
-                <a:gd name="connsiteY2" fmla="*/ 863416 h 941723"/>
-                <a:gd name="connsiteX3" fmla="*/ 1069282 w 2211580"/>
-                <a:gd name="connsiteY3" fmla="*/ 858336 h 941723"/>
-                <a:gd name="connsiteX4" fmla="*/ 2009082 w 2211580"/>
-                <a:gd name="connsiteY4" fmla="*/ 914216 h 941723"/>
-                <a:gd name="connsiteX5" fmla="*/ 2207202 w 2211580"/>
-                <a:gd name="connsiteY5" fmla="*/ 360496 h 941723"/>
-                <a:gd name="connsiteX6" fmla="*/ 1907482 w 2211580"/>
-                <a:gd name="connsiteY6" fmla="*/ 25216 h 941723"/>
-                <a:gd name="connsiteX7" fmla="*/ 855922 w 2211580"/>
-                <a:gd name="connsiteY7" fmla="*/ 25216 h 941723"/>
-                <a:gd name="connsiteX8" fmla="*/ 276802 w 2211580"/>
-                <a:gd name="connsiteY8" fmla="*/ 35376 h 941723"/>
-                <a:gd name="connsiteX9" fmla="*/ 52647 w 2211580"/>
-                <a:gd name="connsiteY9" fmla="*/ 222066 h 941723"/>
-                <a:gd name="connsiteX0" fmla="*/ 44175 w 2203108"/>
-                <a:gd name="connsiteY0" fmla="*/ 222066 h 941723"/>
-                <a:gd name="connsiteX1" fmla="*/ 47985 w 2203108"/>
-                <a:gd name="connsiteY1" fmla="*/ 587191 h 941723"/>
-                <a:gd name="connsiteX2" fmla="*/ 441050 w 2203108"/>
-                <a:gd name="connsiteY2" fmla="*/ 863416 h 941723"/>
-                <a:gd name="connsiteX3" fmla="*/ 1060810 w 2203108"/>
-                <a:gd name="connsiteY3" fmla="*/ 858336 h 941723"/>
-                <a:gd name="connsiteX4" fmla="*/ 2000610 w 2203108"/>
-                <a:gd name="connsiteY4" fmla="*/ 914216 h 941723"/>
-                <a:gd name="connsiteX5" fmla="*/ 2198730 w 2203108"/>
-                <a:gd name="connsiteY5" fmla="*/ 360496 h 941723"/>
-                <a:gd name="connsiteX6" fmla="*/ 1899010 w 2203108"/>
-                <a:gd name="connsiteY6" fmla="*/ 25216 h 941723"/>
-                <a:gd name="connsiteX7" fmla="*/ 847450 w 2203108"/>
-                <a:gd name="connsiteY7" fmla="*/ 25216 h 941723"/>
-                <a:gd name="connsiteX8" fmla="*/ 388345 w 2203108"/>
-                <a:gd name="connsiteY8" fmla="*/ 23946 h 941723"/>
-                <a:gd name="connsiteX9" fmla="*/ 44175 w 2203108"/>
-                <a:gd name="connsiteY9" fmla="*/ 222066 h 941723"/>
-                <a:gd name="connsiteX0" fmla="*/ 44175 w 2203108"/>
-                <a:gd name="connsiteY0" fmla="*/ 222066 h 941723"/>
-                <a:gd name="connsiteX1" fmla="*/ 47985 w 2203108"/>
-                <a:gd name="connsiteY1" fmla="*/ 587191 h 941723"/>
-                <a:gd name="connsiteX2" fmla="*/ 441050 w 2203108"/>
-                <a:gd name="connsiteY2" fmla="*/ 863416 h 941723"/>
-                <a:gd name="connsiteX3" fmla="*/ 1060810 w 2203108"/>
-                <a:gd name="connsiteY3" fmla="*/ 858336 h 941723"/>
-                <a:gd name="connsiteX4" fmla="*/ 2000610 w 2203108"/>
-                <a:gd name="connsiteY4" fmla="*/ 914216 h 941723"/>
-                <a:gd name="connsiteX5" fmla="*/ 2198730 w 2203108"/>
-                <a:gd name="connsiteY5" fmla="*/ 360496 h 941723"/>
-                <a:gd name="connsiteX6" fmla="*/ 1899010 w 2203108"/>
-                <a:gd name="connsiteY6" fmla="*/ 25216 h 941723"/>
-                <a:gd name="connsiteX7" fmla="*/ 847450 w 2203108"/>
-                <a:gd name="connsiteY7" fmla="*/ 25216 h 941723"/>
-                <a:gd name="connsiteX8" fmla="*/ 388345 w 2203108"/>
-                <a:gd name="connsiteY8" fmla="*/ 23946 h 941723"/>
-                <a:gd name="connsiteX9" fmla="*/ 44175 w 2203108"/>
-                <a:gd name="connsiteY9" fmla="*/ 222066 h 941723"/>
-                <a:gd name="connsiteX0" fmla="*/ 47500 w 2206433"/>
-                <a:gd name="connsiteY0" fmla="*/ 222066 h 941723"/>
-                <a:gd name="connsiteX1" fmla="*/ 45595 w 2206433"/>
-                <a:gd name="connsiteY1" fmla="*/ 581476 h 941723"/>
-                <a:gd name="connsiteX2" fmla="*/ 444375 w 2206433"/>
-                <a:gd name="connsiteY2" fmla="*/ 863416 h 941723"/>
-                <a:gd name="connsiteX3" fmla="*/ 1064135 w 2206433"/>
-                <a:gd name="connsiteY3" fmla="*/ 858336 h 941723"/>
-                <a:gd name="connsiteX4" fmla="*/ 2003935 w 2206433"/>
-                <a:gd name="connsiteY4" fmla="*/ 914216 h 941723"/>
-                <a:gd name="connsiteX5" fmla="*/ 2202055 w 2206433"/>
-                <a:gd name="connsiteY5" fmla="*/ 360496 h 941723"/>
-                <a:gd name="connsiteX6" fmla="*/ 1902335 w 2206433"/>
-                <a:gd name="connsiteY6" fmla="*/ 25216 h 941723"/>
-                <a:gd name="connsiteX7" fmla="*/ 850775 w 2206433"/>
-                <a:gd name="connsiteY7" fmla="*/ 25216 h 941723"/>
-                <a:gd name="connsiteX8" fmla="*/ 391670 w 2206433"/>
-                <a:gd name="connsiteY8" fmla="*/ 23946 h 941723"/>
-                <a:gd name="connsiteX9" fmla="*/ 47500 w 2206433"/>
-                <a:gd name="connsiteY9" fmla="*/ 222066 h 941723"/>
-                <a:gd name="connsiteX0" fmla="*/ 45156 w 2204089"/>
-                <a:gd name="connsiteY0" fmla="*/ 222066 h 942144"/>
-                <a:gd name="connsiteX1" fmla="*/ 43251 w 2204089"/>
-                <a:gd name="connsiteY1" fmla="*/ 581476 h 942144"/>
-                <a:gd name="connsiteX2" fmla="*/ 405836 w 2204089"/>
-                <a:gd name="connsiteY2" fmla="*/ 844366 h 942144"/>
-                <a:gd name="connsiteX3" fmla="*/ 1061791 w 2204089"/>
-                <a:gd name="connsiteY3" fmla="*/ 858336 h 942144"/>
-                <a:gd name="connsiteX4" fmla="*/ 2001591 w 2204089"/>
-                <a:gd name="connsiteY4" fmla="*/ 914216 h 942144"/>
-                <a:gd name="connsiteX5" fmla="*/ 2199711 w 2204089"/>
-                <a:gd name="connsiteY5" fmla="*/ 360496 h 942144"/>
-                <a:gd name="connsiteX6" fmla="*/ 1899991 w 2204089"/>
-                <a:gd name="connsiteY6" fmla="*/ 25216 h 942144"/>
-                <a:gd name="connsiteX7" fmla="*/ 848431 w 2204089"/>
-                <a:gd name="connsiteY7" fmla="*/ 25216 h 942144"/>
-                <a:gd name="connsiteX8" fmla="*/ 389326 w 2204089"/>
-                <a:gd name="connsiteY8" fmla="*/ 23946 h 942144"/>
-                <a:gd name="connsiteX9" fmla="*/ 45156 w 2204089"/>
-                <a:gd name="connsiteY9" fmla="*/ 222066 h 942144"/>
-                <a:gd name="connsiteX0" fmla="*/ 45156 w 2204110"/>
-                <a:gd name="connsiteY0" fmla="*/ 222066 h 938299"/>
-                <a:gd name="connsiteX1" fmla="*/ 43251 w 2204110"/>
-                <a:gd name="connsiteY1" fmla="*/ 581476 h 938299"/>
-                <a:gd name="connsiteX2" fmla="*/ 405836 w 2204110"/>
-                <a:gd name="connsiteY2" fmla="*/ 844366 h 938299"/>
-                <a:gd name="connsiteX3" fmla="*/ 1059886 w 2204110"/>
-                <a:gd name="connsiteY3" fmla="*/ 839286 h 938299"/>
-                <a:gd name="connsiteX4" fmla="*/ 2001591 w 2204110"/>
-                <a:gd name="connsiteY4" fmla="*/ 914216 h 938299"/>
-                <a:gd name="connsiteX5" fmla="*/ 2199711 w 2204110"/>
-                <a:gd name="connsiteY5" fmla="*/ 360496 h 938299"/>
-                <a:gd name="connsiteX6" fmla="*/ 1899991 w 2204110"/>
-                <a:gd name="connsiteY6" fmla="*/ 25216 h 938299"/>
-                <a:gd name="connsiteX7" fmla="*/ 848431 w 2204110"/>
-                <a:gd name="connsiteY7" fmla="*/ 25216 h 938299"/>
-                <a:gd name="connsiteX8" fmla="*/ 389326 w 2204110"/>
-                <a:gd name="connsiteY8" fmla="*/ 23946 h 938299"/>
-                <a:gd name="connsiteX9" fmla="*/ 45156 w 2204110"/>
-                <a:gd name="connsiteY9" fmla="*/ 222066 h 938299"/>
-                <a:gd name="connsiteX0" fmla="*/ 45156 w 2206360"/>
-                <a:gd name="connsiteY0" fmla="*/ 220679 h 936912"/>
-                <a:gd name="connsiteX1" fmla="*/ 43251 w 2206360"/>
-                <a:gd name="connsiteY1" fmla="*/ 580089 h 936912"/>
-                <a:gd name="connsiteX2" fmla="*/ 405836 w 2206360"/>
-                <a:gd name="connsiteY2" fmla="*/ 842979 h 936912"/>
-                <a:gd name="connsiteX3" fmla="*/ 1059886 w 2206360"/>
-                <a:gd name="connsiteY3" fmla="*/ 837899 h 936912"/>
-                <a:gd name="connsiteX4" fmla="*/ 2001591 w 2206360"/>
-                <a:gd name="connsiteY4" fmla="*/ 912829 h 936912"/>
-                <a:gd name="connsiteX5" fmla="*/ 2199711 w 2206360"/>
-                <a:gd name="connsiteY5" fmla="*/ 359109 h 936912"/>
-                <a:gd name="connsiteX6" fmla="*/ 1861891 w 2206360"/>
-                <a:gd name="connsiteY6" fmla="*/ 25734 h 936912"/>
-                <a:gd name="connsiteX7" fmla="*/ 848431 w 2206360"/>
-                <a:gd name="connsiteY7" fmla="*/ 23829 h 936912"/>
-                <a:gd name="connsiteX8" fmla="*/ 389326 w 2206360"/>
-                <a:gd name="connsiteY8" fmla="*/ 22559 h 936912"/>
-                <a:gd name="connsiteX9" fmla="*/ 45156 w 2206360"/>
-                <a:gd name="connsiteY9" fmla="*/ 220679 h 936912"/>
-                <a:gd name="connsiteX0" fmla="*/ 45156 w 2199724"/>
-                <a:gd name="connsiteY0" fmla="*/ 220679 h 936912"/>
-                <a:gd name="connsiteX1" fmla="*/ 43251 w 2199724"/>
-                <a:gd name="connsiteY1" fmla="*/ 580089 h 936912"/>
-                <a:gd name="connsiteX2" fmla="*/ 405836 w 2199724"/>
-                <a:gd name="connsiteY2" fmla="*/ 842979 h 936912"/>
-                <a:gd name="connsiteX3" fmla="*/ 1059886 w 2199724"/>
-                <a:gd name="connsiteY3" fmla="*/ 837899 h 936912"/>
-                <a:gd name="connsiteX4" fmla="*/ 2001591 w 2199724"/>
-                <a:gd name="connsiteY4" fmla="*/ 912829 h 936912"/>
-                <a:gd name="connsiteX5" fmla="*/ 2199711 w 2199724"/>
-                <a:gd name="connsiteY5" fmla="*/ 359109 h 936912"/>
-                <a:gd name="connsiteX6" fmla="*/ 1861891 w 2199724"/>
-                <a:gd name="connsiteY6" fmla="*/ 25734 h 936912"/>
-                <a:gd name="connsiteX7" fmla="*/ 848431 w 2199724"/>
-                <a:gd name="connsiteY7" fmla="*/ 23829 h 936912"/>
-                <a:gd name="connsiteX8" fmla="*/ 389326 w 2199724"/>
-                <a:gd name="connsiteY8" fmla="*/ 22559 h 936912"/>
-                <a:gd name="connsiteX9" fmla="*/ 45156 w 2199724"/>
-                <a:gd name="connsiteY9" fmla="*/ 220679 h 936912"/>
-                <a:gd name="connsiteX0" fmla="*/ 45156 w 2194017"/>
-                <a:gd name="connsiteY0" fmla="*/ 228855 h 937907"/>
-                <a:gd name="connsiteX1" fmla="*/ 43251 w 2194017"/>
-                <a:gd name="connsiteY1" fmla="*/ 588265 h 937907"/>
-                <a:gd name="connsiteX2" fmla="*/ 405836 w 2194017"/>
-                <a:gd name="connsiteY2" fmla="*/ 851155 h 937907"/>
-                <a:gd name="connsiteX3" fmla="*/ 1059886 w 2194017"/>
-                <a:gd name="connsiteY3" fmla="*/ 846075 h 937907"/>
-                <a:gd name="connsiteX4" fmla="*/ 2001591 w 2194017"/>
-                <a:gd name="connsiteY4" fmla="*/ 921005 h 937907"/>
-                <a:gd name="connsiteX5" fmla="*/ 2193996 w 2194017"/>
-                <a:gd name="connsiteY5" fmla="*/ 477775 h 937907"/>
-                <a:gd name="connsiteX6" fmla="*/ 1861891 w 2194017"/>
-                <a:gd name="connsiteY6" fmla="*/ 33910 h 937907"/>
-                <a:gd name="connsiteX7" fmla="*/ 848431 w 2194017"/>
-                <a:gd name="connsiteY7" fmla="*/ 32005 h 937907"/>
-                <a:gd name="connsiteX8" fmla="*/ 389326 w 2194017"/>
-                <a:gd name="connsiteY8" fmla="*/ 30735 h 937907"/>
-                <a:gd name="connsiteX9" fmla="*/ 45156 w 2194017"/>
-                <a:gd name="connsiteY9" fmla="*/ 228855 h 937907"/>
-                <a:gd name="connsiteX0" fmla="*/ 45156 w 2194489"/>
-                <a:gd name="connsiteY0" fmla="*/ 228855 h 937907"/>
-                <a:gd name="connsiteX1" fmla="*/ 43251 w 2194489"/>
-                <a:gd name="connsiteY1" fmla="*/ 588265 h 937907"/>
-                <a:gd name="connsiteX2" fmla="*/ 405836 w 2194489"/>
-                <a:gd name="connsiteY2" fmla="*/ 851155 h 937907"/>
-                <a:gd name="connsiteX3" fmla="*/ 1059886 w 2194489"/>
-                <a:gd name="connsiteY3" fmla="*/ 846075 h 937907"/>
-                <a:gd name="connsiteX4" fmla="*/ 2001591 w 2194489"/>
-                <a:gd name="connsiteY4" fmla="*/ 921005 h 937907"/>
-                <a:gd name="connsiteX5" fmla="*/ 2193996 w 2194489"/>
-                <a:gd name="connsiteY5" fmla="*/ 477775 h 937907"/>
-                <a:gd name="connsiteX6" fmla="*/ 1861891 w 2194489"/>
-                <a:gd name="connsiteY6" fmla="*/ 33910 h 937907"/>
-                <a:gd name="connsiteX7" fmla="*/ 848431 w 2194489"/>
-                <a:gd name="connsiteY7" fmla="*/ 32005 h 937907"/>
-                <a:gd name="connsiteX8" fmla="*/ 389326 w 2194489"/>
-                <a:gd name="connsiteY8" fmla="*/ 30735 h 937907"/>
-                <a:gd name="connsiteX9" fmla="*/ 45156 w 2194489"/>
-                <a:gd name="connsiteY9" fmla="*/ 228855 h 937907"/>
-                <a:gd name="connsiteX0" fmla="*/ 45156 w 2196388"/>
-                <a:gd name="connsiteY0" fmla="*/ 225331 h 937436"/>
-                <a:gd name="connsiteX1" fmla="*/ 43251 w 2196388"/>
-                <a:gd name="connsiteY1" fmla="*/ 584741 h 937436"/>
-                <a:gd name="connsiteX2" fmla="*/ 405836 w 2196388"/>
-                <a:gd name="connsiteY2" fmla="*/ 847631 h 937436"/>
-                <a:gd name="connsiteX3" fmla="*/ 1059886 w 2196388"/>
-                <a:gd name="connsiteY3" fmla="*/ 842551 h 937436"/>
-                <a:gd name="connsiteX4" fmla="*/ 2001591 w 2196388"/>
-                <a:gd name="connsiteY4" fmla="*/ 917481 h 937436"/>
-                <a:gd name="connsiteX5" fmla="*/ 2195901 w 2196388"/>
-                <a:gd name="connsiteY5" fmla="*/ 426626 h 937436"/>
-                <a:gd name="connsiteX6" fmla="*/ 1861891 w 2196388"/>
-                <a:gd name="connsiteY6" fmla="*/ 30386 h 937436"/>
-                <a:gd name="connsiteX7" fmla="*/ 848431 w 2196388"/>
-                <a:gd name="connsiteY7" fmla="*/ 28481 h 937436"/>
-                <a:gd name="connsiteX8" fmla="*/ 389326 w 2196388"/>
-                <a:gd name="connsiteY8" fmla="*/ 27211 h 937436"/>
-                <a:gd name="connsiteX9" fmla="*/ 45156 w 2196388"/>
-                <a:gd name="connsiteY9" fmla="*/ 225331 h 937436"/>
-                <a:gd name="connsiteX0" fmla="*/ 45156 w 2196863"/>
-                <a:gd name="connsiteY0" fmla="*/ 225331 h 945006"/>
-                <a:gd name="connsiteX1" fmla="*/ 43251 w 2196863"/>
-                <a:gd name="connsiteY1" fmla="*/ 584741 h 945006"/>
-                <a:gd name="connsiteX2" fmla="*/ 405836 w 2196863"/>
-                <a:gd name="connsiteY2" fmla="*/ 847631 h 945006"/>
-                <a:gd name="connsiteX3" fmla="*/ 1059886 w 2196863"/>
-                <a:gd name="connsiteY3" fmla="*/ 842551 h 945006"/>
-                <a:gd name="connsiteX4" fmla="*/ 2001591 w 2196863"/>
-                <a:gd name="connsiteY4" fmla="*/ 917481 h 945006"/>
-                <a:gd name="connsiteX5" fmla="*/ 2195901 w 2196863"/>
-                <a:gd name="connsiteY5" fmla="*/ 426626 h 945006"/>
-                <a:gd name="connsiteX6" fmla="*/ 1861891 w 2196863"/>
-                <a:gd name="connsiteY6" fmla="*/ 30386 h 945006"/>
-                <a:gd name="connsiteX7" fmla="*/ 848431 w 2196863"/>
-                <a:gd name="connsiteY7" fmla="*/ 28481 h 945006"/>
-                <a:gd name="connsiteX8" fmla="*/ 389326 w 2196863"/>
-                <a:gd name="connsiteY8" fmla="*/ 27211 h 945006"/>
-                <a:gd name="connsiteX9" fmla="*/ 45156 w 2196863"/>
-                <a:gd name="connsiteY9" fmla="*/ 225331 h 945006"/>
-                <a:gd name="connsiteX0" fmla="*/ 45156 w 2201145"/>
-                <a:gd name="connsiteY0" fmla="*/ 225331 h 923215"/>
-                <a:gd name="connsiteX1" fmla="*/ 43251 w 2201145"/>
-                <a:gd name="connsiteY1" fmla="*/ 584741 h 923215"/>
-                <a:gd name="connsiteX2" fmla="*/ 405836 w 2201145"/>
-                <a:gd name="connsiteY2" fmla="*/ 847631 h 923215"/>
-                <a:gd name="connsiteX3" fmla="*/ 1059886 w 2201145"/>
-                <a:gd name="connsiteY3" fmla="*/ 842551 h 923215"/>
-                <a:gd name="connsiteX4" fmla="*/ 1957776 w 2201145"/>
-                <a:gd name="connsiteY4" fmla="*/ 892716 h 923215"/>
-                <a:gd name="connsiteX5" fmla="*/ 2195901 w 2201145"/>
-                <a:gd name="connsiteY5" fmla="*/ 426626 h 923215"/>
-                <a:gd name="connsiteX6" fmla="*/ 1861891 w 2201145"/>
-                <a:gd name="connsiteY6" fmla="*/ 30386 h 923215"/>
-                <a:gd name="connsiteX7" fmla="*/ 848431 w 2201145"/>
-                <a:gd name="connsiteY7" fmla="*/ 28481 h 923215"/>
-                <a:gd name="connsiteX8" fmla="*/ 389326 w 2201145"/>
-                <a:gd name="connsiteY8" fmla="*/ 27211 h 923215"/>
-                <a:gd name="connsiteX9" fmla="*/ 45156 w 2201145"/>
-                <a:gd name="connsiteY9" fmla="*/ 225331 h 923215"/>
-              </a:gdLst>
-              <a:ahLst/>
-              <a:cxnLst>
-                <a:cxn ang="0">
-                  <a:pos x="connsiteX0" y="connsiteY0"/>
-                </a:cxn>
-                <a:cxn ang="0">
-                  <a:pos x="connsiteX1" y="connsiteY1"/>
-                </a:cxn>
-                <a:cxn ang="0">
-                  <a:pos x="connsiteX2" y="connsiteY2"/>
-                </a:cxn>
-                <a:cxn ang="0">
-                  <a:pos x="connsiteX3" y="connsiteY3"/>
-                </a:cxn>
-                <a:cxn ang="0">
-                  <a:pos x="connsiteX4" y="connsiteY4"/>
-                </a:cxn>
-                <a:cxn ang="0">
-                  <a:pos x="connsiteX5" y="connsiteY5"/>
-                </a:cxn>
-                <a:cxn ang="0">
-                  <a:pos x="connsiteX6" y="connsiteY6"/>
-                </a:cxn>
-                <a:cxn ang="0">
-                  <a:pos x="connsiteX7" y="connsiteY7"/>
-                </a:cxn>
-                <a:cxn ang="0">
-                  <a:pos x="connsiteX8" y="connsiteY8"/>
-                </a:cxn>
-                <a:cxn ang="0">
-                  <a:pos x="connsiteX9" y="connsiteY9"/>
-                </a:cxn>
-              </a:cxnLst>
-              <a:rect l="l" t="t" r="r" b="b"/>
-              <a:pathLst>
-                <a:path w="2201145" h="923215">
-                  <a:moveTo>
-                    <a:pt x="45156" y="225331"/>
-                  </a:moveTo>
-                  <a:cubicBezTo>
-                    <a:pt x="-12523" y="318253"/>
-                    <a:pt x="-16862" y="481024"/>
-                    <a:pt x="43251" y="584741"/>
-                  </a:cubicBezTo>
-                  <a:cubicBezTo>
-                    <a:pt x="103364" y="688458"/>
-                    <a:pt x="236397" y="804663"/>
-                    <a:pt x="405836" y="847631"/>
-                  </a:cubicBezTo>
-                  <a:cubicBezTo>
-                    <a:pt x="575275" y="890599"/>
-                    <a:pt x="801230" y="835037"/>
-                    <a:pt x="1059886" y="842551"/>
-                  </a:cubicBezTo>
-                  <a:cubicBezTo>
-                    <a:pt x="1318542" y="850065"/>
-                    <a:pt x="1709385" y="981087"/>
-                    <a:pt x="1957776" y="892716"/>
-                  </a:cubicBezTo>
-                  <a:cubicBezTo>
-                    <a:pt x="2206167" y="804345"/>
-                    <a:pt x="2211882" y="570348"/>
-                    <a:pt x="2195901" y="426626"/>
-                  </a:cubicBezTo>
-                  <a:cubicBezTo>
-                    <a:pt x="2179920" y="282904"/>
-                    <a:pt x="2086469" y="96743"/>
-                    <a:pt x="1861891" y="30386"/>
-                  </a:cubicBezTo>
-                  <a:cubicBezTo>
-                    <a:pt x="1637313" y="-35971"/>
-                    <a:pt x="1120211" y="26788"/>
-                    <a:pt x="848431" y="28481"/>
-                  </a:cubicBezTo>
-                  <a:cubicBezTo>
-                    <a:pt x="576651" y="30174"/>
-                    <a:pt x="559400" y="2023"/>
-                    <a:pt x="389326" y="27211"/>
-                  </a:cubicBezTo>
-                  <a:cubicBezTo>
-                    <a:pt x="219252" y="52399"/>
-                    <a:pt x="102835" y="132409"/>
-                    <a:pt x="45156" y="225331"/>
-                  </a:cubicBezTo>
-                  <a:close/>
-                </a:path>
-              </a:pathLst>
-            </a:custGeom>
-            <a:noFill/>
-            <a:ln w="38100"/>
-          </p:spPr>
-          <p:style>
-            <a:lnRef idx="2">
-              <a:schemeClr val="accent1">
-                <a:shade val="50000"/>
-              </a:schemeClr>
-            </a:lnRef>
-            <a:fillRef idx="1">
-              <a:schemeClr val="accent1"/>
-            </a:fillRef>
-            <a:effectRef idx="0">
-              <a:schemeClr val="accent1"/>
-            </a:effectRef>
-            <a:fontRef idx="minor">
-              <a:schemeClr val="lt1"/>
-            </a:fontRef>
-          </p:style>
-          <p:txBody>
-            <a:bodyPr rtlCol="0" anchor="ctr"/>
-            <a:lstStyle/>
-            <a:p>
-              <a:pPr algn="ctr"/>
-              <a:endParaRPr lang="en-US"/>
-            </a:p>
-          </p:txBody>
-        </p:sp>
-      </p:grpSp>
+              </a:rPr>
+              <a:t>+</a:t>
+            </a:r>
+            <a:endParaRPr lang="en-US" b="1" dirty="0">
+              <a:solidFill>
+                <a:srgbClr val="0070C0"/>
+              </a:solidFill>
+            </a:endParaRPr>
+          </a:p>
+        </p:txBody>
+      </p:sp>
+      <p:sp>
+        <p:nvSpPr>
+          <p:cNvPr id="15" name="Freeform 14"/>
+          <p:cNvSpPr/>
+          <p:nvPr/>
+        </p:nvSpPr>
+        <p:spPr>
+          <a:xfrm rot="2007833">
+            <a:off x="1185396" y="3739592"/>
+            <a:ext cx="2201145" cy="923215"/>
+          </a:xfrm>
+          <a:custGeom>
+            <a:avLst/>
+            <a:gdLst>
+              <a:gd name="connsiteX0" fmla="*/ 38836 w 2192054"/>
+              <a:gd name="connsiteY0" fmla="*/ 401136 h 941723"/>
+              <a:gd name="connsiteX1" fmla="*/ 38836 w 2192054"/>
+              <a:gd name="connsiteY1" fmla="*/ 467176 h 941723"/>
+              <a:gd name="connsiteX2" fmla="*/ 429996 w 2192054"/>
+              <a:gd name="connsiteY2" fmla="*/ 863416 h 941723"/>
+              <a:gd name="connsiteX3" fmla="*/ 1049756 w 2192054"/>
+              <a:gd name="connsiteY3" fmla="*/ 858336 h 941723"/>
+              <a:gd name="connsiteX4" fmla="*/ 1989556 w 2192054"/>
+              <a:gd name="connsiteY4" fmla="*/ 914216 h 941723"/>
+              <a:gd name="connsiteX5" fmla="*/ 2187676 w 2192054"/>
+              <a:gd name="connsiteY5" fmla="*/ 360496 h 941723"/>
+              <a:gd name="connsiteX6" fmla="*/ 1887956 w 2192054"/>
+              <a:gd name="connsiteY6" fmla="*/ 25216 h 941723"/>
+              <a:gd name="connsiteX7" fmla="*/ 836396 w 2192054"/>
+              <a:gd name="connsiteY7" fmla="*/ 25216 h 941723"/>
+              <a:gd name="connsiteX8" fmla="*/ 257276 w 2192054"/>
+              <a:gd name="connsiteY8" fmla="*/ 35376 h 941723"/>
+              <a:gd name="connsiteX9" fmla="*/ 38836 w 2192054"/>
+              <a:gd name="connsiteY9" fmla="*/ 401136 h 941723"/>
+              <a:gd name="connsiteX0" fmla="*/ 21253 w 2218286"/>
+              <a:gd name="connsiteY0" fmla="*/ 359226 h 941723"/>
+              <a:gd name="connsiteX1" fmla="*/ 65068 w 2218286"/>
+              <a:gd name="connsiteY1" fmla="*/ 467176 h 941723"/>
+              <a:gd name="connsiteX2" fmla="*/ 456228 w 2218286"/>
+              <a:gd name="connsiteY2" fmla="*/ 863416 h 941723"/>
+              <a:gd name="connsiteX3" fmla="*/ 1075988 w 2218286"/>
+              <a:gd name="connsiteY3" fmla="*/ 858336 h 941723"/>
+              <a:gd name="connsiteX4" fmla="*/ 2015788 w 2218286"/>
+              <a:gd name="connsiteY4" fmla="*/ 914216 h 941723"/>
+              <a:gd name="connsiteX5" fmla="*/ 2213908 w 2218286"/>
+              <a:gd name="connsiteY5" fmla="*/ 360496 h 941723"/>
+              <a:gd name="connsiteX6" fmla="*/ 1914188 w 2218286"/>
+              <a:gd name="connsiteY6" fmla="*/ 25216 h 941723"/>
+              <a:gd name="connsiteX7" fmla="*/ 862628 w 2218286"/>
+              <a:gd name="connsiteY7" fmla="*/ 25216 h 941723"/>
+              <a:gd name="connsiteX8" fmla="*/ 283508 w 2218286"/>
+              <a:gd name="connsiteY8" fmla="*/ 35376 h 941723"/>
+              <a:gd name="connsiteX9" fmla="*/ 21253 w 2218286"/>
+              <a:gd name="connsiteY9" fmla="*/ 359226 h 941723"/>
+              <a:gd name="connsiteX0" fmla="*/ 22016 w 2219049"/>
+              <a:gd name="connsiteY0" fmla="*/ 359226 h 941723"/>
+              <a:gd name="connsiteX1" fmla="*/ 63926 w 2219049"/>
+              <a:gd name="connsiteY1" fmla="*/ 587191 h 941723"/>
+              <a:gd name="connsiteX2" fmla="*/ 456991 w 2219049"/>
+              <a:gd name="connsiteY2" fmla="*/ 863416 h 941723"/>
+              <a:gd name="connsiteX3" fmla="*/ 1076751 w 2219049"/>
+              <a:gd name="connsiteY3" fmla="*/ 858336 h 941723"/>
+              <a:gd name="connsiteX4" fmla="*/ 2016551 w 2219049"/>
+              <a:gd name="connsiteY4" fmla="*/ 914216 h 941723"/>
+              <a:gd name="connsiteX5" fmla="*/ 2214671 w 2219049"/>
+              <a:gd name="connsiteY5" fmla="*/ 360496 h 941723"/>
+              <a:gd name="connsiteX6" fmla="*/ 1914951 w 2219049"/>
+              <a:gd name="connsiteY6" fmla="*/ 25216 h 941723"/>
+              <a:gd name="connsiteX7" fmla="*/ 863391 w 2219049"/>
+              <a:gd name="connsiteY7" fmla="*/ 25216 h 941723"/>
+              <a:gd name="connsiteX8" fmla="*/ 284271 w 2219049"/>
+              <a:gd name="connsiteY8" fmla="*/ 35376 h 941723"/>
+              <a:gd name="connsiteX9" fmla="*/ 22016 w 2219049"/>
+              <a:gd name="connsiteY9" fmla="*/ 359226 h 941723"/>
+              <a:gd name="connsiteX0" fmla="*/ 20452 w 2223200"/>
+              <a:gd name="connsiteY0" fmla="*/ 309696 h 941723"/>
+              <a:gd name="connsiteX1" fmla="*/ 68077 w 2223200"/>
+              <a:gd name="connsiteY1" fmla="*/ 587191 h 941723"/>
+              <a:gd name="connsiteX2" fmla="*/ 461142 w 2223200"/>
+              <a:gd name="connsiteY2" fmla="*/ 863416 h 941723"/>
+              <a:gd name="connsiteX3" fmla="*/ 1080902 w 2223200"/>
+              <a:gd name="connsiteY3" fmla="*/ 858336 h 941723"/>
+              <a:gd name="connsiteX4" fmla="*/ 2020702 w 2223200"/>
+              <a:gd name="connsiteY4" fmla="*/ 914216 h 941723"/>
+              <a:gd name="connsiteX5" fmla="*/ 2218822 w 2223200"/>
+              <a:gd name="connsiteY5" fmla="*/ 360496 h 941723"/>
+              <a:gd name="connsiteX6" fmla="*/ 1919102 w 2223200"/>
+              <a:gd name="connsiteY6" fmla="*/ 25216 h 941723"/>
+              <a:gd name="connsiteX7" fmla="*/ 867542 w 2223200"/>
+              <a:gd name="connsiteY7" fmla="*/ 25216 h 941723"/>
+              <a:gd name="connsiteX8" fmla="*/ 288422 w 2223200"/>
+              <a:gd name="connsiteY8" fmla="*/ 35376 h 941723"/>
+              <a:gd name="connsiteX9" fmla="*/ 20452 w 2223200"/>
+              <a:gd name="connsiteY9" fmla="*/ 309696 h 941723"/>
+              <a:gd name="connsiteX0" fmla="*/ 37321 w 2240069"/>
+              <a:gd name="connsiteY0" fmla="*/ 309696 h 941723"/>
+              <a:gd name="connsiteX1" fmla="*/ 84946 w 2240069"/>
+              <a:gd name="connsiteY1" fmla="*/ 587191 h 941723"/>
+              <a:gd name="connsiteX2" fmla="*/ 478011 w 2240069"/>
+              <a:gd name="connsiteY2" fmla="*/ 863416 h 941723"/>
+              <a:gd name="connsiteX3" fmla="*/ 1097771 w 2240069"/>
+              <a:gd name="connsiteY3" fmla="*/ 858336 h 941723"/>
+              <a:gd name="connsiteX4" fmla="*/ 2037571 w 2240069"/>
+              <a:gd name="connsiteY4" fmla="*/ 914216 h 941723"/>
+              <a:gd name="connsiteX5" fmla="*/ 2235691 w 2240069"/>
+              <a:gd name="connsiteY5" fmla="*/ 360496 h 941723"/>
+              <a:gd name="connsiteX6" fmla="*/ 1935971 w 2240069"/>
+              <a:gd name="connsiteY6" fmla="*/ 25216 h 941723"/>
+              <a:gd name="connsiteX7" fmla="*/ 884411 w 2240069"/>
+              <a:gd name="connsiteY7" fmla="*/ 25216 h 941723"/>
+              <a:gd name="connsiteX8" fmla="*/ 305291 w 2240069"/>
+              <a:gd name="connsiteY8" fmla="*/ 35376 h 941723"/>
+              <a:gd name="connsiteX9" fmla="*/ 37321 w 2240069"/>
+              <a:gd name="connsiteY9" fmla="*/ 309696 h 941723"/>
+              <a:gd name="connsiteX0" fmla="*/ 51135 w 2210068"/>
+              <a:gd name="connsiteY0" fmla="*/ 222066 h 941723"/>
+              <a:gd name="connsiteX1" fmla="*/ 54945 w 2210068"/>
+              <a:gd name="connsiteY1" fmla="*/ 587191 h 941723"/>
+              <a:gd name="connsiteX2" fmla="*/ 448010 w 2210068"/>
+              <a:gd name="connsiteY2" fmla="*/ 863416 h 941723"/>
+              <a:gd name="connsiteX3" fmla="*/ 1067770 w 2210068"/>
+              <a:gd name="connsiteY3" fmla="*/ 858336 h 941723"/>
+              <a:gd name="connsiteX4" fmla="*/ 2007570 w 2210068"/>
+              <a:gd name="connsiteY4" fmla="*/ 914216 h 941723"/>
+              <a:gd name="connsiteX5" fmla="*/ 2205690 w 2210068"/>
+              <a:gd name="connsiteY5" fmla="*/ 360496 h 941723"/>
+              <a:gd name="connsiteX6" fmla="*/ 1905970 w 2210068"/>
+              <a:gd name="connsiteY6" fmla="*/ 25216 h 941723"/>
+              <a:gd name="connsiteX7" fmla="*/ 854410 w 2210068"/>
+              <a:gd name="connsiteY7" fmla="*/ 25216 h 941723"/>
+              <a:gd name="connsiteX8" fmla="*/ 275290 w 2210068"/>
+              <a:gd name="connsiteY8" fmla="*/ 35376 h 941723"/>
+              <a:gd name="connsiteX9" fmla="*/ 51135 w 2210068"/>
+              <a:gd name="connsiteY9" fmla="*/ 222066 h 941723"/>
+              <a:gd name="connsiteX0" fmla="*/ 52647 w 2211580"/>
+              <a:gd name="connsiteY0" fmla="*/ 222066 h 941723"/>
+              <a:gd name="connsiteX1" fmla="*/ 56457 w 2211580"/>
+              <a:gd name="connsiteY1" fmla="*/ 587191 h 941723"/>
+              <a:gd name="connsiteX2" fmla="*/ 449522 w 2211580"/>
+              <a:gd name="connsiteY2" fmla="*/ 863416 h 941723"/>
+              <a:gd name="connsiteX3" fmla="*/ 1069282 w 2211580"/>
+              <a:gd name="connsiteY3" fmla="*/ 858336 h 941723"/>
+              <a:gd name="connsiteX4" fmla="*/ 2009082 w 2211580"/>
+              <a:gd name="connsiteY4" fmla="*/ 914216 h 941723"/>
+              <a:gd name="connsiteX5" fmla="*/ 2207202 w 2211580"/>
+              <a:gd name="connsiteY5" fmla="*/ 360496 h 941723"/>
+              <a:gd name="connsiteX6" fmla="*/ 1907482 w 2211580"/>
+              <a:gd name="connsiteY6" fmla="*/ 25216 h 941723"/>
+              <a:gd name="connsiteX7" fmla="*/ 855922 w 2211580"/>
+              <a:gd name="connsiteY7" fmla="*/ 25216 h 941723"/>
+              <a:gd name="connsiteX8" fmla="*/ 276802 w 2211580"/>
+              <a:gd name="connsiteY8" fmla="*/ 35376 h 941723"/>
+              <a:gd name="connsiteX9" fmla="*/ 52647 w 2211580"/>
+              <a:gd name="connsiteY9" fmla="*/ 222066 h 941723"/>
+              <a:gd name="connsiteX0" fmla="*/ 44175 w 2203108"/>
+              <a:gd name="connsiteY0" fmla="*/ 222066 h 941723"/>
+              <a:gd name="connsiteX1" fmla="*/ 47985 w 2203108"/>
+              <a:gd name="connsiteY1" fmla="*/ 587191 h 941723"/>
+              <a:gd name="connsiteX2" fmla="*/ 441050 w 2203108"/>
+              <a:gd name="connsiteY2" fmla="*/ 863416 h 941723"/>
+              <a:gd name="connsiteX3" fmla="*/ 1060810 w 2203108"/>
+              <a:gd name="connsiteY3" fmla="*/ 858336 h 941723"/>
+              <a:gd name="connsiteX4" fmla="*/ 2000610 w 2203108"/>
+              <a:gd name="connsiteY4" fmla="*/ 914216 h 941723"/>
+              <a:gd name="connsiteX5" fmla="*/ 2198730 w 2203108"/>
+              <a:gd name="connsiteY5" fmla="*/ 360496 h 941723"/>
+              <a:gd name="connsiteX6" fmla="*/ 1899010 w 2203108"/>
+              <a:gd name="connsiteY6" fmla="*/ 25216 h 941723"/>
+              <a:gd name="connsiteX7" fmla="*/ 847450 w 2203108"/>
+              <a:gd name="connsiteY7" fmla="*/ 25216 h 941723"/>
+              <a:gd name="connsiteX8" fmla="*/ 388345 w 2203108"/>
+              <a:gd name="connsiteY8" fmla="*/ 23946 h 941723"/>
+              <a:gd name="connsiteX9" fmla="*/ 44175 w 2203108"/>
+              <a:gd name="connsiteY9" fmla="*/ 222066 h 941723"/>
+              <a:gd name="connsiteX0" fmla="*/ 44175 w 2203108"/>
+              <a:gd name="connsiteY0" fmla="*/ 222066 h 941723"/>
+              <a:gd name="connsiteX1" fmla="*/ 47985 w 2203108"/>
+              <a:gd name="connsiteY1" fmla="*/ 587191 h 941723"/>
+              <a:gd name="connsiteX2" fmla="*/ 441050 w 2203108"/>
+              <a:gd name="connsiteY2" fmla="*/ 863416 h 941723"/>
+              <a:gd name="connsiteX3" fmla="*/ 1060810 w 2203108"/>
+              <a:gd name="connsiteY3" fmla="*/ 858336 h 941723"/>
+              <a:gd name="connsiteX4" fmla="*/ 2000610 w 2203108"/>
+              <a:gd name="connsiteY4" fmla="*/ 914216 h 941723"/>
+              <a:gd name="connsiteX5" fmla="*/ 2198730 w 2203108"/>
+              <a:gd name="connsiteY5" fmla="*/ 360496 h 941723"/>
+              <a:gd name="connsiteX6" fmla="*/ 1899010 w 2203108"/>
+              <a:gd name="connsiteY6" fmla="*/ 25216 h 941723"/>
+              <a:gd name="connsiteX7" fmla="*/ 847450 w 2203108"/>
+              <a:gd name="connsiteY7" fmla="*/ 25216 h 941723"/>
+              <a:gd name="connsiteX8" fmla="*/ 388345 w 2203108"/>
+              <a:gd name="connsiteY8" fmla="*/ 23946 h 941723"/>
+              <a:gd name="connsiteX9" fmla="*/ 44175 w 2203108"/>
+              <a:gd name="connsiteY9" fmla="*/ 222066 h 941723"/>
+              <a:gd name="connsiteX0" fmla="*/ 47500 w 2206433"/>
+              <a:gd name="connsiteY0" fmla="*/ 222066 h 941723"/>
+              <a:gd name="connsiteX1" fmla="*/ 45595 w 2206433"/>
+              <a:gd name="connsiteY1" fmla="*/ 581476 h 941723"/>
+              <a:gd name="connsiteX2" fmla="*/ 444375 w 2206433"/>
+              <a:gd name="connsiteY2" fmla="*/ 863416 h 941723"/>
+              <a:gd name="connsiteX3" fmla="*/ 1064135 w 2206433"/>
+              <a:gd name="connsiteY3" fmla="*/ 858336 h 941723"/>
+              <a:gd name="connsiteX4" fmla="*/ 2003935 w 2206433"/>
+              <a:gd name="connsiteY4" fmla="*/ 914216 h 941723"/>
+              <a:gd name="connsiteX5" fmla="*/ 2202055 w 2206433"/>
+              <a:gd name="connsiteY5" fmla="*/ 360496 h 941723"/>
+              <a:gd name="connsiteX6" fmla="*/ 1902335 w 2206433"/>
+              <a:gd name="connsiteY6" fmla="*/ 25216 h 941723"/>
+              <a:gd name="connsiteX7" fmla="*/ 850775 w 2206433"/>
+              <a:gd name="connsiteY7" fmla="*/ 25216 h 941723"/>
+              <a:gd name="connsiteX8" fmla="*/ 391670 w 2206433"/>
+              <a:gd name="connsiteY8" fmla="*/ 23946 h 941723"/>
+              <a:gd name="connsiteX9" fmla="*/ 47500 w 2206433"/>
+              <a:gd name="connsiteY9" fmla="*/ 222066 h 941723"/>
+              <a:gd name="connsiteX0" fmla="*/ 45156 w 2204089"/>
+              <a:gd name="connsiteY0" fmla="*/ 222066 h 942144"/>
+              <a:gd name="connsiteX1" fmla="*/ 43251 w 2204089"/>
+              <a:gd name="connsiteY1" fmla="*/ 581476 h 942144"/>
+              <a:gd name="connsiteX2" fmla="*/ 405836 w 2204089"/>
+              <a:gd name="connsiteY2" fmla="*/ 844366 h 942144"/>
+              <a:gd name="connsiteX3" fmla="*/ 1061791 w 2204089"/>
+              <a:gd name="connsiteY3" fmla="*/ 858336 h 942144"/>
+              <a:gd name="connsiteX4" fmla="*/ 2001591 w 2204089"/>
+              <a:gd name="connsiteY4" fmla="*/ 914216 h 942144"/>
+              <a:gd name="connsiteX5" fmla="*/ 2199711 w 2204089"/>
+              <a:gd name="connsiteY5" fmla="*/ 360496 h 942144"/>
+              <a:gd name="connsiteX6" fmla="*/ 1899991 w 2204089"/>
+              <a:gd name="connsiteY6" fmla="*/ 25216 h 942144"/>
+              <a:gd name="connsiteX7" fmla="*/ 848431 w 2204089"/>
+              <a:gd name="connsiteY7" fmla="*/ 25216 h 942144"/>
+              <a:gd name="connsiteX8" fmla="*/ 389326 w 2204089"/>
+              <a:gd name="connsiteY8" fmla="*/ 23946 h 942144"/>
+              <a:gd name="connsiteX9" fmla="*/ 45156 w 2204089"/>
+              <a:gd name="connsiteY9" fmla="*/ 222066 h 942144"/>
+              <a:gd name="connsiteX0" fmla="*/ 45156 w 2204110"/>
+              <a:gd name="connsiteY0" fmla="*/ 222066 h 938299"/>
+              <a:gd name="connsiteX1" fmla="*/ 43251 w 2204110"/>
+              <a:gd name="connsiteY1" fmla="*/ 581476 h 938299"/>
+              <a:gd name="connsiteX2" fmla="*/ 405836 w 2204110"/>
+              <a:gd name="connsiteY2" fmla="*/ 844366 h 938299"/>
+              <a:gd name="connsiteX3" fmla="*/ 1059886 w 2204110"/>
+              <a:gd name="connsiteY3" fmla="*/ 839286 h 938299"/>
+              <a:gd name="connsiteX4" fmla="*/ 2001591 w 2204110"/>
+              <a:gd name="connsiteY4" fmla="*/ 914216 h 938299"/>
+              <a:gd name="connsiteX5" fmla="*/ 2199711 w 2204110"/>
+              <a:gd name="connsiteY5" fmla="*/ 360496 h 938299"/>
+              <a:gd name="connsiteX6" fmla="*/ 1899991 w 2204110"/>
+              <a:gd name="connsiteY6" fmla="*/ 25216 h 938299"/>
+              <a:gd name="connsiteX7" fmla="*/ 848431 w 2204110"/>
+              <a:gd name="connsiteY7" fmla="*/ 25216 h 938299"/>
+              <a:gd name="connsiteX8" fmla="*/ 389326 w 2204110"/>
+              <a:gd name="connsiteY8" fmla="*/ 23946 h 938299"/>
+              <a:gd name="connsiteX9" fmla="*/ 45156 w 2204110"/>
+              <a:gd name="connsiteY9" fmla="*/ 222066 h 938299"/>
+              <a:gd name="connsiteX0" fmla="*/ 45156 w 2206360"/>
+              <a:gd name="connsiteY0" fmla="*/ 220679 h 936912"/>
+              <a:gd name="connsiteX1" fmla="*/ 43251 w 2206360"/>
+              <a:gd name="connsiteY1" fmla="*/ 580089 h 936912"/>
+              <a:gd name="connsiteX2" fmla="*/ 405836 w 2206360"/>
+              <a:gd name="connsiteY2" fmla="*/ 842979 h 936912"/>
+              <a:gd name="connsiteX3" fmla="*/ 1059886 w 2206360"/>
+              <a:gd name="connsiteY3" fmla="*/ 837899 h 936912"/>
+              <a:gd name="connsiteX4" fmla="*/ 2001591 w 2206360"/>
+              <a:gd name="connsiteY4" fmla="*/ 912829 h 936912"/>
+              <a:gd name="connsiteX5" fmla="*/ 2199711 w 2206360"/>
+              <a:gd name="connsiteY5" fmla="*/ 359109 h 936912"/>
+              <a:gd name="connsiteX6" fmla="*/ 1861891 w 2206360"/>
+              <a:gd name="connsiteY6" fmla="*/ 25734 h 936912"/>
+              <a:gd name="connsiteX7" fmla="*/ 848431 w 2206360"/>
+              <a:gd name="connsiteY7" fmla="*/ 23829 h 936912"/>
+              <a:gd name="connsiteX8" fmla="*/ 389326 w 2206360"/>
+              <a:gd name="connsiteY8" fmla="*/ 22559 h 936912"/>
+              <a:gd name="connsiteX9" fmla="*/ 45156 w 2206360"/>
+              <a:gd name="connsiteY9" fmla="*/ 220679 h 936912"/>
+              <a:gd name="connsiteX0" fmla="*/ 45156 w 2199724"/>
+              <a:gd name="connsiteY0" fmla="*/ 220679 h 936912"/>
+              <a:gd name="connsiteX1" fmla="*/ 43251 w 2199724"/>
+              <a:gd name="connsiteY1" fmla="*/ 580089 h 936912"/>
+              <a:gd name="connsiteX2" fmla="*/ 405836 w 2199724"/>
+              <a:gd name="connsiteY2" fmla="*/ 842979 h 936912"/>
+              <a:gd name="connsiteX3" fmla="*/ 1059886 w 2199724"/>
+              <a:gd name="connsiteY3" fmla="*/ 837899 h 936912"/>
+              <a:gd name="connsiteX4" fmla="*/ 2001591 w 2199724"/>
+              <a:gd name="connsiteY4" fmla="*/ 912829 h 936912"/>
+              <a:gd name="connsiteX5" fmla="*/ 2199711 w 2199724"/>
+              <a:gd name="connsiteY5" fmla="*/ 359109 h 936912"/>
+              <a:gd name="connsiteX6" fmla="*/ 1861891 w 2199724"/>
+              <a:gd name="connsiteY6" fmla="*/ 25734 h 936912"/>
+              <a:gd name="connsiteX7" fmla="*/ 848431 w 2199724"/>
+              <a:gd name="connsiteY7" fmla="*/ 23829 h 936912"/>
+              <a:gd name="connsiteX8" fmla="*/ 389326 w 2199724"/>
+              <a:gd name="connsiteY8" fmla="*/ 22559 h 936912"/>
+              <a:gd name="connsiteX9" fmla="*/ 45156 w 2199724"/>
+              <a:gd name="connsiteY9" fmla="*/ 220679 h 936912"/>
+              <a:gd name="connsiteX0" fmla="*/ 45156 w 2194017"/>
+              <a:gd name="connsiteY0" fmla="*/ 228855 h 937907"/>
+              <a:gd name="connsiteX1" fmla="*/ 43251 w 2194017"/>
+              <a:gd name="connsiteY1" fmla="*/ 588265 h 937907"/>
+              <a:gd name="connsiteX2" fmla="*/ 405836 w 2194017"/>
+              <a:gd name="connsiteY2" fmla="*/ 851155 h 937907"/>
+              <a:gd name="connsiteX3" fmla="*/ 1059886 w 2194017"/>
+              <a:gd name="connsiteY3" fmla="*/ 846075 h 937907"/>
+              <a:gd name="connsiteX4" fmla="*/ 2001591 w 2194017"/>
+              <a:gd name="connsiteY4" fmla="*/ 921005 h 937907"/>
+              <a:gd name="connsiteX5" fmla="*/ 2193996 w 2194017"/>
+              <a:gd name="connsiteY5" fmla="*/ 477775 h 937907"/>
+              <a:gd name="connsiteX6" fmla="*/ 1861891 w 2194017"/>
+              <a:gd name="connsiteY6" fmla="*/ 33910 h 937907"/>
+              <a:gd name="connsiteX7" fmla="*/ 848431 w 2194017"/>
+              <a:gd name="connsiteY7" fmla="*/ 32005 h 937907"/>
+              <a:gd name="connsiteX8" fmla="*/ 389326 w 2194017"/>
+              <a:gd name="connsiteY8" fmla="*/ 30735 h 937907"/>
+              <a:gd name="connsiteX9" fmla="*/ 45156 w 2194017"/>
+              <a:gd name="connsiteY9" fmla="*/ 228855 h 937907"/>
+              <a:gd name="connsiteX0" fmla="*/ 45156 w 2194489"/>
+              <a:gd name="connsiteY0" fmla="*/ 228855 h 937907"/>
+              <a:gd name="connsiteX1" fmla="*/ 43251 w 2194489"/>
+              <a:gd name="connsiteY1" fmla="*/ 588265 h 937907"/>
+              <a:gd name="connsiteX2" fmla="*/ 405836 w 2194489"/>
+              <a:gd name="connsiteY2" fmla="*/ 851155 h 937907"/>
+              <a:gd name="connsiteX3" fmla="*/ 1059886 w 2194489"/>
+              <a:gd name="connsiteY3" fmla="*/ 846075 h 937907"/>
+              <a:gd name="connsiteX4" fmla="*/ 2001591 w 2194489"/>
+              <a:gd name="connsiteY4" fmla="*/ 921005 h 937907"/>
+              <a:gd name="connsiteX5" fmla="*/ 2193996 w 2194489"/>
+              <a:gd name="connsiteY5" fmla="*/ 477775 h 937907"/>
+              <a:gd name="connsiteX6" fmla="*/ 1861891 w 2194489"/>
+              <a:gd name="connsiteY6" fmla="*/ 33910 h 937907"/>
+              <a:gd name="connsiteX7" fmla="*/ 848431 w 2194489"/>
+              <a:gd name="connsiteY7" fmla="*/ 32005 h 937907"/>
+              <a:gd name="connsiteX8" fmla="*/ 389326 w 2194489"/>
+              <a:gd name="connsiteY8" fmla="*/ 30735 h 937907"/>
+              <a:gd name="connsiteX9" fmla="*/ 45156 w 2194489"/>
+              <a:gd name="connsiteY9" fmla="*/ 228855 h 937907"/>
+              <a:gd name="connsiteX0" fmla="*/ 45156 w 2196388"/>
+              <a:gd name="connsiteY0" fmla="*/ 225331 h 937436"/>
+              <a:gd name="connsiteX1" fmla="*/ 43251 w 2196388"/>
+              <a:gd name="connsiteY1" fmla="*/ 584741 h 937436"/>
+              <a:gd name="connsiteX2" fmla="*/ 405836 w 2196388"/>
+              <a:gd name="connsiteY2" fmla="*/ 847631 h 937436"/>
+              <a:gd name="connsiteX3" fmla="*/ 1059886 w 2196388"/>
+              <a:gd name="connsiteY3" fmla="*/ 842551 h 937436"/>
+              <a:gd name="connsiteX4" fmla="*/ 2001591 w 2196388"/>
+              <a:gd name="connsiteY4" fmla="*/ 917481 h 937436"/>
+              <a:gd name="connsiteX5" fmla="*/ 2195901 w 2196388"/>
+              <a:gd name="connsiteY5" fmla="*/ 426626 h 937436"/>
+              <a:gd name="connsiteX6" fmla="*/ 1861891 w 2196388"/>
+              <a:gd name="connsiteY6" fmla="*/ 30386 h 937436"/>
+              <a:gd name="connsiteX7" fmla="*/ 848431 w 2196388"/>
+              <a:gd name="connsiteY7" fmla="*/ 28481 h 937436"/>
+              <a:gd name="connsiteX8" fmla="*/ 389326 w 2196388"/>
+              <a:gd name="connsiteY8" fmla="*/ 27211 h 937436"/>
+              <a:gd name="connsiteX9" fmla="*/ 45156 w 2196388"/>
+              <a:gd name="connsiteY9" fmla="*/ 225331 h 937436"/>
+              <a:gd name="connsiteX0" fmla="*/ 45156 w 2196863"/>
+              <a:gd name="connsiteY0" fmla="*/ 225331 h 945006"/>
+              <a:gd name="connsiteX1" fmla="*/ 43251 w 2196863"/>
+              <a:gd name="connsiteY1" fmla="*/ 584741 h 945006"/>
+              <a:gd name="connsiteX2" fmla="*/ 405836 w 2196863"/>
+              <a:gd name="connsiteY2" fmla="*/ 847631 h 945006"/>
+              <a:gd name="connsiteX3" fmla="*/ 1059886 w 2196863"/>
+              <a:gd name="connsiteY3" fmla="*/ 842551 h 945006"/>
+              <a:gd name="connsiteX4" fmla="*/ 2001591 w 2196863"/>
+              <a:gd name="connsiteY4" fmla="*/ 917481 h 945006"/>
+              <a:gd name="connsiteX5" fmla="*/ 2195901 w 2196863"/>
+              <a:gd name="connsiteY5" fmla="*/ 426626 h 945006"/>
+              <a:gd name="connsiteX6" fmla="*/ 1861891 w 2196863"/>
+              <a:gd name="connsiteY6" fmla="*/ 30386 h 945006"/>
+              <a:gd name="connsiteX7" fmla="*/ 848431 w 2196863"/>
+              <a:gd name="connsiteY7" fmla="*/ 28481 h 945006"/>
+              <a:gd name="connsiteX8" fmla="*/ 389326 w 2196863"/>
+              <a:gd name="connsiteY8" fmla="*/ 27211 h 945006"/>
+              <a:gd name="connsiteX9" fmla="*/ 45156 w 2196863"/>
+              <a:gd name="connsiteY9" fmla="*/ 225331 h 945006"/>
+              <a:gd name="connsiteX0" fmla="*/ 45156 w 2201145"/>
+              <a:gd name="connsiteY0" fmla="*/ 225331 h 923215"/>
+              <a:gd name="connsiteX1" fmla="*/ 43251 w 2201145"/>
+              <a:gd name="connsiteY1" fmla="*/ 584741 h 923215"/>
+              <a:gd name="connsiteX2" fmla="*/ 405836 w 2201145"/>
+              <a:gd name="connsiteY2" fmla="*/ 847631 h 923215"/>
+              <a:gd name="connsiteX3" fmla="*/ 1059886 w 2201145"/>
+              <a:gd name="connsiteY3" fmla="*/ 842551 h 923215"/>
+              <a:gd name="connsiteX4" fmla="*/ 1957776 w 2201145"/>
+              <a:gd name="connsiteY4" fmla="*/ 892716 h 923215"/>
+              <a:gd name="connsiteX5" fmla="*/ 2195901 w 2201145"/>
+              <a:gd name="connsiteY5" fmla="*/ 426626 h 923215"/>
+              <a:gd name="connsiteX6" fmla="*/ 1861891 w 2201145"/>
+              <a:gd name="connsiteY6" fmla="*/ 30386 h 923215"/>
+              <a:gd name="connsiteX7" fmla="*/ 848431 w 2201145"/>
+              <a:gd name="connsiteY7" fmla="*/ 28481 h 923215"/>
+              <a:gd name="connsiteX8" fmla="*/ 389326 w 2201145"/>
+              <a:gd name="connsiteY8" fmla="*/ 27211 h 923215"/>
+              <a:gd name="connsiteX9" fmla="*/ 45156 w 2201145"/>
+              <a:gd name="connsiteY9" fmla="*/ 225331 h 923215"/>
+            </a:gdLst>
+            <a:ahLst/>
+            <a:cxnLst>
+              <a:cxn ang="0">
+                <a:pos x="connsiteX0" y="connsiteY0"/>
+              </a:cxn>
+              <a:cxn ang="0">
+                <a:pos x="connsiteX1" y="connsiteY1"/>
+              </a:cxn>
+              <a:cxn ang="0">
+                <a:pos x="connsiteX2" y="connsiteY2"/>
+              </a:cxn>
+              <a:cxn ang="0">
+                <a:pos x="connsiteX3" y="connsiteY3"/>
+              </a:cxn>
+              <a:cxn ang="0">
+                <a:pos x="connsiteX4" y="connsiteY4"/>
+              </a:cxn>
+              <a:cxn ang="0">
+                <a:pos x="connsiteX5" y="connsiteY5"/>
+              </a:cxn>
+              <a:cxn ang="0">
+                <a:pos x="connsiteX6" y="connsiteY6"/>
+              </a:cxn>
+              <a:cxn ang="0">
+                <a:pos x="connsiteX7" y="connsiteY7"/>
+              </a:cxn>
+              <a:cxn ang="0">
+                <a:pos x="connsiteX8" y="connsiteY8"/>
+              </a:cxn>
+              <a:cxn ang="0">
+                <a:pos x="connsiteX9" y="connsiteY9"/>
+              </a:cxn>
+            </a:cxnLst>
+            <a:rect l="l" t="t" r="r" b="b"/>
+            <a:pathLst>
+              <a:path w="2201145" h="923215">
+                <a:moveTo>
+                  <a:pt x="45156" y="225331"/>
+                </a:moveTo>
+                <a:cubicBezTo>
+                  <a:pt x="-12523" y="318253"/>
+                  <a:pt x="-16862" y="481024"/>
+                  <a:pt x="43251" y="584741"/>
+                </a:cubicBezTo>
+                <a:cubicBezTo>
+                  <a:pt x="103364" y="688458"/>
+                  <a:pt x="236397" y="804663"/>
+                  <a:pt x="405836" y="847631"/>
+                </a:cubicBezTo>
+                <a:cubicBezTo>
+                  <a:pt x="575275" y="890599"/>
+                  <a:pt x="801230" y="835037"/>
+                  <a:pt x="1059886" y="842551"/>
+                </a:cubicBezTo>
+                <a:cubicBezTo>
+                  <a:pt x="1318542" y="850065"/>
+                  <a:pt x="1709385" y="981087"/>
+                  <a:pt x="1957776" y="892716"/>
+                </a:cubicBezTo>
+                <a:cubicBezTo>
+                  <a:pt x="2206167" y="804345"/>
+                  <a:pt x="2211882" y="570348"/>
+                  <a:pt x="2195901" y="426626"/>
+                </a:cubicBezTo>
+                <a:cubicBezTo>
+                  <a:pt x="2179920" y="282904"/>
+                  <a:pt x="2086469" y="96743"/>
+                  <a:pt x="1861891" y="30386"/>
+                </a:cubicBezTo>
+                <a:cubicBezTo>
+                  <a:pt x="1637313" y="-35971"/>
+                  <a:pt x="1120211" y="26788"/>
+                  <a:pt x="848431" y="28481"/>
+                </a:cubicBezTo>
+                <a:cubicBezTo>
+                  <a:pt x="576651" y="30174"/>
+                  <a:pt x="559400" y="2023"/>
+                  <a:pt x="389326" y="27211"/>
+                </a:cubicBezTo>
+                <a:cubicBezTo>
+                  <a:pt x="219252" y="52399"/>
+                  <a:pt x="102835" y="132409"/>
+                  <a:pt x="45156" y="225331"/>
+                </a:cubicBezTo>
+                <a:close/>
+              </a:path>
+            </a:pathLst>
+          </a:custGeom>
+          <a:noFill/>
+          <a:ln w="38100"/>
+        </p:spPr>
+        <p:style>
+          <a:lnRef idx="2">
+            <a:schemeClr val="accent1">
+              <a:shade val="50000"/>
+            </a:schemeClr>
+          </a:lnRef>
+          <a:fillRef idx="1">
+            <a:schemeClr val="accent1"/>
+          </a:fillRef>
+          <a:effectRef idx="0">
+            <a:schemeClr val="accent1"/>
+          </a:effectRef>
+          <a:fontRef idx="minor">
+            <a:schemeClr val="lt1"/>
+          </a:fontRef>
+        </p:style>
+        <p:txBody>
+          <a:bodyPr rtlCol="0" anchor="ctr"/>
+          <a:lstStyle/>
+          <a:p>
+            <a:pPr algn="ctr"/>
+            <a:endParaRPr lang="en-US"/>
+          </a:p>
+        </p:txBody>
+      </p:sp>
       <p:grpSp>
         <p:nvGrpSpPr>
           <p:cNvPr id="19" name="Group 18"/>
@@ -6638,6 +7309,236 @@
           </a:p>
         </p:txBody>
       </p:sp>
+      <p:cxnSp>
+        <p:nvCxnSpPr>
+          <p:cNvPr id="8" name="Straight Connector 7"/>
+          <p:cNvCxnSpPr/>
+          <p:nvPr/>
+        </p:nvCxnSpPr>
+        <p:spPr>
+          <a:xfrm>
+            <a:off x="7382421" y="1820091"/>
+            <a:ext cx="1201783" cy="26126"/>
+          </a:xfrm>
+          <a:prstGeom prst="line">
+            <a:avLst/>
+          </a:prstGeom>
+          <a:ln w="57150">
+            <a:solidFill>
+              <a:srgbClr val="FF0000"/>
+            </a:solidFill>
+          </a:ln>
+        </p:spPr>
+        <p:style>
+          <a:lnRef idx="1">
+            <a:schemeClr val="accent1"/>
+          </a:lnRef>
+          <a:fillRef idx="0">
+            <a:schemeClr val="accent1"/>
+          </a:fillRef>
+          <a:effectRef idx="0">
+            <a:schemeClr val="accent1"/>
+          </a:effectRef>
+          <a:fontRef idx="minor">
+            <a:schemeClr val="tx1"/>
+          </a:fontRef>
+        </p:style>
+      </p:cxnSp>
+      <p:cxnSp>
+        <p:nvCxnSpPr>
+          <p:cNvPr id="41" name="Straight Connector 40"/>
+          <p:cNvCxnSpPr/>
+          <p:nvPr/>
+        </p:nvCxnSpPr>
+        <p:spPr>
+          <a:xfrm flipV="1">
+            <a:off x="8717949" y="1698171"/>
+            <a:ext cx="1166280" cy="148046"/>
+          </a:xfrm>
+          <a:prstGeom prst="line">
+            <a:avLst/>
+          </a:prstGeom>
+          <a:ln w="57150">
+            <a:solidFill>
+              <a:srgbClr val="FF0000"/>
+            </a:solidFill>
+          </a:ln>
+        </p:spPr>
+        <p:style>
+          <a:lnRef idx="1">
+            <a:schemeClr val="accent1"/>
+          </a:lnRef>
+          <a:fillRef idx="0">
+            <a:schemeClr val="accent1"/>
+          </a:fillRef>
+          <a:effectRef idx="0">
+            <a:schemeClr val="accent1"/>
+          </a:effectRef>
+          <a:fontRef idx="minor">
+            <a:schemeClr val="tx1"/>
+          </a:fontRef>
+        </p:style>
+      </p:cxnSp>
+      <p:cxnSp>
+        <p:nvCxnSpPr>
+          <p:cNvPr id="43" name="Straight Connector 42"/>
+          <p:cNvCxnSpPr/>
+          <p:nvPr/>
+        </p:nvCxnSpPr>
+        <p:spPr>
+          <a:xfrm flipV="1">
+            <a:off x="1631916" y="3424601"/>
+            <a:ext cx="3667496" cy="332785"/>
+          </a:xfrm>
+          <a:prstGeom prst="line">
+            <a:avLst/>
+          </a:prstGeom>
+          <a:ln w="57150">
+            <a:solidFill>
+              <a:schemeClr val="accent4">
+                <a:lumMod val="75000"/>
+              </a:schemeClr>
+            </a:solidFill>
+          </a:ln>
+        </p:spPr>
+        <p:style>
+          <a:lnRef idx="1">
+            <a:schemeClr val="accent1"/>
+          </a:lnRef>
+          <a:fillRef idx="0">
+            <a:schemeClr val="accent1"/>
+          </a:fillRef>
+          <a:effectRef idx="0">
+            <a:schemeClr val="accent1"/>
+          </a:effectRef>
+          <a:fontRef idx="minor">
+            <a:schemeClr val="tx1"/>
+          </a:fontRef>
+        </p:style>
+      </p:cxnSp>
+      <p:sp>
+        <p:nvSpPr>
+          <p:cNvPr id="31" name="Oval 30"/>
+          <p:cNvSpPr/>
+          <p:nvPr/>
+        </p:nvSpPr>
+        <p:spPr>
+          <a:xfrm>
+            <a:off x="2766325" y="3546907"/>
+            <a:ext cx="204255" cy="180549"/>
+          </a:xfrm>
+          <a:prstGeom prst="ellipse">
+            <a:avLst/>
+          </a:prstGeom>
+          <a:solidFill>
+            <a:schemeClr val="tx1"/>
+          </a:solidFill>
+        </p:spPr>
+        <p:style>
+          <a:lnRef idx="2">
+            <a:schemeClr val="accent1">
+              <a:shade val="50000"/>
+            </a:schemeClr>
+          </a:lnRef>
+          <a:fillRef idx="1">
+            <a:schemeClr val="accent1"/>
+          </a:fillRef>
+          <a:effectRef idx="0">
+            <a:schemeClr val="accent1"/>
+          </a:effectRef>
+          <a:fontRef idx="minor">
+            <a:schemeClr val="lt1"/>
+          </a:fontRef>
+        </p:style>
+        <p:txBody>
+          <a:bodyPr rtlCol="0" anchor="ctr"/>
+          <a:lstStyle/>
+          <a:p>
+            <a:pPr algn="ctr"/>
+            <a:endParaRPr lang="en-US"/>
+          </a:p>
+        </p:txBody>
+      </p:sp>
+      <p:cxnSp>
+        <p:nvCxnSpPr>
+          <p:cNvPr id="44" name="Straight Arrow Connector 43"/>
+          <p:cNvCxnSpPr/>
+          <p:nvPr/>
+        </p:nvCxnSpPr>
+        <p:spPr>
+          <a:xfrm flipH="1" flipV="1">
+            <a:off x="2949252" y="3718349"/>
+            <a:ext cx="931205" cy="1230117"/>
+          </a:xfrm>
+          <a:prstGeom prst="straightConnector1">
+            <a:avLst/>
+          </a:prstGeom>
+          <a:ln>
+            <a:solidFill>
+              <a:schemeClr val="tx1"/>
+            </a:solidFill>
+            <a:tailEnd type="triangle"/>
+          </a:ln>
+        </p:spPr>
+        <p:style>
+          <a:lnRef idx="1">
+            <a:schemeClr val="accent1"/>
+          </a:lnRef>
+          <a:fillRef idx="0">
+            <a:schemeClr val="accent1"/>
+          </a:fillRef>
+          <a:effectRef idx="0">
+            <a:schemeClr val="accent1"/>
+          </a:effectRef>
+          <a:fontRef idx="minor">
+            <a:schemeClr val="tx1"/>
+          </a:fontRef>
+        </p:style>
+      </p:cxnSp>
+      <p:sp>
+        <p:nvSpPr>
+          <p:cNvPr id="46" name="TextBox 45"/>
+          <p:cNvSpPr txBox="1"/>
+          <p:nvPr/>
+        </p:nvSpPr>
+        <p:spPr>
+          <a:xfrm>
+            <a:off x="3847375" y="4733767"/>
+            <a:ext cx="787588" cy="646331"/>
+          </a:xfrm>
+          <a:prstGeom prst="rect">
+            <a:avLst/>
+          </a:prstGeom>
+          <a:noFill/>
+        </p:spPr>
+        <p:txBody>
+          <a:bodyPr wrap="none" rtlCol="0">
+            <a:spAutoFit/>
+          </a:bodyPr>
+          <a:lstStyle/>
+          <a:p>
+            <a:r>
+              <a:rPr lang="de-DE" dirty="0" err="1"/>
+              <a:t>c</a:t>
+            </a:r>
+            <a:r>
+              <a:rPr lang="de-DE" dirty="0" err="1" smtClean="0"/>
+              <a:t>ircle</a:t>
+            </a:r>
+            <a:r>
+              <a:rPr lang="de-DE" dirty="0" smtClean="0"/>
+              <a:t> </a:t>
+            </a:r>
+          </a:p>
+          <a:p>
+            <a:r>
+              <a:rPr lang="de-DE" dirty="0" err="1" smtClean="0"/>
+              <a:t>center</a:t>
+            </a:r>
+            <a:endParaRPr lang="en-US" dirty="0"/>
+          </a:p>
+        </p:txBody>
+      </p:sp>
     </p:spTree>
     <p:extLst>
       <p:ext uri="{BB962C8B-B14F-4D97-AF65-F5344CB8AC3E}">
@@ -6658,7 +7559,1046 @@
 </p:sld>
 </file>
 
-<file path=ppt/slides/slide2.xml><?xml version="1.0" encoding="utf-8"?>
+<file path=ppt/slides/slide3.xml><?xml version="1.0" encoding="utf-8"?>
+<p:sld xmlns:a="http://schemas.openxmlformats.org/drawingml/2006/main" xmlns:r="http://schemas.openxmlformats.org/officeDocument/2006/relationships" xmlns:p="http://schemas.openxmlformats.org/presentationml/2006/main">
+  <p:cSld>
+    <p:spTree>
+      <p:nvGrpSpPr>
+        <p:cNvPr id="1" name=""/>
+        <p:cNvGrpSpPr/>
+        <p:nvPr/>
+      </p:nvGrpSpPr>
+      <p:grpSpPr>
+        <a:xfrm>
+          <a:off x="0" y="0"/>
+          <a:ext cx="0" cy="0"/>
+          <a:chOff x="0" y="0"/>
+          <a:chExt cx="0" cy="0"/>
+        </a:xfrm>
+      </p:grpSpPr>
+      <p:sp>
+        <p:nvSpPr>
+          <p:cNvPr id="4" name="TextBox 3"/>
+          <p:cNvSpPr txBox="1"/>
+          <p:nvPr/>
+        </p:nvSpPr>
+        <p:spPr>
+          <a:xfrm>
+            <a:off x="228600" y="205740"/>
+            <a:ext cx="6970626" cy="646331"/>
+          </a:xfrm>
+          <a:prstGeom prst="rect">
+            <a:avLst/>
+          </a:prstGeom>
+          <a:noFill/>
+        </p:spPr>
+        <p:txBody>
+          <a:bodyPr wrap="none" rtlCol="0">
+            <a:spAutoFit/>
+          </a:bodyPr>
+          <a:lstStyle/>
+          <a:p>
+            <a:r>
+              <a:rPr lang="de-DE" dirty="0" smtClean="0"/>
+              <a:t>Online </a:t>
+            </a:r>
+            <a:r>
+              <a:rPr lang="de-DE" dirty="0" err="1" smtClean="0"/>
+              <a:t>Documentation</a:t>
+            </a:r>
+            <a:r>
+              <a:rPr lang="de-DE" dirty="0" smtClean="0"/>
+              <a:t>:</a:t>
+            </a:r>
+          </a:p>
+          <a:p>
+            <a:r>
+              <a:rPr lang="de-DE" dirty="0" smtClean="0">
+                <a:hlinkClick r:id="rId2"/>
+              </a:rPr>
+              <a:t>http://doc.aldebaran.com/2-4/family/pepper_technical/joints_pep.html</a:t>
+            </a:r>
+            <a:r>
+              <a:rPr lang="de-DE" dirty="0" smtClean="0"/>
+              <a:t> </a:t>
+            </a:r>
+          </a:p>
+        </p:txBody>
+      </p:sp>
+      <p:sp>
+        <p:nvSpPr>
+          <p:cNvPr id="11" name="Oval 10"/>
+          <p:cNvSpPr/>
+          <p:nvPr/>
+        </p:nvSpPr>
+        <p:spPr>
+          <a:xfrm>
+            <a:off x="2682240" y="912880"/>
+            <a:ext cx="5214720" cy="5214720"/>
+          </a:xfrm>
+          <a:prstGeom prst="ellipse">
+            <a:avLst/>
+          </a:prstGeom>
+          <a:noFill/>
+          <a:ln w="28575">
+            <a:solidFill>
+              <a:srgbClr val="FF0000"/>
+            </a:solidFill>
+          </a:ln>
+        </p:spPr>
+        <p:style>
+          <a:lnRef idx="2">
+            <a:schemeClr val="accent1">
+              <a:shade val="50000"/>
+            </a:schemeClr>
+          </a:lnRef>
+          <a:fillRef idx="1">
+            <a:schemeClr val="accent1"/>
+          </a:fillRef>
+          <a:effectRef idx="0">
+            <a:schemeClr val="accent1"/>
+          </a:effectRef>
+          <a:fontRef idx="minor">
+            <a:schemeClr val="lt1"/>
+          </a:fontRef>
+        </p:style>
+        <p:txBody>
+          <a:bodyPr rtlCol="0" anchor="ctr"/>
+          <a:lstStyle/>
+          <a:p>
+            <a:pPr algn="ctr"/>
+            <a:endParaRPr lang="en-US"/>
+          </a:p>
+        </p:txBody>
+      </p:sp>
+      <p:sp>
+        <p:nvSpPr>
+          <p:cNvPr id="14" name="Oval 13"/>
+          <p:cNvSpPr/>
+          <p:nvPr/>
+        </p:nvSpPr>
+        <p:spPr>
+          <a:xfrm>
+            <a:off x="55127" y="2214116"/>
+            <a:ext cx="3130044" cy="3130044"/>
+          </a:xfrm>
+          <a:prstGeom prst="ellipse">
+            <a:avLst/>
+          </a:prstGeom>
+          <a:noFill/>
+          <a:ln w="28575">
+            <a:solidFill>
+              <a:srgbClr val="0070C0"/>
+            </a:solidFill>
+          </a:ln>
+        </p:spPr>
+        <p:style>
+          <a:lnRef idx="2">
+            <a:schemeClr val="accent1">
+              <a:shade val="50000"/>
+            </a:schemeClr>
+          </a:lnRef>
+          <a:fillRef idx="1">
+            <a:schemeClr val="accent1"/>
+          </a:fillRef>
+          <a:effectRef idx="0">
+            <a:schemeClr val="accent1"/>
+          </a:effectRef>
+          <a:fontRef idx="minor">
+            <a:schemeClr val="lt1"/>
+          </a:fontRef>
+        </p:style>
+        <p:txBody>
+          <a:bodyPr rtlCol="0" anchor="ctr"/>
+          <a:lstStyle/>
+          <a:p>
+            <a:pPr algn="ctr"/>
+            <a:endParaRPr lang="en-US"/>
+          </a:p>
+        </p:txBody>
+      </p:sp>
+      <p:pic>
+        <p:nvPicPr>
+          <p:cNvPr id="5" name="Picture 4"/>
+          <p:cNvPicPr>
+            <a:picLocks noChangeAspect="1"/>
+          </p:cNvPicPr>
+          <p:nvPr/>
+        </p:nvPicPr>
+        <p:blipFill>
+          <a:blip r:embed="rId3">
+            <a:extLst>
+              <a:ext uri="{28A0092B-C50C-407E-A947-70E740481C1C}">
+                <a14:useLocalDpi xmlns:a14="http://schemas.microsoft.com/office/drawing/2010/main" val="0"/>
+              </a:ext>
+            </a:extLst>
+          </a:blip>
+          <a:stretch>
+            <a:fillRect/>
+          </a:stretch>
+        </p:blipFill>
+        <p:spPr>
+          <a:xfrm>
+            <a:off x="6892547" y="1068060"/>
+            <a:ext cx="5049959" cy="5059540"/>
+          </a:xfrm>
+          <a:prstGeom prst="rect">
+            <a:avLst/>
+          </a:prstGeom>
+        </p:spPr>
+      </p:pic>
+      <p:sp>
+        <p:nvSpPr>
+          <p:cNvPr id="23" name="TextBox 22"/>
+          <p:cNvSpPr txBox="1"/>
+          <p:nvPr/>
+        </p:nvSpPr>
+        <p:spPr>
+          <a:xfrm>
+            <a:off x="4813405" y="2092196"/>
+            <a:ext cx="562975" cy="523220"/>
+          </a:xfrm>
+          <a:prstGeom prst="rect">
+            <a:avLst/>
+          </a:prstGeom>
+          <a:noFill/>
+        </p:spPr>
+        <p:txBody>
+          <a:bodyPr wrap="none" rtlCol="0">
+            <a:spAutoFit/>
+          </a:bodyPr>
+          <a:lstStyle/>
+          <a:p>
+            <a:r>
+              <a:rPr lang="de-DE" sz="2800" dirty="0" err="1" smtClean="0">
+                <a:solidFill>
+                  <a:srgbClr val="00B050"/>
+                </a:solidFill>
+              </a:rPr>
+              <a:t>up</a:t>
+            </a:r>
+            <a:endParaRPr lang="en-US" dirty="0">
+              <a:solidFill>
+                <a:srgbClr val="00B050"/>
+              </a:solidFill>
+            </a:endParaRPr>
+          </a:p>
+        </p:txBody>
+      </p:sp>
+      <p:sp>
+        <p:nvSpPr>
+          <p:cNvPr id="24" name="Oval 23"/>
+          <p:cNvSpPr/>
+          <p:nvPr/>
+        </p:nvSpPr>
+        <p:spPr>
+          <a:xfrm>
+            <a:off x="2677299" y="2627519"/>
+            <a:ext cx="247140" cy="247140"/>
+          </a:xfrm>
+          <a:prstGeom prst="ellipse">
+            <a:avLst/>
+          </a:prstGeom>
+          <a:solidFill>
+            <a:srgbClr val="FFFF00"/>
+          </a:solidFill>
+        </p:spPr>
+        <p:style>
+          <a:lnRef idx="2">
+            <a:schemeClr val="accent1">
+              <a:shade val="50000"/>
+            </a:schemeClr>
+          </a:lnRef>
+          <a:fillRef idx="1">
+            <a:schemeClr val="accent1"/>
+          </a:fillRef>
+          <a:effectRef idx="0">
+            <a:schemeClr val="accent1"/>
+          </a:effectRef>
+          <a:fontRef idx="minor">
+            <a:schemeClr val="lt1"/>
+          </a:fontRef>
+        </p:style>
+        <p:txBody>
+          <a:bodyPr rtlCol="0" anchor="ctr"/>
+          <a:lstStyle/>
+          <a:p>
+            <a:pPr algn="ctr"/>
+            <a:endParaRPr lang="en-US"/>
+          </a:p>
+        </p:txBody>
+      </p:sp>
+      <p:sp>
+        <p:nvSpPr>
+          <p:cNvPr id="25" name="Oval 24"/>
+          <p:cNvSpPr/>
+          <p:nvPr/>
+        </p:nvSpPr>
+        <p:spPr>
+          <a:xfrm>
+            <a:off x="2810780" y="4497350"/>
+            <a:ext cx="247140" cy="247140"/>
+          </a:xfrm>
+          <a:prstGeom prst="ellipse">
+            <a:avLst/>
+          </a:prstGeom>
+          <a:solidFill>
+            <a:srgbClr val="FFFF00"/>
+          </a:solidFill>
+        </p:spPr>
+        <p:style>
+          <a:lnRef idx="2">
+            <a:schemeClr val="accent1">
+              <a:shade val="50000"/>
+            </a:schemeClr>
+          </a:lnRef>
+          <a:fillRef idx="1">
+            <a:schemeClr val="accent1"/>
+          </a:fillRef>
+          <a:effectRef idx="0">
+            <a:schemeClr val="accent1"/>
+          </a:effectRef>
+          <a:fontRef idx="minor">
+            <a:schemeClr val="lt1"/>
+          </a:fontRef>
+        </p:style>
+        <p:txBody>
+          <a:bodyPr rtlCol="0" anchor="ctr"/>
+          <a:lstStyle/>
+          <a:p>
+            <a:pPr algn="ctr"/>
+            <a:endParaRPr lang="en-US"/>
+          </a:p>
+        </p:txBody>
+      </p:sp>
+      <p:sp>
+        <p:nvSpPr>
+          <p:cNvPr id="26" name="TextBox 25"/>
+          <p:cNvSpPr txBox="1"/>
+          <p:nvPr/>
+        </p:nvSpPr>
+        <p:spPr>
+          <a:xfrm>
+            <a:off x="3458639" y="2353806"/>
+            <a:ext cx="760849" cy="369332"/>
+          </a:xfrm>
+          <a:prstGeom prst="rect">
+            <a:avLst/>
+          </a:prstGeom>
+          <a:noFill/>
+        </p:spPr>
+        <p:txBody>
+          <a:bodyPr wrap="none" rtlCol="0">
+            <a:spAutoFit/>
+          </a:bodyPr>
+          <a:lstStyle/>
+          <a:p>
+            <a:r>
+              <a:rPr lang="de-DE" dirty="0" err="1" smtClean="0"/>
+              <a:t>elbow</a:t>
+            </a:r>
+            <a:endParaRPr lang="de-DE" dirty="0" smtClean="0"/>
+          </a:p>
+        </p:txBody>
+      </p:sp>
+      <p:cxnSp>
+        <p:nvCxnSpPr>
+          <p:cNvPr id="28" name="Straight Arrow Connector 27"/>
+          <p:cNvCxnSpPr>
+            <a:endCxn id="50" idx="7"/>
+          </p:cNvCxnSpPr>
+          <p:nvPr/>
+        </p:nvCxnSpPr>
+        <p:spPr>
+          <a:xfrm flipH="1">
+            <a:off x="2950207" y="2676971"/>
+            <a:ext cx="508433" cy="647284"/>
+          </a:xfrm>
+          <a:prstGeom prst="straightConnector1">
+            <a:avLst/>
+          </a:prstGeom>
+          <a:ln>
+            <a:solidFill>
+              <a:schemeClr val="tx1"/>
+            </a:solidFill>
+            <a:tailEnd type="triangle"/>
+          </a:ln>
+        </p:spPr>
+        <p:style>
+          <a:lnRef idx="1">
+            <a:schemeClr val="accent1"/>
+          </a:lnRef>
+          <a:fillRef idx="0">
+            <a:schemeClr val="accent1"/>
+          </a:fillRef>
+          <a:effectRef idx="0">
+            <a:schemeClr val="accent1"/>
+          </a:effectRef>
+          <a:fontRef idx="minor">
+            <a:schemeClr val="tx1"/>
+          </a:fontRef>
+        </p:style>
+      </p:cxnSp>
+      <p:cxnSp>
+        <p:nvCxnSpPr>
+          <p:cNvPr id="40" name="Straight Arrow Connector 39"/>
+          <p:cNvCxnSpPr/>
+          <p:nvPr/>
+        </p:nvCxnSpPr>
+        <p:spPr>
+          <a:xfrm flipH="1">
+            <a:off x="5299412" y="2300133"/>
+            <a:ext cx="616489" cy="1055943"/>
+          </a:xfrm>
+          <a:prstGeom prst="straightConnector1">
+            <a:avLst/>
+          </a:prstGeom>
+          <a:ln>
+            <a:solidFill>
+              <a:schemeClr val="tx1"/>
+            </a:solidFill>
+            <a:tailEnd type="triangle"/>
+          </a:ln>
+        </p:spPr>
+        <p:style>
+          <a:lnRef idx="1">
+            <a:schemeClr val="accent1"/>
+          </a:lnRef>
+          <a:fillRef idx="0">
+            <a:schemeClr val="accent1"/>
+          </a:fillRef>
+          <a:effectRef idx="0">
+            <a:schemeClr val="accent1"/>
+          </a:effectRef>
+          <a:fontRef idx="minor">
+            <a:schemeClr val="tx1"/>
+          </a:fontRef>
+        </p:style>
+      </p:cxnSp>
+      <p:sp>
+        <p:nvSpPr>
+          <p:cNvPr id="42" name="TextBox 41"/>
+          <p:cNvSpPr txBox="1"/>
+          <p:nvPr/>
+        </p:nvSpPr>
+        <p:spPr>
+          <a:xfrm>
+            <a:off x="5601396" y="1623397"/>
+            <a:ext cx="1264642" cy="646331"/>
+          </a:xfrm>
+          <a:prstGeom prst="rect">
+            <a:avLst/>
+          </a:prstGeom>
+          <a:noFill/>
+        </p:spPr>
+        <p:txBody>
+          <a:bodyPr wrap="none" rtlCol="0">
+            <a:spAutoFit/>
+          </a:bodyPr>
+          <a:lstStyle/>
+          <a:p>
+            <a:r>
+              <a:rPr lang="de-DE" dirty="0" err="1"/>
+              <a:t>t</a:t>
+            </a:r>
+            <a:r>
+              <a:rPr lang="de-DE" dirty="0" err="1" smtClean="0"/>
+              <a:t>ool</a:t>
+            </a:r>
+            <a:r>
+              <a:rPr lang="de-DE" dirty="0" smtClean="0"/>
+              <a:t> </a:t>
+            </a:r>
+            <a:r>
+              <a:rPr lang="de-DE" dirty="0" err="1" smtClean="0"/>
+              <a:t>center</a:t>
+            </a:r>
+            <a:r>
+              <a:rPr lang="de-DE" dirty="0" smtClean="0"/>
+              <a:t> </a:t>
+            </a:r>
+          </a:p>
+          <a:p>
+            <a:r>
+              <a:rPr lang="de-DE" dirty="0" err="1" smtClean="0"/>
+              <a:t>point</a:t>
+            </a:r>
+            <a:r>
+              <a:rPr lang="de-DE" dirty="0" smtClean="0"/>
+              <a:t> (TCP)</a:t>
+            </a:r>
+            <a:endParaRPr lang="en-US" dirty="0"/>
+          </a:p>
+        </p:txBody>
+      </p:sp>
+      <p:cxnSp>
+        <p:nvCxnSpPr>
+          <p:cNvPr id="47" name="Straight Connector 46"/>
+          <p:cNvCxnSpPr/>
+          <p:nvPr/>
+        </p:nvCxnSpPr>
+        <p:spPr>
+          <a:xfrm>
+            <a:off x="228600" y="3404291"/>
+            <a:ext cx="6241934" cy="0"/>
+          </a:xfrm>
+          <a:prstGeom prst="line">
+            <a:avLst/>
+          </a:prstGeom>
+          <a:ln w="28575">
+            <a:solidFill>
+              <a:schemeClr val="tx1"/>
+            </a:solidFill>
+            <a:prstDash val="dash"/>
+          </a:ln>
+        </p:spPr>
+        <p:style>
+          <a:lnRef idx="1">
+            <a:schemeClr val="accent1"/>
+          </a:lnRef>
+          <a:fillRef idx="0">
+            <a:schemeClr val="accent1"/>
+          </a:fillRef>
+          <a:effectRef idx="0">
+            <a:schemeClr val="accent1"/>
+          </a:effectRef>
+          <a:fontRef idx="minor">
+            <a:schemeClr val="tx1"/>
+          </a:fontRef>
+        </p:style>
+      </p:cxnSp>
+      <p:sp>
+        <p:nvSpPr>
+          <p:cNvPr id="49" name="TextBox 48"/>
+          <p:cNvSpPr txBox="1"/>
+          <p:nvPr/>
+        </p:nvSpPr>
+        <p:spPr>
+          <a:xfrm>
+            <a:off x="282298" y="3081125"/>
+            <a:ext cx="905120" cy="369332"/>
+          </a:xfrm>
+          <a:prstGeom prst="rect">
+            <a:avLst/>
+          </a:prstGeom>
+          <a:noFill/>
+        </p:spPr>
+        <p:txBody>
+          <a:bodyPr wrap="none" rtlCol="0">
+            <a:spAutoFit/>
+          </a:bodyPr>
+          <a:lstStyle/>
+          <a:p>
+            <a:r>
+              <a:rPr lang="de-DE" dirty="0" err="1"/>
+              <a:t>e</a:t>
+            </a:r>
+            <a:r>
+              <a:rPr lang="de-DE" dirty="0" err="1" smtClean="0"/>
+              <a:t>lbow</a:t>
+            </a:r>
+            <a:r>
+              <a:rPr lang="de-DE" dirty="0" smtClean="0"/>
+              <a:t> </a:t>
+            </a:r>
+            <a:r>
+              <a:rPr lang="en-US" dirty="0"/>
+              <a:t>z</a:t>
+            </a:r>
+            <a:endParaRPr lang="de-DE" dirty="0" smtClean="0"/>
+          </a:p>
+        </p:txBody>
+      </p:sp>
+      <p:cxnSp>
+        <p:nvCxnSpPr>
+          <p:cNvPr id="8" name="Straight Connector 7"/>
+          <p:cNvCxnSpPr/>
+          <p:nvPr/>
+        </p:nvCxnSpPr>
+        <p:spPr>
+          <a:xfrm>
+            <a:off x="7382421" y="1820091"/>
+            <a:ext cx="1201783" cy="26126"/>
+          </a:xfrm>
+          <a:prstGeom prst="line">
+            <a:avLst/>
+          </a:prstGeom>
+          <a:ln w="57150">
+            <a:solidFill>
+              <a:srgbClr val="FF0000"/>
+            </a:solidFill>
+          </a:ln>
+        </p:spPr>
+        <p:style>
+          <a:lnRef idx="1">
+            <a:schemeClr val="accent1"/>
+          </a:lnRef>
+          <a:fillRef idx="0">
+            <a:schemeClr val="accent1"/>
+          </a:fillRef>
+          <a:effectRef idx="0">
+            <a:schemeClr val="accent1"/>
+          </a:effectRef>
+          <a:fontRef idx="minor">
+            <a:schemeClr val="tx1"/>
+          </a:fontRef>
+        </p:style>
+      </p:cxnSp>
+      <p:cxnSp>
+        <p:nvCxnSpPr>
+          <p:cNvPr id="41" name="Straight Connector 40"/>
+          <p:cNvCxnSpPr/>
+          <p:nvPr/>
+        </p:nvCxnSpPr>
+        <p:spPr>
+          <a:xfrm flipV="1">
+            <a:off x="8717949" y="1698171"/>
+            <a:ext cx="1166280" cy="148046"/>
+          </a:xfrm>
+          <a:prstGeom prst="line">
+            <a:avLst/>
+          </a:prstGeom>
+          <a:ln w="57150">
+            <a:solidFill>
+              <a:srgbClr val="FF0000"/>
+            </a:solidFill>
+          </a:ln>
+        </p:spPr>
+        <p:style>
+          <a:lnRef idx="1">
+            <a:schemeClr val="accent1"/>
+          </a:lnRef>
+          <a:fillRef idx="0">
+            <a:schemeClr val="accent1"/>
+          </a:fillRef>
+          <a:effectRef idx="0">
+            <a:schemeClr val="accent1"/>
+          </a:effectRef>
+          <a:fontRef idx="minor">
+            <a:schemeClr val="tx1"/>
+          </a:fontRef>
+        </p:style>
+      </p:cxnSp>
+      <p:cxnSp>
+        <p:nvCxnSpPr>
+          <p:cNvPr id="43" name="Straight Connector 42"/>
+          <p:cNvCxnSpPr/>
+          <p:nvPr/>
+        </p:nvCxnSpPr>
+        <p:spPr>
+          <a:xfrm flipV="1">
+            <a:off x="1631916" y="3424601"/>
+            <a:ext cx="3667496" cy="332785"/>
+          </a:xfrm>
+          <a:prstGeom prst="line">
+            <a:avLst/>
+          </a:prstGeom>
+          <a:ln w="57150">
+            <a:solidFill>
+              <a:schemeClr val="accent4">
+                <a:lumMod val="75000"/>
+              </a:schemeClr>
+            </a:solidFill>
+          </a:ln>
+        </p:spPr>
+        <p:style>
+          <a:lnRef idx="1">
+            <a:schemeClr val="accent1"/>
+          </a:lnRef>
+          <a:fillRef idx="0">
+            <a:schemeClr val="accent1"/>
+          </a:fillRef>
+          <a:effectRef idx="0">
+            <a:schemeClr val="accent1"/>
+          </a:effectRef>
+          <a:fontRef idx="minor">
+            <a:schemeClr val="tx1"/>
+          </a:fontRef>
+        </p:style>
+      </p:cxnSp>
+      <p:sp>
+        <p:nvSpPr>
+          <p:cNvPr id="31" name="Oval 30"/>
+          <p:cNvSpPr/>
+          <p:nvPr/>
+        </p:nvSpPr>
+        <p:spPr>
+          <a:xfrm>
+            <a:off x="2766325" y="3546907"/>
+            <a:ext cx="204255" cy="180549"/>
+          </a:xfrm>
+          <a:prstGeom prst="ellipse">
+            <a:avLst/>
+          </a:prstGeom>
+          <a:solidFill>
+            <a:schemeClr val="tx1"/>
+          </a:solidFill>
+        </p:spPr>
+        <p:style>
+          <a:lnRef idx="2">
+            <a:schemeClr val="accent1">
+              <a:shade val="50000"/>
+            </a:schemeClr>
+          </a:lnRef>
+          <a:fillRef idx="1">
+            <a:schemeClr val="accent1"/>
+          </a:fillRef>
+          <a:effectRef idx="0">
+            <a:schemeClr val="accent1"/>
+          </a:effectRef>
+          <a:fontRef idx="minor">
+            <a:schemeClr val="lt1"/>
+          </a:fontRef>
+        </p:style>
+        <p:txBody>
+          <a:bodyPr rtlCol="0" anchor="ctr"/>
+          <a:lstStyle/>
+          <a:p>
+            <a:pPr algn="ctr"/>
+            <a:endParaRPr lang="en-US"/>
+          </a:p>
+        </p:txBody>
+      </p:sp>
+      <p:cxnSp>
+        <p:nvCxnSpPr>
+          <p:cNvPr id="44" name="Straight Arrow Connector 43"/>
+          <p:cNvCxnSpPr>
+            <a:stCxn id="46" idx="0"/>
+          </p:cNvCxnSpPr>
+          <p:nvPr/>
+        </p:nvCxnSpPr>
+        <p:spPr>
+          <a:xfrm flipV="1">
+            <a:off x="2520344" y="3737776"/>
+            <a:ext cx="342486" cy="1496762"/>
+          </a:xfrm>
+          <a:prstGeom prst="straightConnector1">
+            <a:avLst/>
+          </a:prstGeom>
+          <a:ln>
+            <a:solidFill>
+              <a:schemeClr val="tx1"/>
+            </a:solidFill>
+            <a:tailEnd type="triangle"/>
+          </a:ln>
+        </p:spPr>
+        <p:style>
+          <a:lnRef idx="1">
+            <a:schemeClr val="accent1"/>
+          </a:lnRef>
+          <a:fillRef idx="0">
+            <a:schemeClr val="accent1"/>
+          </a:fillRef>
+          <a:effectRef idx="0">
+            <a:schemeClr val="accent1"/>
+          </a:effectRef>
+          <a:fontRef idx="minor">
+            <a:schemeClr val="tx1"/>
+          </a:fontRef>
+        </p:style>
+      </p:cxnSp>
+      <p:sp>
+        <p:nvSpPr>
+          <p:cNvPr id="46" name="TextBox 45"/>
+          <p:cNvSpPr txBox="1"/>
+          <p:nvPr/>
+        </p:nvSpPr>
+        <p:spPr>
+          <a:xfrm>
+            <a:off x="2080864" y="5234538"/>
+            <a:ext cx="878959" cy="646331"/>
+          </a:xfrm>
+          <a:prstGeom prst="rect">
+            <a:avLst/>
+          </a:prstGeom>
+          <a:noFill/>
+        </p:spPr>
+        <p:txBody>
+          <a:bodyPr wrap="none" rtlCol="0">
+            <a:spAutoFit/>
+          </a:bodyPr>
+          <a:lstStyle/>
+          <a:p>
+            <a:r>
+              <a:rPr lang="de-DE" dirty="0" err="1" smtClean="0"/>
+              <a:t>sphere</a:t>
+            </a:r>
+            <a:r>
+              <a:rPr lang="de-DE" dirty="0" smtClean="0"/>
+              <a:t> </a:t>
+            </a:r>
+          </a:p>
+          <a:p>
+            <a:r>
+              <a:rPr lang="de-DE" dirty="0" err="1" smtClean="0"/>
+              <a:t>center</a:t>
+            </a:r>
+            <a:endParaRPr lang="en-US" dirty="0"/>
+          </a:p>
+        </p:txBody>
+      </p:sp>
+      <p:sp>
+        <p:nvSpPr>
+          <p:cNvPr id="45" name="Oval 44"/>
+          <p:cNvSpPr/>
+          <p:nvPr/>
+        </p:nvSpPr>
+        <p:spPr>
+          <a:xfrm>
+            <a:off x="1893753" y="2717513"/>
+            <a:ext cx="1907828" cy="1907828"/>
+          </a:xfrm>
+          <a:prstGeom prst="ellipse">
+            <a:avLst/>
+          </a:prstGeom>
+          <a:noFill/>
+          <a:ln w="28575">
+            <a:solidFill>
+              <a:schemeClr val="tx1"/>
+            </a:solidFill>
+          </a:ln>
+        </p:spPr>
+        <p:style>
+          <a:lnRef idx="2">
+            <a:schemeClr val="accent1">
+              <a:shade val="50000"/>
+            </a:schemeClr>
+          </a:lnRef>
+          <a:fillRef idx="1">
+            <a:schemeClr val="accent1"/>
+          </a:fillRef>
+          <a:effectRef idx="0">
+            <a:schemeClr val="accent1"/>
+          </a:effectRef>
+          <a:fontRef idx="minor">
+            <a:schemeClr val="lt1"/>
+          </a:fontRef>
+        </p:style>
+        <p:txBody>
+          <a:bodyPr rtlCol="0" anchor="ctr"/>
+          <a:lstStyle/>
+          <a:p>
+            <a:pPr algn="ctr"/>
+            <a:endParaRPr lang="en-US"/>
+          </a:p>
+        </p:txBody>
+      </p:sp>
+      <p:cxnSp>
+        <p:nvCxnSpPr>
+          <p:cNvPr id="30" name="Straight Connector 29"/>
+          <p:cNvCxnSpPr/>
+          <p:nvPr/>
+        </p:nvCxnSpPr>
+        <p:spPr>
+          <a:xfrm>
+            <a:off x="2700159" y="1478280"/>
+            <a:ext cx="293281" cy="4251960"/>
+          </a:xfrm>
+          <a:prstGeom prst="line">
+            <a:avLst/>
+          </a:prstGeom>
+          <a:ln w="38100">
+            <a:solidFill>
+              <a:schemeClr val="tx1"/>
+            </a:solidFill>
+          </a:ln>
+        </p:spPr>
+        <p:style>
+          <a:lnRef idx="1">
+            <a:schemeClr val="accent1"/>
+          </a:lnRef>
+          <a:fillRef idx="0">
+            <a:schemeClr val="accent1"/>
+          </a:fillRef>
+          <a:effectRef idx="0">
+            <a:schemeClr val="accent1"/>
+          </a:effectRef>
+          <a:fontRef idx="minor">
+            <a:schemeClr val="tx1"/>
+          </a:fontRef>
+        </p:style>
+      </p:cxnSp>
+      <p:sp>
+        <p:nvSpPr>
+          <p:cNvPr id="48" name="TextBox 47"/>
+          <p:cNvSpPr txBox="1"/>
+          <p:nvPr/>
+        </p:nvSpPr>
+        <p:spPr>
+          <a:xfrm>
+            <a:off x="1994996" y="1083037"/>
+            <a:ext cx="760849" cy="646331"/>
+          </a:xfrm>
+          <a:prstGeom prst="rect">
+            <a:avLst/>
+          </a:prstGeom>
+          <a:noFill/>
+        </p:spPr>
+        <p:txBody>
+          <a:bodyPr wrap="none" rtlCol="0">
+            <a:spAutoFit/>
+          </a:bodyPr>
+          <a:lstStyle/>
+          <a:p>
+            <a:r>
+              <a:rPr lang="de-DE" dirty="0" err="1"/>
+              <a:t>e</a:t>
+            </a:r>
+            <a:r>
+              <a:rPr lang="de-DE" dirty="0" err="1" smtClean="0"/>
+              <a:t>lbow</a:t>
+            </a:r>
+            <a:endParaRPr lang="de-DE" dirty="0" smtClean="0"/>
+          </a:p>
+          <a:p>
+            <a:r>
+              <a:rPr lang="de-DE" dirty="0" smtClean="0"/>
+              <a:t>plane</a:t>
+            </a:r>
+            <a:endParaRPr lang="en-US" dirty="0"/>
+          </a:p>
+        </p:txBody>
+      </p:sp>
+      <p:sp>
+        <p:nvSpPr>
+          <p:cNvPr id="50" name="Oval 49"/>
+          <p:cNvSpPr/>
+          <p:nvPr/>
+        </p:nvSpPr>
+        <p:spPr>
+          <a:xfrm>
+            <a:off x="2739260" y="3288062"/>
+            <a:ext cx="247140" cy="247140"/>
+          </a:xfrm>
+          <a:prstGeom prst="ellipse">
+            <a:avLst/>
+          </a:prstGeom>
+          <a:solidFill>
+            <a:srgbClr val="FFFF00"/>
+          </a:solidFill>
+        </p:spPr>
+        <p:style>
+          <a:lnRef idx="2">
+            <a:schemeClr val="accent1">
+              <a:shade val="50000"/>
+            </a:schemeClr>
+          </a:lnRef>
+          <a:fillRef idx="1">
+            <a:schemeClr val="accent1"/>
+          </a:fillRef>
+          <a:effectRef idx="0">
+            <a:schemeClr val="accent1"/>
+          </a:effectRef>
+          <a:fontRef idx="minor">
+            <a:schemeClr val="lt1"/>
+          </a:fontRef>
+        </p:style>
+        <p:txBody>
+          <a:bodyPr rtlCol="0" anchor="ctr"/>
+          <a:lstStyle/>
+          <a:p>
+            <a:pPr algn="ctr"/>
+            <a:endParaRPr lang="en-US"/>
+          </a:p>
+        </p:txBody>
+      </p:sp>
+      <p:sp>
+        <p:nvSpPr>
+          <p:cNvPr id="51" name="TextBox 50"/>
+          <p:cNvSpPr txBox="1"/>
+          <p:nvPr/>
+        </p:nvSpPr>
+        <p:spPr>
+          <a:xfrm rot="2700000">
+            <a:off x="1413201" y="3414611"/>
+            <a:ext cx="413896" cy="646331"/>
+          </a:xfrm>
+          <a:prstGeom prst="rect">
+            <a:avLst/>
+          </a:prstGeom>
+          <a:noFill/>
+        </p:spPr>
+        <p:txBody>
+          <a:bodyPr wrap="none" rtlCol="0">
+            <a:spAutoFit/>
+          </a:bodyPr>
+          <a:lstStyle/>
+          <a:p>
+            <a:r>
+              <a:rPr lang="de-DE" sz="3600" b="1" dirty="0" smtClean="0">
+                <a:solidFill>
+                  <a:srgbClr val="0070C0"/>
+                </a:solidFill>
+              </a:rPr>
+              <a:t>+</a:t>
+            </a:r>
+            <a:endParaRPr lang="en-US" b="1" dirty="0">
+              <a:solidFill>
+                <a:srgbClr val="0070C0"/>
+              </a:solidFill>
+            </a:endParaRPr>
+          </a:p>
+        </p:txBody>
+      </p:sp>
+      <p:sp>
+        <p:nvSpPr>
+          <p:cNvPr id="52" name="TextBox 51"/>
+          <p:cNvSpPr txBox="1"/>
+          <p:nvPr/>
+        </p:nvSpPr>
+        <p:spPr>
+          <a:xfrm rot="2700000">
+            <a:off x="5117372" y="3081124"/>
+            <a:ext cx="413896" cy="646331"/>
+          </a:xfrm>
+          <a:prstGeom prst="rect">
+            <a:avLst/>
+          </a:prstGeom>
+          <a:noFill/>
+        </p:spPr>
+        <p:txBody>
+          <a:bodyPr wrap="none" rtlCol="0">
+            <a:spAutoFit/>
+          </a:bodyPr>
+          <a:lstStyle/>
+          <a:p>
+            <a:r>
+              <a:rPr lang="de-DE" sz="3600" b="1" dirty="0" smtClean="0">
+                <a:solidFill>
+                  <a:srgbClr val="FF0000"/>
+                </a:solidFill>
+              </a:rPr>
+              <a:t>+</a:t>
+            </a:r>
+            <a:endParaRPr lang="en-US" b="1" dirty="0">
+              <a:solidFill>
+                <a:srgbClr val="FF0000"/>
+              </a:solidFill>
+            </a:endParaRPr>
+          </a:p>
+        </p:txBody>
+      </p:sp>
+    </p:spTree>
+    <p:extLst>
+      <p:ext uri="{BB962C8B-B14F-4D97-AF65-F5344CB8AC3E}">
+        <p14:creationId xmlns:p14="http://schemas.microsoft.com/office/powerpoint/2010/main" val="4196752982"/>
+      </p:ext>
+    </p:extLst>
+  </p:cSld>
+  <p:clrMapOvr>
+    <a:masterClrMapping/>
+  </p:clrMapOvr>
+  <p:timing>
+    <p:tnLst>
+      <p:par>
+        <p:cTn id="1" dur="indefinite" restart="never" nodeType="tmRoot"/>
+      </p:par>
+    </p:tnLst>
+  </p:timing>
+</p:sld>
+</file>
+
+<file path=ppt/slides/slide4.xml><?xml version="1.0" encoding="utf-8"?>
 <p:sld xmlns:a="http://schemas.openxmlformats.org/drawingml/2006/main" xmlns:r="http://schemas.openxmlformats.org/officeDocument/2006/relationships" xmlns:p="http://schemas.openxmlformats.org/presentationml/2006/main">
   <p:cSld>
     <p:spTree>
@@ -7302,6 +9242,105 @@
           </a:fontRef>
         </p:style>
       </p:cxnSp>
+      <p:sp>
+        <p:nvSpPr>
+          <p:cNvPr id="5" name="TextBox 4"/>
+          <p:cNvSpPr txBox="1"/>
+          <p:nvPr/>
+        </p:nvSpPr>
+        <p:spPr>
+          <a:xfrm>
+            <a:off x="5399120" y="2629989"/>
+            <a:ext cx="1010213" cy="369332"/>
+          </a:xfrm>
+          <a:prstGeom prst="rect">
+            <a:avLst/>
+          </a:prstGeom>
+          <a:noFill/>
+        </p:spPr>
+        <p:txBody>
+          <a:bodyPr wrap="none" rtlCol="0">
+            <a:spAutoFit/>
+          </a:bodyPr>
+          <a:lstStyle/>
+          <a:p>
+            <a:r>
+              <a:rPr lang="de-DE" dirty="0" err="1" smtClean="0"/>
+              <a:t>shoulder</a:t>
+            </a:r>
+            <a:endParaRPr lang="en-US" dirty="0"/>
+          </a:p>
+        </p:txBody>
+      </p:sp>
+      <p:sp>
+        <p:nvSpPr>
+          <p:cNvPr id="14" name="TextBox 13"/>
+          <p:cNvSpPr txBox="1"/>
+          <p:nvPr/>
+        </p:nvSpPr>
+        <p:spPr>
+          <a:xfrm>
+            <a:off x="10467972" y="2629989"/>
+            <a:ext cx="534185" cy="369332"/>
+          </a:xfrm>
+          <a:prstGeom prst="rect">
+            <a:avLst/>
+          </a:prstGeom>
+          <a:noFill/>
+        </p:spPr>
+        <p:txBody>
+          <a:bodyPr wrap="none" rtlCol="0">
+            <a:spAutoFit/>
+          </a:bodyPr>
+          <a:lstStyle/>
+          <a:p>
+            <a:r>
+              <a:rPr lang="de-DE" dirty="0" smtClean="0"/>
+              <a:t>TCP</a:t>
+            </a:r>
+            <a:endParaRPr lang="en-US" dirty="0"/>
+          </a:p>
+        </p:txBody>
+      </p:sp>
+      <p:cxnSp>
+        <p:nvCxnSpPr>
+          <p:cNvPr id="18" name="Straight Connector 17"/>
+          <p:cNvCxnSpPr>
+            <a:stCxn id="4" idx="0"/>
+          </p:cNvCxnSpPr>
+          <p:nvPr/>
+        </p:nvCxnSpPr>
+        <p:spPr>
+          <a:xfrm>
+            <a:off x="6191794" y="2629989"/>
+            <a:ext cx="4564732" cy="18274"/>
+          </a:xfrm>
+          <a:prstGeom prst="line">
+            <a:avLst/>
+          </a:prstGeom>
+          <a:ln w="57150">
+            <a:solidFill>
+              <a:schemeClr val="accent4">
+                <a:lumMod val="75000"/>
+              </a:schemeClr>
+            </a:solidFill>
+          </a:ln>
+        </p:spPr>
+        <p:style>
+          <a:lnRef idx="1">
+            <a:schemeClr val="accent1"/>
+          </a:lnRef>
+          <a:fillRef idx="0">
+            <a:schemeClr val="accent1"/>
+          </a:fillRef>
+          <a:effectRef idx="0">
+            <a:schemeClr val="accent1"/>
+          </a:effectRef>
+          <a:fontRef idx="minor">
+            <a:schemeClr val="tx1"/>
+          </a:fontRef>
+        </p:style>
+      </p:cxnSp>
     </p:spTree>
     <p:extLst>
       <p:ext uri="{BB962C8B-B14F-4D97-AF65-F5344CB8AC3E}">
@@ -7315,7 +9354,7 @@
 </p:sld>
 </file>
 
-<file path=ppt/slides/slide3.xml><?xml version="1.0" encoding="utf-8"?>
+<file path=ppt/slides/slide5.xml><?xml version="1.0" encoding="utf-8"?>
 <p:sld xmlns:a="http://schemas.openxmlformats.org/drawingml/2006/main" xmlns:r="http://schemas.openxmlformats.org/officeDocument/2006/relationships" xmlns:p="http://schemas.openxmlformats.org/presentationml/2006/main">
   <p:cSld>
     <p:spTree>
@@ -7516,7 +9555,11 @@
             </a:r>
             <a:r>
               <a:rPr lang="de-DE" dirty="0" smtClean="0"/>
-              <a:t> * x + </a:t>
+              <a:t> </a:t>
+            </a:r>
+            <a:r>
+              <a:rPr lang="de-DE" dirty="0" smtClean="0"/>
+              <a:t>* x + </a:t>
             </a:r>
             <a:r>
               <a:rPr lang="de-DE" dirty="0" err="1" smtClean="0"/>
@@ -7544,8 +9587,21 @@
             </a:r>
             <a:r>
               <a:rPr lang="de-DE" dirty="0" smtClean="0"/>
-              <a:t> * z = d</a:t>
-            </a:r>
+              <a:t> * z = </a:t>
+            </a:r>
+            <a:r>
+              <a:rPr lang="de-DE" dirty="0" smtClean="0"/>
+              <a:t>d    (</a:t>
+            </a:r>
+            <a:r>
+              <a:rPr lang="de-DE" dirty="0" err="1" smtClean="0"/>
+              <a:t>Ebenengleichung</a:t>
+            </a:r>
+            <a:r>
+              <a:rPr lang="de-DE" dirty="0" smtClean="0"/>
+              <a:t>)</a:t>
+            </a:r>
+            <a:endParaRPr lang="de-DE" dirty="0" smtClean="0"/>
           </a:p>
           <a:p>
             <a:r>
@@ -7582,7 +9638,11 @@
             </a:r>
             <a:r>
               <a:rPr lang="de-DE" dirty="0" smtClean="0"/>
-              <a:t>)^2 = r^2</a:t>
+              <a:t>)^2 = </a:t>
+            </a:r>
+            <a:r>
+              <a:rPr lang="de-DE" dirty="0" smtClean="0"/>
+              <a:t>r^2  (Kugelgleichung)</a:t>
             </a:r>
           </a:p>
           <a:p>
@@ -8300,7 +10360,7 @@
 </p:sld>
 </file>
 
-<file path=ppt/slides/slide4.xml><?xml version="1.0" encoding="utf-8"?>
+<file path=ppt/slides/slide6.xml><?xml version="1.0" encoding="utf-8"?>
 <p:sld xmlns:a="http://schemas.openxmlformats.org/drawingml/2006/main" xmlns:r="http://schemas.openxmlformats.org/officeDocument/2006/relationships" xmlns:p="http://schemas.openxmlformats.org/presentationml/2006/main">
   <p:cSld>
     <p:spTree>
@@ -8861,7 +10921,7 @@
 </p:sld>
 </file>
 
-<file path=ppt/slides/slide5.xml><?xml version="1.0" encoding="utf-8"?>
+<file path=ppt/slides/slide7.xml><?xml version="1.0" encoding="utf-8"?>
 <p:sld xmlns:a="http://schemas.openxmlformats.org/drawingml/2006/main" xmlns:r="http://schemas.openxmlformats.org/officeDocument/2006/relationships" xmlns:p="http://schemas.openxmlformats.org/presentationml/2006/main">
   <p:cSld>
     <p:spTree>
@@ -9396,7 +11456,7 @@
 </p:sld>
 </file>
 
-<file path=ppt/slides/slide6.xml><?xml version="1.0" encoding="utf-8"?>
+<file path=ppt/slides/slide8.xml><?xml version="1.0" encoding="utf-8"?>
 <p:sld xmlns:a="http://schemas.openxmlformats.org/drawingml/2006/main" xmlns:r="http://schemas.openxmlformats.org/officeDocument/2006/relationships" xmlns:p="http://schemas.openxmlformats.org/presentationml/2006/main">
   <p:cSld>
     <p:spTree>
@@ -9510,7 +11570,7 @@
 </p:sld>
 </file>
 
-<file path=ppt/slides/slide7.xml><?xml version="1.0" encoding="utf-8"?>
+<file path=ppt/slides/slide9.xml><?xml version="1.0" encoding="utf-8"?>
 <p:sld xmlns:a="http://schemas.openxmlformats.org/drawingml/2006/main" xmlns:r="http://schemas.openxmlformats.org/officeDocument/2006/relationships" xmlns:p="http://schemas.openxmlformats.org/presentationml/2006/main">
   <p:cSld>
     <p:spTree>
@@ -10045,548 +12105,6 @@
     <p:extLst>
       <p:ext uri="{BB962C8B-B14F-4D97-AF65-F5344CB8AC3E}">
         <p14:creationId xmlns:p14="http://schemas.microsoft.com/office/powerpoint/2010/main" val="1316100670"/>
-      </p:ext>
-    </p:extLst>
-  </p:cSld>
-  <p:clrMapOvr>
-    <a:masterClrMapping/>
-  </p:clrMapOvr>
-</p:sld>
-</file>
-
-<file path=ppt/slides/slide8.xml><?xml version="1.0" encoding="utf-8"?>
-<p:sld xmlns:a="http://schemas.openxmlformats.org/drawingml/2006/main" xmlns:r="http://schemas.openxmlformats.org/officeDocument/2006/relationships" xmlns:p="http://schemas.openxmlformats.org/presentationml/2006/main">
-  <p:cSld>
-    <p:spTree>
-      <p:nvGrpSpPr>
-        <p:cNvPr id="1" name=""/>
-        <p:cNvGrpSpPr/>
-        <p:nvPr/>
-      </p:nvGrpSpPr>
-      <p:grpSpPr>
-        <a:xfrm>
-          <a:off x="0" y="0"/>
-          <a:ext cx="0" cy="0"/>
-          <a:chOff x="0" y="0"/>
-          <a:chExt cx="0" cy="0"/>
-        </a:xfrm>
-      </p:grpSpPr>
-      <p:pic>
-        <p:nvPicPr>
-          <p:cNvPr id="4" name="Picture 3"/>
-          <p:cNvPicPr>
-            <a:picLocks noChangeAspect="1"/>
-          </p:cNvPicPr>
-          <p:nvPr/>
-        </p:nvPicPr>
-        <p:blipFill>
-          <a:blip r:embed="rId2"/>
-          <a:stretch>
-            <a:fillRect/>
-          </a:stretch>
-        </p:blipFill>
-        <p:spPr>
-          <a:xfrm>
-            <a:off x="5775447" y="123044"/>
-            <a:ext cx="7105650" cy="6143625"/>
-          </a:xfrm>
-          <a:prstGeom prst="rect">
-            <a:avLst/>
-          </a:prstGeom>
-        </p:spPr>
-      </p:pic>
-      <p:sp>
-        <p:nvSpPr>
-          <p:cNvPr id="2" name="Title 1"/>
-          <p:cNvSpPr>
-            <a:spLocks noGrp="1"/>
-          </p:cNvSpPr>
-          <p:nvPr>
-            <p:ph type="title"/>
-          </p:nvPr>
-        </p:nvSpPr>
-        <p:spPr/>
-        <p:txBody>
-          <a:bodyPr/>
-          <a:lstStyle/>
-          <a:p>
-            <a:r>
-              <a:rPr lang="de-DE" sz="4000" dirty="0" err="1" smtClean="0"/>
-              <a:t>angles</a:t>
-            </a:r>
-            <a:r>
-              <a:rPr lang="de-DE" sz="4000" dirty="0" smtClean="0"/>
-              <a:t>[4]</a:t>
-            </a:r>
-            <a:br>
-              <a:rPr lang="de-DE" sz="4000" dirty="0" smtClean="0"/>
-            </a:br>
-            <a:r>
-              <a:rPr lang="de-DE" sz="4000" dirty="0" err="1" smtClean="0"/>
-              <a:t>RWristYaw</a:t>
-            </a:r>
-            <a:endParaRPr lang="en-US" dirty="0"/>
-          </a:p>
-        </p:txBody>
-      </p:sp>
-      <p:sp>
-        <p:nvSpPr>
-          <p:cNvPr id="9" name="Freeform 8"/>
-          <p:cNvSpPr/>
-          <p:nvPr/>
-        </p:nvSpPr>
-        <p:spPr>
-          <a:xfrm>
-            <a:off x="9039074" y="4466883"/>
-            <a:ext cx="471902" cy="829310"/>
-          </a:xfrm>
-          <a:custGeom>
-            <a:avLst/>
-            <a:gdLst>
-              <a:gd name="connsiteX0" fmla="*/ 0 w 177800"/>
-              <a:gd name="connsiteY0" fmla="*/ 7088 h 80748"/>
-              <a:gd name="connsiteX1" fmla="*/ 76200 w 177800"/>
-              <a:gd name="connsiteY1" fmla="*/ 7088 h 80748"/>
-              <a:gd name="connsiteX2" fmla="*/ 177800 w 177800"/>
-              <a:gd name="connsiteY2" fmla="*/ 80748 h 80748"/>
-              <a:gd name="connsiteX0" fmla="*/ 0 w 177800"/>
-              <a:gd name="connsiteY0" fmla="*/ 0 h 73660"/>
-              <a:gd name="connsiteX1" fmla="*/ 177800 w 177800"/>
-              <a:gd name="connsiteY1" fmla="*/ 73660 h 73660"/>
-              <a:gd name="connsiteX0" fmla="*/ 0 w 177800"/>
-              <a:gd name="connsiteY0" fmla="*/ 1331 h 74991"/>
-              <a:gd name="connsiteX1" fmla="*/ 177800 w 177800"/>
-              <a:gd name="connsiteY1" fmla="*/ 74991 h 74991"/>
-              <a:gd name="connsiteX0" fmla="*/ 0 w 177800"/>
-              <a:gd name="connsiteY0" fmla="*/ 1851 h 75511"/>
-              <a:gd name="connsiteX1" fmla="*/ 177800 w 177800"/>
-              <a:gd name="connsiteY1" fmla="*/ 75511 h 75511"/>
-              <a:gd name="connsiteX0" fmla="*/ 31384 w 68335"/>
-              <a:gd name="connsiteY0" fmla="*/ 455 h 226515"/>
-              <a:gd name="connsiteX1" fmla="*/ 3444 w 68335"/>
-              <a:gd name="connsiteY1" fmla="*/ 226515 h 226515"/>
-              <a:gd name="connsiteX0" fmla="*/ 270708 w 288897"/>
-              <a:gd name="connsiteY0" fmla="*/ 570 h 185990"/>
-              <a:gd name="connsiteX1" fmla="*/ 1468 w 288897"/>
-              <a:gd name="connsiteY1" fmla="*/ 185990 h 185990"/>
-              <a:gd name="connsiteX0" fmla="*/ 270800 w 282446"/>
-              <a:gd name="connsiteY0" fmla="*/ 0 h 185420"/>
-              <a:gd name="connsiteX1" fmla="*/ 1560 w 282446"/>
-              <a:gd name="connsiteY1" fmla="*/ 185420 h 185420"/>
-              <a:gd name="connsiteX0" fmla="*/ 269240 w 285877"/>
-              <a:gd name="connsiteY0" fmla="*/ 0 h 209999"/>
-              <a:gd name="connsiteX1" fmla="*/ 0 w 285877"/>
-              <a:gd name="connsiteY1" fmla="*/ 185420 h 209999"/>
-              <a:gd name="connsiteX0" fmla="*/ 299720 w 314870"/>
-              <a:gd name="connsiteY0" fmla="*/ 0 h 196161"/>
-              <a:gd name="connsiteX1" fmla="*/ 0 w 314870"/>
-              <a:gd name="connsiteY1" fmla="*/ 170180 h 196161"/>
-              <a:gd name="connsiteX0" fmla="*/ 299720 w 318396"/>
-              <a:gd name="connsiteY0" fmla="*/ 0 h 170668"/>
-              <a:gd name="connsiteX1" fmla="*/ 0 w 318396"/>
-              <a:gd name="connsiteY1" fmla="*/ 170180 h 170668"/>
-              <a:gd name="connsiteX0" fmla="*/ 299720 w 299720"/>
-              <a:gd name="connsiteY0" fmla="*/ 0 h 170869"/>
-              <a:gd name="connsiteX1" fmla="*/ 0 w 299720"/>
-              <a:gd name="connsiteY1" fmla="*/ 170180 h 170869"/>
-              <a:gd name="connsiteX0" fmla="*/ 427736 w 427736"/>
-              <a:gd name="connsiteY0" fmla="*/ 122428 h 152138"/>
-              <a:gd name="connsiteX1" fmla="*/ 0 w 427736"/>
-              <a:gd name="connsiteY1" fmla="*/ 0 h 152138"/>
-              <a:gd name="connsiteX0" fmla="*/ 220472 w 220472"/>
-              <a:gd name="connsiteY0" fmla="*/ 134620 h 163165"/>
-              <a:gd name="connsiteX1" fmla="*/ 0 w 220472"/>
-              <a:gd name="connsiteY1" fmla="*/ 0 h 163165"/>
-              <a:gd name="connsiteX0" fmla="*/ 220472 w 220472"/>
-              <a:gd name="connsiteY0" fmla="*/ 134620 h 134620"/>
-              <a:gd name="connsiteX1" fmla="*/ 0 w 220472"/>
-              <a:gd name="connsiteY1" fmla="*/ 0 h 134620"/>
-              <a:gd name="connsiteX0" fmla="*/ 247142 w 247142"/>
-              <a:gd name="connsiteY0" fmla="*/ 22318 h 22318"/>
-              <a:gd name="connsiteX1" fmla="*/ 0 w 247142"/>
-              <a:gd name="connsiteY1" fmla="*/ 21048 h 22318"/>
-              <a:gd name="connsiteX0" fmla="*/ 247142 w 247142"/>
-              <a:gd name="connsiteY0" fmla="*/ 38978 h 38978"/>
-              <a:gd name="connsiteX1" fmla="*/ 0 w 247142"/>
-              <a:gd name="connsiteY1" fmla="*/ 37708 h 38978"/>
-              <a:gd name="connsiteX0" fmla="*/ 273812 w 273812"/>
-              <a:gd name="connsiteY0" fmla="*/ 40903 h 40903"/>
-              <a:gd name="connsiteX1" fmla="*/ 0 w 273812"/>
-              <a:gd name="connsiteY1" fmla="*/ 35823 h 40903"/>
-              <a:gd name="connsiteX0" fmla="*/ 273812 w 273812"/>
-              <a:gd name="connsiteY0" fmla="*/ 40903 h 40903"/>
-              <a:gd name="connsiteX1" fmla="*/ 0 w 273812"/>
-              <a:gd name="connsiteY1" fmla="*/ 35823 h 40903"/>
-              <a:gd name="connsiteX0" fmla="*/ 261620 w 261620"/>
-              <a:gd name="connsiteY0" fmla="*/ 267229 h 267229"/>
-              <a:gd name="connsiteX1" fmla="*/ 0 w 261620"/>
-              <a:gd name="connsiteY1" fmla="*/ 6117 h 267229"/>
-              <a:gd name="connsiteX0" fmla="*/ 9669 w 373549"/>
-              <a:gd name="connsiteY0" fmla="*/ 526462 h 526462"/>
-              <a:gd name="connsiteX1" fmla="*/ 363745 w 373549"/>
-              <a:gd name="connsiteY1" fmla="*/ 3222 h 526462"/>
-              <a:gd name="connsiteX0" fmla="*/ 8650 w 440077"/>
-              <a:gd name="connsiteY0" fmla="*/ 484815 h 484815"/>
-              <a:gd name="connsiteX1" fmla="*/ 431306 w 440077"/>
-              <a:gd name="connsiteY1" fmla="*/ 3485 h 484815"/>
-              <a:gd name="connsiteX0" fmla="*/ 0 w 438613"/>
-              <a:gd name="connsiteY0" fmla="*/ 484293 h 486109"/>
-              <a:gd name="connsiteX1" fmla="*/ 422656 w 438613"/>
-              <a:gd name="connsiteY1" fmla="*/ 2963 h 486109"/>
-              <a:gd name="connsiteX0" fmla="*/ 0 w 422656"/>
-              <a:gd name="connsiteY0" fmla="*/ 481330 h 484115"/>
-              <a:gd name="connsiteX1" fmla="*/ 422656 w 422656"/>
-              <a:gd name="connsiteY1" fmla="*/ 0 h 484115"/>
-              <a:gd name="connsiteX0" fmla="*/ 0 w 422656"/>
-              <a:gd name="connsiteY0" fmla="*/ 481330 h 481330"/>
-              <a:gd name="connsiteX1" fmla="*/ 422656 w 422656"/>
-              <a:gd name="connsiteY1" fmla="*/ 0 h 481330"/>
-              <a:gd name="connsiteX0" fmla="*/ 0 w 5340096"/>
-              <a:gd name="connsiteY0" fmla="*/ 1357 h 1693764"/>
-              <a:gd name="connsiteX1" fmla="*/ 5340096 w 5340096"/>
-              <a:gd name="connsiteY1" fmla="*/ 1684107 h 1693764"/>
-              <a:gd name="connsiteX0" fmla="*/ 207291 w 282514"/>
-              <a:gd name="connsiteY0" fmla="*/ 2818 h 699072"/>
-              <a:gd name="connsiteX1" fmla="*/ 27 w 282514"/>
-              <a:gd name="connsiteY1" fmla="*/ 679728 h 699072"/>
-              <a:gd name="connsiteX0" fmla="*/ 425722 w 481739"/>
-              <a:gd name="connsiteY0" fmla="*/ 2757 h 718946"/>
-              <a:gd name="connsiteX1" fmla="*/ 18 w 481739"/>
-              <a:gd name="connsiteY1" fmla="*/ 699987 h 718946"/>
-              <a:gd name="connsiteX0" fmla="*/ 428146 w 428146"/>
-              <a:gd name="connsiteY0" fmla="*/ 0 h 717772"/>
-              <a:gd name="connsiteX1" fmla="*/ 2442 w 428146"/>
-              <a:gd name="connsiteY1" fmla="*/ 697230 h 717772"/>
-              <a:gd name="connsiteX0" fmla="*/ 489611 w 489611"/>
-              <a:gd name="connsiteY0" fmla="*/ 0 h 697230"/>
-              <a:gd name="connsiteX1" fmla="*/ 63907 w 489611"/>
-              <a:gd name="connsiteY1" fmla="*/ 697230 h 697230"/>
-              <a:gd name="connsiteX0" fmla="*/ 536220 w 536220"/>
-              <a:gd name="connsiteY0" fmla="*/ 0 h 808990"/>
-              <a:gd name="connsiteX1" fmla="*/ 54636 w 536220"/>
-              <a:gd name="connsiteY1" fmla="*/ 808990 h 808990"/>
-              <a:gd name="connsiteX0" fmla="*/ 507364 w 507364"/>
-              <a:gd name="connsiteY0" fmla="*/ 0 h 808990"/>
-              <a:gd name="connsiteX1" fmla="*/ 25780 w 507364"/>
-              <a:gd name="connsiteY1" fmla="*/ 808990 h 808990"/>
-              <a:gd name="connsiteX0" fmla="*/ 485030 w 485030"/>
-              <a:gd name="connsiteY0" fmla="*/ 0 h 819150"/>
-              <a:gd name="connsiteX1" fmla="*/ 28846 w 485030"/>
-              <a:gd name="connsiteY1" fmla="*/ 819150 h 819150"/>
-              <a:gd name="connsiteX0" fmla="*/ 471902 w 471902"/>
-              <a:gd name="connsiteY0" fmla="*/ 0 h 829310"/>
-              <a:gd name="connsiteX1" fmla="*/ 30958 w 471902"/>
-              <a:gd name="connsiteY1" fmla="*/ 829310 h 829310"/>
-            </a:gdLst>
-            <a:ahLst/>
-            <a:cxnLst>
-              <a:cxn ang="0">
-                <a:pos x="connsiteX0" y="connsiteY0"/>
-              </a:cxn>
-              <a:cxn ang="0">
-                <a:pos x="connsiteX1" y="connsiteY1"/>
-              </a:cxn>
-            </a:cxnLst>
-            <a:rect l="l" t="t" r="r" b="b"/>
-            <a:pathLst>
-              <a:path w="471902" h="829310">
-                <a:moveTo>
-                  <a:pt x="471902" y="0"/>
-                </a:moveTo>
-                <a:cubicBezTo>
-                  <a:pt x="2849" y="22013"/>
-                  <a:pt x="-49264" y="487257"/>
-                  <a:pt x="30958" y="829310"/>
-                </a:cubicBezTo>
-              </a:path>
-            </a:pathLst>
-          </a:custGeom>
-          <a:noFill/>
-          <a:ln>
-            <a:solidFill>
-              <a:schemeClr val="tx1"/>
-            </a:solidFill>
-          </a:ln>
-        </p:spPr>
-        <p:style>
-          <a:lnRef idx="2">
-            <a:schemeClr val="accent1">
-              <a:shade val="50000"/>
-            </a:schemeClr>
-          </a:lnRef>
-          <a:fillRef idx="1">
-            <a:schemeClr val="accent1"/>
-          </a:fillRef>
-          <a:effectRef idx="0">
-            <a:schemeClr val="accent1"/>
-          </a:effectRef>
-          <a:fontRef idx="minor">
-            <a:schemeClr val="lt1"/>
-          </a:fontRef>
-        </p:style>
-        <p:txBody>
-          <a:bodyPr rtlCol="0" anchor="ctr"/>
-          <a:lstStyle/>
-          <a:p>
-            <a:pPr algn="ctr"/>
-            <a:endParaRPr lang="en-US"/>
-          </a:p>
-        </p:txBody>
-      </p:sp>
-      <p:sp>
-        <p:nvSpPr>
-          <p:cNvPr id="11" name="TextBox 10"/>
-          <p:cNvSpPr txBox="1"/>
-          <p:nvPr/>
-        </p:nvSpPr>
-        <p:spPr>
-          <a:xfrm>
-            <a:off x="9369139" y="5150520"/>
-            <a:ext cx="534185" cy="369332"/>
-          </a:xfrm>
-          <a:prstGeom prst="rect">
-            <a:avLst/>
-          </a:prstGeom>
-          <a:noFill/>
-        </p:spPr>
-        <p:txBody>
-          <a:bodyPr wrap="none" rtlCol="0">
-            <a:spAutoFit/>
-          </a:bodyPr>
-          <a:lstStyle/>
-          <a:p>
-            <a:r>
-              <a:rPr lang="de-DE" dirty="0" smtClean="0"/>
-              <a:t>TCP</a:t>
-            </a:r>
-            <a:endParaRPr lang="en-US" dirty="0"/>
-          </a:p>
-        </p:txBody>
-      </p:sp>
-      <p:sp>
-        <p:nvSpPr>
-          <p:cNvPr id="12" name="TextBox 11"/>
-          <p:cNvSpPr txBox="1"/>
-          <p:nvPr/>
-        </p:nvSpPr>
-        <p:spPr>
-          <a:xfrm>
-            <a:off x="6621625" y="4134515"/>
-            <a:ext cx="760849" cy="369332"/>
-          </a:xfrm>
-          <a:prstGeom prst="rect">
-            <a:avLst/>
-          </a:prstGeom>
-          <a:noFill/>
-        </p:spPr>
-        <p:txBody>
-          <a:bodyPr wrap="none" rtlCol="0">
-            <a:spAutoFit/>
-          </a:bodyPr>
-          <a:lstStyle/>
-          <a:p>
-            <a:r>
-              <a:rPr lang="de-DE" dirty="0" err="1" smtClean="0"/>
-              <a:t>elbow</a:t>
-            </a:r>
-            <a:endParaRPr lang="en-US" dirty="0"/>
-          </a:p>
-        </p:txBody>
-      </p:sp>
-      <p:sp>
-        <p:nvSpPr>
-          <p:cNvPr id="13" name="TextBox 12"/>
-          <p:cNvSpPr txBox="1"/>
-          <p:nvPr/>
-        </p:nvSpPr>
-        <p:spPr>
-          <a:xfrm>
-            <a:off x="8148831" y="3164145"/>
-            <a:ext cx="1306768" cy="369332"/>
-          </a:xfrm>
-          <a:prstGeom prst="rect">
-            <a:avLst/>
-          </a:prstGeom>
-          <a:noFill/>
-        </p:spPr>
-        <p:txBody>
-          <a:bodyPr wrap="none" rtlCol="0">
-            <a:spAutoFit/>
-          </a:bodyPr>
-          <a:lstStyle/>
-          <a:p>
-            <a:r>
-              <a:rPr lang="de-DE" dirty="0" err="1" smtClean="0"/>
-              <a:t>circleCenter</a:t>
-            </a:r>
-            <a:endParaRPr lang="en-US" dirty="0"/>
-          </a:p>
-        </p:txBody>
-      </p:sp>
-      <p:cxnSp>
-        <p:nvCxnSpPr>
-          <p:cNvPr id="15" name="Straight Arrow Connector 14"/>
-          <p:cNvCxnSpPr/>
-          <p:nvPr/>
-        </p:nvCxnSpPr>
-        <p:spPr>
-          <a:xfrm flipH="1" flipV="1">
-            <a:off x="9509760" y="3785616"/>
-            <a:ext cx="12954" cy="1297002"/>
-          </a:xfrm>
-          <a:prstGeom prst="straightConnector1">
-            <a:avLst/>
-          </a:prstGeom>
-          <a:ln w="12700">
-            <a:solidFill>
-              <a:schemeClr val="tx1"/>
-            </a:solidFill>
-            <a:tailEnd type="triangle"/>
-          </a:ln>
-        </p:spPr>
-        <p:style>
-          <a:lnRef idx="1">
-            <a:schemeClr val="accent1"/>
-          </a:lnRef>
-          <a:fillRef idx="0">
-            <a:schemeClr val="accent1"/>
-          </a:fillRef>
-          <a:effectRef idx="0">
-            <a:schemeClr val="accent1"/>
-          </a:effectRef>
-          <a:fontRef idx="minor">
-            <a:schemeClr val="tx1"/>
-          </a:fontRef>
-        </p:style>
-      </p:cxnSp>
-      <p:sp>
-        <p:nvSpPr>
-          <p:cNvPr id="24" name="TextBox 23"/>
-          <p:cNvSpPr txBox="1"/>
-          <p:nvPr/>
-        </p:nvSpPr>
-        <p:spPr>
-          <a:xfrm>
-            <a:off x="6246964" y="1393343"/>
-            <a:ext cx="292068" cy="369332"/>
-          </a:xfrm>
-          <a:prstGeom prst="rect">
-            <a:avLst/>
-          </a:prstGeom>
-          <a:noFill/>
-        </p:spPr>
-        <p:txBody>
-          <a:bodyPr wrap="none" rtlCol="0">
-            <a:spAutoFit/>
-          </a:bodyPr>
-          <a:lstStyle/>
-          <a:p>
-            <a:r>
-              <a:rPr lang="de-DE" dirty="0" smtClean="0"/>
-              <a:t>Z</a:t>
-            </a:r>
-            <a:endParaRPr lang="en-US" dirty="0"/>
-          </a:p>
-        </p:txBody>
-      </p:sp>
-      <p:sp>
-        <p:nvSpPr>
-          <p:cNvPr id="25" name="TextBox 24"/>
-          <p:cNvSpPr txBox="1"/>
-          <p:nvPr/>
-        </p:nvSpPr>
-        <p:spPr>
-          <a:xfrm>
-            <a:off x="7277007" y="2576837"/>
-            <a:ext cx="304892" cy="369332"/>
-          </a:xfrm>
-          <a:prstGeom prst="rect">
-            <a:avLst/>
-          </a:prstGeom>
-          <a:noFill/>
-        </p:spPr>
-        <p:txBody>
-          <a:bodyPr wrap="none" rtlCol="0">
-            <a:spAutoFit/>
-          </a:bodyPr>
-          <a:lstStyle/>
-          <a:p>
-            <a:r>
-              <a:rPr lang="de-DE" dirty="0"/>
-              <a:t>X</a:t>
-            </a:r>
-            <a:endParaRPr lang="en-US" dirty="0"/>
-          </a:p>
-        </p:txBody>
-      </p:sp>
-      <p:sp>
-        <p:nvSpPr>
-          <p:cNvPr id="33" name="TextBox 32"/>
-          <p:cNvSpPr txBox="1"/>
-          <p:nvPr/>
-        </p:nvSpPr>
-        <p:spPr>
-          <a:xfrm>
-            <a:off x="9068181" y="4530741"/>
-            <a:ext cx="394660" cy="369332"/>
-          </a:xfrm>
-          <a:prstGeom prst="rect">
-            <a:avLst/>
-          </a:prstGeom>
-          <a:noFill/>
-        </p:spPr>
-        <p:txBody>
-          <a:bodyPr wrap="none" rtlCol="0">
-            <a:spAutoFit/>
-          </a:bodyPr>
-          <a:lstStyle/>
-          <a:p>
-            <a:r>
-              <a:rPr lang="el-GR" dirty="0" smtClean="0"/>
-              <a:t>α</a:t>
-            </a:r>
-            <a:r>
-              <a:rPr lang="de-DE" baseline="-25000" dirty="0" smtClean="0"/>
-              <a:t>4</a:t>
-            </a:r>
-            <a:endParaRPr lang="en-US" baseline="-25000" dirty="0"/>
-          </a:p>
-        </p:txBody>
-      </p:sp>
-      <p:sp>
-        <p:nvSpPr>
-          <p:cNvPr id="26" name="TextBox 25"/>
-          <p:cNvSpPr txBox="1"/>
-          <p:nvPr/>
-        </p:nvSpPr>
-        <p:spPr>
-          <a:xfrm>
-            <a:off x="8907376" y="4019082"/>
-            <a:ext cx="349776" cy="369332"/>
-          </a:xfrm>
-          <a:prstGeom prst="rect">
-            <a:avLst/>
-          </a:prstGeom>
-          <a:noFill/>
-        </p:spPr>
-        <p:txBody>
-          <a:bodyPr wrap="none" rtlCol="0">
-            <a:spAutoFit/>
-          </a:bodyPr>
-          <a:lstStyle/>
-          <a:p>
-            <a:r>
-              <a:rPr lang="de-DE" dirty="0" smtClean="0"/>
-              <a:t>w</a:t>
-            </a:r>
-            <a:endParaRPr lang="en-US" baseline="-25000" dirty="0"/>
-          </a:p>
-        </p:txBody>
-      </p:sp>
-    </p:spTree>
-    <p:extLst>
-      <p:ext uri="{BB962C8B-B14F-4D97-AF65-F5344CB8AC3E}">
-        <p14:creationId xmlns:p14="http://schemas.microsoft.com/office/powerpoint/2010/main" val="3702311234"/>
       </p:ext>
     </p:extLst>
   </p:cSld>

</xml_diff>

<commit_message>
Intermediate Version - started documentation in LaTeX
</commit_message>
<xml_diff>
--- a/PepperRightArmInverseKinematicsCalculation.pptx
+++ b/PepperRightArmInverseKinematicsCalculation.pptx
@@ -9,12 +9,13 @@
     <p:sldId id="256" r:id="rId3"/>
     <p:sldId id="266" r:id="rId4"/>
     <p:sldId id="257" r:id="rId5"/>
-    <p:sldId id="258" r:id="rId6"/>
-    <p:sldId id="260" r:id="rId7"/>
-    <p:sldId id="261" r:id="rId8"/>
-    <p:sldId id="262" r:id="rId9"/>
-    <p:sldId id="263" r:id="rId10"/>
-    <p:sldId id="264" r:id="rId11"/>
+    <p:sldId id="267" r:id="rId6"/>
+    <p:sldId id="258" r:id="rId7"/>
+    <p:sldId id="260" r:id="rId8"/>
+    <p:sldId id="261" r:id="rId9"/>
+    <p:sldId id="262" r:id="rId10"/>
+    <p:sldId id="263" r:id="rId11"/>
+    <p:sldId id="264" r:id="rId12"/>
   </p:sldIdLst>
   <p:sldSz cx="12192000" cy="6858000"/>
   <p:notesSz cx="6858000" cy="9144000"/>
@@ -252,7 +253,7 @@
           <a:p>
             <a:fld id="{EAB8C8D1-352E-48E5-BFF0-CE55578B5725}" type="datetimeFigureOut">
               <a:rPr lang="en-US" smtClean="0"/>
-              <a:t>1/8/2021</a:t>
+              <a:t>3/30/2021</a:t>
             </a:fld>
             <a:endParaRPr lang="en-US"/>
           </a:p>
@@ -422,7 +423,7 @@
           <a:p>
             <a:fld id="{EAB8C8D1-352E-48E5-BFF0-CE55578B5725}" type="datetimeFigureOut">
               <a:rPr lang="en-US" smtClean="0"/>
-              <a:t>1/8/2021</a:t>
+              <a:t>3/30/2021</a:t>
             </a:fld>
             <a:endParaRPr lang="en-US"/>
           </a:p>
@@ -602,7 +603,7 @@
           <a:p>
             <a:fld id="{EAB8C8D1-352E-48E5-BFF0-CE55578B5725}" type="datetimeFigureOut">
               <a:rPr lang="en-US" smtClean="0"/>
-              <a:t>1/8/2021</a:t>
+              <a:t>3/30/2021</a:t>
             </a:fld>
             <a:endParaRPr lang="en-US"/>
           </a:p>
@@ -772,7 +773,7 @@
           <a:p>
             <a:fld id="{EAB8C8D1-352E-48E5-BFF0-CE55578B5725}" type="datetimeFigureOut">
               <a:rPr lang="en-US" smtClean="0"/>
-              <a:t>1/8/2021</a:t>
+              <a:t>3/30/2021</a:t>
             </a:fld>
             <a:endParaRPr lang="en-US"/>
           </a:p>
@@ -1018,7 +1019,7 @@
           <a:p>
             <a:fld id="{EAB8C8D1-352E-48E5-BFF0-CE55578B5725}" type="datetimeFigureOut">
               <a:rPr lang="en-US" smtClean="0"/>
-              <a:t>1/8/2021</a:t>
+              <a:t>3/30/2021</a:t>
             </a:fld>
             <a:endParaRPr lang="en-US"/>
           </a:p>
@@ -1250,7 +1251,7 @@
           <a:p>
             <a:fld id="{EAB8C8D1-352E-48E5-BFF0-CE55578B5725}" type="datetimeFigureOut">
               <a:rPr lang="en-US" smtClean="0"/>
-              <a:t>1/8/2021</a:t>
+              <a:t>3/30/2021</a:t>
             </a:fld>
             <a:endParaRPr lang="en-US"/>
           </a:p>
@@ -1617,7 +1618,7 @@
           <a:p>
             <a:fld id="{EAB8C8D1-352E-48E5-BFF0-CE55578B5725}" type="datetimeFigureOut">
               <a:rPr lang="en-US" smtClean="0"/>
-              <a:t>1/8/2021</a:t>
+              <a:t>3/30/2021</a:t>
             </a:fld>
             <a:endParaRPr lang="en-US"/>
           </a:p>
@@ -1735,7 +1736,7 @@
           <a:p>
             <a:fld id="{EAB8C8D1-352E-48E5-BFF0-CE55578B5725}" type="datetimeFigureOut">
               <a:rPr lang="en-US" smtClean="0"/>
-              <a:t>1/8/2021</a:t>
+              <a:t>3/30/2021</a:t>
             </a:fld>
             <a:endParaRPr lang="en-US"/>
           </a:p>
@@ -1830,7 +1831,7 @@
           <a:p>
             <a:fld id="{EAB8C8D1-352E-48E5-BFF0-CE55578B5725}" type="datetimeFigureOut">
               <a:rPr lang="en-US" smtClean="0"/>
-              <a:t>1/8/2021</a:t>
+              <a:t>3/30/2021</a:t>
             </a:fld>
             <a:endParaRPr lang="en-US"/>
           </a:p>
@@ -2107,7 +2108,7 @@
           <a:p>
             <a:fld id="{EAB8C8D1-352E-48E5-BFF0-CE55578B5725}" type="datetimeFigureOut">
               <a:rPr lang="en-US" smtClean="0"/>
-              <a:t>1/8/2021</a:t>
+              <a:t>3/30/2021</a:t>
             </a:fld>
             <a:endParaRPr lang="en-US"/>
           </a:p>
@@ -2360,7 +2361,7 @@
           <a:p>
             <a:fld id="{EAB8C8D1-352E-48E5-BFF0-CE55578B5725}" type="datetimeFigureOut">
               <a:rPr lang="en-US" smtClean="0"/>
-              <a:t>1/8/2021</a:t>
+              <a:t>3/30/2021</a:t>
             </a:fld>
             <a:endParaRPr lang="en-US"/>
           </a:p>
@@ -2573,7 +2574,7 @@
           <a:p>
             <a:fld id="{EAB8C8D1-352E-48E5-BFF0-CE55578B5725}" type="datetimeFigureOut">
               <a:rPr lang="en-US" smtClean="0"/>
-              <a:t>1/8/2021</a:t>
+              <a:t>3/30/2021</a:t>
             </a:fld>
             <a:endParaRPr lang="en-US"/>
           </a:p>
@@ -3104,6 +3105,550 @@
 </file>
 
 <file path=ppt/slides/slide10.xml><?xml version="1.0" encoding="utf-8"?>
+<p:sld xmlns:a="http://schemas.openxmlformats.org/drawingml/2006/main" xmlns:r="http://schemas.openxmlformats.org/officeDocument/2006/relationships" xmlns:p="http://schemas.openxmlformats.org/presentationml/2006/main">
+  <p:cSld>
+    <p:spTree>
+      <p:nvGrpSpPr>
+        <p:cNvPr id="1" name=""/>
+        <p:cNvGrpSpPr/>
+        <p:nvPr/>
+      </p:nvGrpSpPr>
+      <p:grpSpPr>
+        <a:xfrm>
+          <a:off x="0" y="0"/>
+          <a:ext cx="0" cy="0"/>
+          <a:chOff x="0" y="0"/>
+          <a:chExt cx="0" cy="0"/>
+        </a:xfrm>
+      </p:grpSpPr>
+      <p:pic>
+        <p:nvPicPr>
+          <p:cNvPr id="3" name="Picture 2"/>
+          <p:cNvPicPr>
+            <a:picLocks noChangeAspect="1"/>
+          </p:cNvPicPr>
+          <p:nvPr/>
+        </p:nvPicPr>
+        <p:blipFill>
+          <a:blip r:embed="rId2"/>
+          <a:stretch>
+            <a:fillRect/>
+          </a:stretch>
+        </p:blipFill>
+        <p:spPr>
+          <a:xfrm>
+            <a:off x="4711382" y="298185"/>
+            <a:ext cx="7077075" cy="6162675"/>
+          </a:xfrm>
+          <a:prstGeom prst="rect">
+            <a:avLst/>
+          </a:prstGeom>
+        </p:spPr>
+      </p:pic>
+      <p:sp>
+        <p:nvSpPr>
+          <p:cNvPr id="2" name="Title 1"/>
+          <p:cNvSpPr>
+            <a:spLocks noGrp="1"/>
+          </p:cNvSpPr>
+          <p:nvPr>
+            <p:ph type="title"/>
+          </p:nvPr>
+        </p:nvSpPr>
+        <p:spPr/>
+        <p:txBody>
+          <a:bodyPr>
+            <a:normAutofit/>
+          </a:bodyPr>
+          <a:lstStyle/>
+          <a:p>
+            <a:r>
+              <a:rPr lang="de-DE" sz="4000" dirty="0" err="1"/>
+              <a:t>angles</a:t>
+            </a:r>
+            <a:r>
+              <a:rPr lang="de-DE" sz="4000" dirty="0"/>
+              <a:t>[3]</a:t>
+            </a:r>
+            <a:br>
+              <a:rPr lang="de-DE" sz="4000" dirty="0"/>
+            </a:br>
+            <a:r>
+              <a:rPr lang="de-DE" sz="4000" dirty="0" err="1"/>
+              <a:t>RElbowRoll</a:t>
+            </a:r>
+            <a:endParaRPr lang="en-US" sz="4000" dirty="0"/>
+          </a:p>
+        </p:txBody>
+      </p:sp>
+      <p:sp>
+        <p:nvSpPr>
+          <p:cNvPr id="9" name="Freeform 8"/>
+          <p:cNvSpPr/>
+          <p:nvPr/>
+        </p:nvSpPr>
+        <p:spPr>
+          <a:xfrm>
+            <a:off x="7702547" y="4272124"/>
+            <a:ext cx="422656" cy="481330"/>
+          </a:xfrm>
+          <a:custGeom>
+            <a:avLst/>
+            <a:gdLst>
+              <a:gd name="connsiteX0" fmla="*/ 0 w 177800"/>
+              <a:gd name="connsiteY0" fmla="*/ 7088 h 80748"/>
+              <a:gd name="connsiteX1" fmla="*/ 76200 w 177800"/>
+              <a:gd name="connsiteY1" fmla="*/ 7088 h 80748"/>
+              <a:gd name="connsiteX2" fmla="*/ 177800 w 177800"/>
+              <a:gd name="connsiteY2" fmla="*/ 80748 h 80748"/>
+              <a:gd name="connsiteX0" fmla="*/ 0 w 177800"/>
+              <a:gd name="connsiteY0" fmla="*/ 0 h 73660"/>
+              <a:gd name="connsiteX1" fmla="*/ 177800 w 177800"/>
+              <a:gd name="connsiteY1" fmla="*/ 73660 h 73660"/>
+              <a:gd name="connsiteX0" fmla="*/ 0 w 177800"/>
+              <a:gd name="connsiteY0" fmla="*/ 1331 h 74991"/>
+              <a:gd name="connsiteX1" fmla="*/ 177800 w 177800"/>
+              <a:gd name="connsiteY1" fmla="*/ 74991 h 74991"/>
+              <a:gd name="connsiteX0" fmla="*/ 0 w 177800"/>
+              <a:gd name="connsiteY0" fmla="*/ 1851 h 75511"/>
+              <a:gd name="connsiteX1" fmla="*/ 177800 w 177800"/>
+              <a:gd name="connsiteY1" fmla="*/ 75511 h 75511"/>
+              <a:gd name="connsiteX0" fmla="*/ 31384 w 68335"/>
+              <a:gd name="connsiteY0" fmla="*/ 455 h 226515"/>
+              <a:gd name="connsiteX1" fmla="*/ 3444 w 68335"/>
+              <a:gd name="connsiteY1" fmla="*/ 226515 h 226515"/>
+              <a:gd name="connsiteX0" fmla="*/ 270708 w 288897"/>
+              <a:gd name="connsiteY0" fmla="*/ 570 h 185990"/>
+              <a:gd name="connsiteX1" fmla="*/ 1468 w 288897"/>
+              <a:gd name="connsiteY1" fmla="*/ 185990 h 185990"/>
+              <a:gd name="connsiteX0" fmla="*/ 270800 w 282446"/>
+              <a:gd name="connsiteY0" fmla="*/ 0 h 185420"/>
+              <a:gd name="connsiteX1" fmla="*/ 1560 w 282446"/>
+              <a:gd name="connsiteY1" fmla="*/ 185420 h 185420"/>
+              <a:gd name="connsiteX0" fmla="*/ 269240 w 285877"/>
+              <a:gd name="connsiteY0" fmla="*/ 0 h 209999"/>
+              <a:gd name="connsiteX1" fmla="*/ 0 w 285877"/>
+              <a:gd name="connsiteY1" fmla="*/ 185420 h 209999"/>
+              <a:gd name="connsiteX0" fmla="*/ 299720 w 314870"/>
+              <a:gd name="connsiteY0" fmla="*/ 0 h 196161"/>
+              <a:gd name="connsiteX1" fmla="*/ 0 w 314870"/>
+              <a:gd name="connsiteY1" fmla="*/ 170180 h 196161"/>
+              <a:gd name="connsiteX0" fmla="*/ 299720 w 318396"/>
+              <a:gd name="connsiteY0" fmla="*/ 0 h 170668"/>
+              <a:gd name="connsiteX1" fmla="*/ 0 w 318396"/>
+              <a:gd name="connsiteY1" fmla="*/ 170180 h 170668"/>
+              <a:gd name="connsiteX0" fmla="*/ 299720 w 299720"/>
+              <a:gd name="connsiteY0" fmla="*/ 0 h 170869"/>
+              <a:gd name="connsiteX1" fmla="*/ 0 w 299720"/>
+              <a:gd name="connsiteY1" fmla="*/ 170180 h 170869"/>
+              <a:gd name="connsiteX0" fmla="*/ 427736 w 427736"/>
+              <a:gd name="connsiteY0" fmla="*/ 122428 h 152138"/>
+              <a:gd name="connsiteX1" fmla="*/ 0 w 427736"/>
+              <a:gd name="connsiteY1" fmla="*/ 0 h 152138"/>
+              <a:gd name="connsiteX0" fmla="*/ 220472 w 220472"/>
+              <a:gd name="connsiteY0" fmla="*/ 134620 h 163165"/>
+              <a:gd name="connsiteX1" fmla="*/ 0 w 220472"/>
+              <a:gd name="connsiteY1" fmla="*/ 0 h 163165"/>
+              <a:gd name="connsiteX0" fmla="*/ 220472 w 220472"/>
+              <a:gd name="connsiteY0" fmla="*/ 134620 h 134620"/>
+              <a:gd name="connsiteX1" fmla="*/ 0 w 220472"/>
+              <a:gd name="connsiteY1" fmla="*/ 0 h 134620"/>
+              <a:gd name="connsiteX0" fmla="*/ 247142 w 247142"/>
+              <a:gd name="connsiteY0" fmla="*/ 22318 h 22318"/>
+              <a:gd name="connsiteX1" fmla="*/ 0 w 247142"/>
+              <a:gd name="connsiteY1" fmla="*/ 21048 h 22318"/>
+              <a:gd name="connsiteX0" fmla="*/ 247142 w 247142"/>
+              <a:gd name="connsiteY0" fmla="*/ 38978 h 38978"/>
+              <a:gd name="connsiteX1" fmla="*/ 0 w 247142"/>
+              <a:gd name="connsiteY1" fmla="*/ 37708 h 38978"/>
+              <a:gd name="connsiteX0" fmla="*/ 273812 w 273812"/>
+              <a:gd name="connsiteY0" fmla="*/ 40903 h 40903"/>
+              <a:gd name="connsiteX1" fmla="*/ 0 w 273812"/>
+              <a:gd name="connsiteY1" fmla="*/ 35823 h 40903"/>
+              <a:gd name="connsiteX0" fmla="*/ 273812 w 273812"/>
+              <a:gd name="connsiteY0" fmla="*/ 40903 h 40903"/>
+              <a:gd name="connsiteX1" fmla="*/ 0 w 273812"/>
+              <a:gd name="connsiteY1" fmla="*/ 35823 h 40903"/>
+              <a:gd name="connsiteX0" fmla="*/ 261620 w 261620"/>
+              <a:gd name="connsiteY0" fmla="*/ 267229 h 267229"/>
+              <a:gd name="connsiteX1" fmla="*/ 0 w 261620"/>
+              <a:gd name="connsiteY1" fmla="*/ 6117 h 267229"/>
+              <a:gd name="connsiteX0" fmla="*/ 9669 w 373549"/>
+              <a:gd name="connsiteY0" fmla="*/ 526462 h 526462"/>
+              <a:gd name="connsiteX1" fmla="*/ 363745 w 373549"/>
+              <a:gd name="connsiteY1" fmla="*/ 3222 h 526462"/>
+              <a:gd name="connsiteX0" fmla="*/ 8650 w 440077"/>
+              <a:gd name="connsiteY0" fmla="*/ 484815 h 484815"/>
+              <a:gd name="connsiteX1" fmla="*/ 431306 w 440077"/>
+              <a:gd name="connsiteY1" fmla="*/ 3485 h 484815"/>
+              <a:gd name="connsiteX0" fmla="*/ 0 w 438613"/>
+              <a:gd name="connsiteY0" fmla="*/ 484293 h 486109"/>
+              <a:gd name="connsiteX1" fmla="*/ 422656 w 438613"/>
+              <a:gd name="connsiteY1" fmla="*/ 2963 h 486109"/>
+              <a:gd name="connsiteX0" fmla="*/ 0 w 422656"/>
+              <a:gd name="connsiteY0" fmla="*/ 481330 h 484115"/>
+              <a:gd name="connsiteX1" fmla="*/ 422656 w 422656"/>
+              <a:gd name="connsiteY1" fmla="*/ 0 h 484115"/>
+              <a:gd name="connsiteX0" fmla="*/ 0 w 422656"/>
+              <a:gd name="connsiteY0" fmla="*/ 481330 h 481330"/>
+              <a:gd name="connsiteX1" fmla="*/ 422656 w 422656"/>
+              <a:gd name="connsiteY1" fmla="*/ 0 h 481330"/>
+            </a:gdLst>
+            <a:ahLst/>
+            <a:cxnLst>
+              <a:cxn ang="0">
+                <a:pos x="connsiteX0" y="connsiteY0"/>
+              </a:cxn>
+              <a:cxn ang="0">
+                <a:pos x="connsiteX1" y="connsiteY1"/>
+              </a:cxn>
+            </a:cxnLst>
+            <a:rect l="l" t="t" r="r" b="b"/>
+            <a:pathLst>
+              <a:path w="422656" h="481330">
+                <a:moveTo>
+                  <a:pt x="0" y="481330"/>
+                </a:moveTo>
+                <a:cubicBezTo>
+                  <a:pt x="252307" y="422063"/>
+                  <a:pt x="418634" y="160867"/>
+                  <a:pt x="422656" y="0"/>
+                </a:cubicBezTo>
+              </a:path>
+            </a:pathLst>
+          </a:custGeom>
+          <a:noFill/>
+          <a:ln>
+            <a:solidFill>
+              <a:schemeClr val="tx1"/>
+            </a:solidFill>
+          </a:ln>
+        </p:spPr>
+        <p:style>
+          <a:lnRef idx="2">
+            <a:schemeClr val="accent1">
+              <a:shade val="50000"/>
+            </a:schemeClr>
+          </a:lnRef>
+          <a:fillRef idx="1">
+            <a:schemeClr val="accent1"/>
+          </a:fillRef>
+          <a:effectRef idx="0">
+            <a:schemeClr val="accent1"/>
+          </a:effectRef>
+          <a:fontRef idx="minor">
+            <a:schemeClr val="lt1"/>
+          </a:fontRef>
+        </p:style>
+        <p:txBody>
+          <a:bodyPr rtlCol="0" anchor="ctr"/>
+          <a:lstStyle/>
+          <a:p>
+            <a:pPr algn="ctr"/>
+            <a:endParaRPr lang="en-US"/>
+          </a:p>
+        </p:txBody>
+      </p:sp>
+      <p:sp>
+        <p:nvSpPr>
+          <p:cNvPr id="11" name="TextBox 10"/>
+          <p:cNvSpPr txBox="1"/>
+          <p:nvPr/>
+        </p:nvSpPr>
+        <p:spPr>
+          <a:xfrm>
+            <a:off x="10012680" y="4074828"/>
+            <a:ext cx="534185" cy="369332"/>
+          </a:xfrm>
+          <a:prstGeom prst="rect">
+            <a:avLst/>
+          </a:prstGeom>
+          <a:noFill/>
+        </p:spPr>
+        <p:txBody>
+          <a:bodyPr wrap="none" rtlCol="0">
+            <a:spAutoFit/>
+          </a:bodyPr>
+          <a:lstStyle/>
+          <a:p>
+            <a:r>
+              <a:rPr lang="de-DE" dirty="0" smtClean="0"/>
+              <a:t>TCP</a:t>
+            </a:r>
+            <a:endParaRPr lang="en-US" dirty="0"/>
+          </a:p>
+        </p:txBody>
+      </p:sp>
+      <p:sp>
+        <p:nvSpPr>
+          <p:cNvPr id="12" name="TextBox 11"/>
+          <p:cNvSpPr txBox="1"/>
+          <p:nvPr/>
+        </p:nvSpPr>
+        <p:spPr>
+          <a:xfrm>
+            <a:off x="6621625" y="4134515"/>
+            <a:ext cx="760849" cy="369332"/>
+          </a:xfrm>
+          <a:prstGeom prst="rect">
+            <a:avLst/>
+          </a:prstGeom>
+          <a:noFill/>
+        </p:spPr>
+        <p:txBody>
+          <a:bodyPr wrap="none" rtlCol="0">
+            <a:spAutoFit/>
+          </a:bodyPr>
+          <a:lstStyle/>
+          <a:p>
+            <a:r>
+              <a:rPr lang="de-DE" dirty="0" err="1" smtClean="0"/>
+              <a:t>elbow</a:t>
+            </a:r>
+            <a:endParaRPr lang="en-US" dirty="0"/>
+          </a:p>
+        </p:txBody>
+      </p:sp>
+      <p:sp>
+        <p:nvSpPr>
+          <p:cNvPr id="13" name="TextBox 12"/>
+          <p:cNvSpPr txBox="1"/>
+          <p:nvPr/>
+        </p:nvSpPr>
+        <p:spPr>
+          <a:xfrm>
+            <a:off x="8137576" y="3010191"/>
+            <a:ext cx="1306768" cy="369332"/>
+          </a:xfrm>
+          <a:prstGeom prst="rect">
+            <a:avLst/>
+          </a:prstGeom>
+          <a:noFill/>
+        </p:spPr>
+        <p:txBody>
+          <a:bodyPr wrap="none" rtlCol="0">
+            <a:spAutoFit/>
+          </a:bodyPr>
+          <a:lstStyle/>
+          <a:p>
+            <a:r>
+              <a:rPr lang="de-DE" dirty="0" err="1" smtClean="0"/>
+              <a:t>circleCenter</a:t>
+            </a:r>
+            <a:endParaRPr lang="en-US" dirty="0"/>
+          </a:p>
+        </p:txBody>
+      </p:sp>
+      <p:cxnSp>
+        <p:nvCxnSpPr>
+          <p:cNvPr id="14" name="Straight Arrow Connector 13"/>
+          <p:cNvCxnSpPr/>
+          <p:nvPr/>
+        </p:nvCxnSpPr>
+        <p:spPr>
+          <a:xfrm>
+            <a:off x="7359015" y="4185285"/>
+            <a:ext cx="680085" cy="1148715"/>
+          </a:xfrm>
+          <a:prstGeom prst="straightConnector1">
+            <a:avLst/>
+          </a:prstGeom>
+          <a:ln w="12700">
+            <a:solidFill>
+              <a:srgbClr val="FF0000"/>
+            </a:solidFill>
+            <a:tailEnd type="triangle"/>
+          </a:ln>
+        </p:spPr>
+        <p:style>
+          <a:lnRef idx="1">
+            <a:schemeClr val="accent1"/>
+          </a:lnRef>
+          <a:fillRef idx="0">
+            <a:schemeClr val="accent1"/>
+          </a:fillRef>
+          <a:effectRef idx="0">
+            <a:schemeClr val="accent1"/>
+          </a:effectRef>
+          <a:fontRef idx="minor">
+            <a:schemeClr val="tx1"/>
+          </a:fontRef>
+        </p:style>
+      </p:cxnSp>
+      <p:cxnSp>
+        <p:nvCxnSpPr>
+          <p:cNvPr id="15" name="Straight Arrow Connector 14"/>
+          <p:cNvCxnSpPr/>
+          <p:nvPr/>
+        </p:nvCxnSpPr>
+        <p:spPr>
+          <a:xfrm>
+            <a:off x="7359015" y="4185285"/>
+            <a:ext cx="2663190" cy="297180"/>
+          </a:xfrm>
+          <a:prstGeom prst="straightConnector1">
+            <a:avLst/>
+          </a:prstGeom>
+          <a:ln w="12700">
+            <a:solidFill>
+              <a:schemeClr val="tx1"/>
+            </a:solidFill>
+            <a:tailEnd type="triangle"/>
+          </a:ln>
+        </p:spPr>
+        <p:style>
+          <a:lnRef idx="1">
+            <a:schemeClr val="accent1"/>
+          </a:lnRef>
+          <a:fillRef idx="0">
+            <a:schemeClr val="accent1"/>
+          </a:fillRef>
+          <a:effectRef idx="0">
+            <a:schemeClr val="accent1"/>
+          </a:effectRef>
+          <a:fontRef idx="minor">
+            <a:schemeClr val="tx1"/>
+          </a:fontRef>
+        </p:style>
+      </p:cxnSp>
+      <p:sp>
+        <p:nvSpPr>
+          <p:cNvPr id="24" name="TextBox 23"/>
+          <p:cNvSpPr txBox="1"/>
+          <p:nvPr/>
+        </p:nvSpPr>
+        <p:spPr>
+          <a:xfrm>
+            <a:off x="6246964" y="1393343"/>
+            <a:ext cx="292068" cy="369332"/>
+          </a:xfrm>
+          <a:prstGeom prst="rect">
+            <a:avLst/>
+          </a:prstGeom>
+          <a:noFill/>
+        </p:spPr>
+        <p:txBody>
+          <a:bodyPr wrap="none" rtlCol="0">
+            <a:spAutoFit/>
+          </a:bodyPr>
+          <a:lstStyle/>
+          <a:p>
+            <a:r>
+              <a:rPr lang="de-DE" dirty="0" smtClean="0"/>
+              <a:t>Z</a:t>
+            </a:r>
+            <a:endParaRPr lang="en-US" dirty="0"/>
+          </a:p>
+        </p:txBody>
+      </p:sp>
+      <p:sp>
+        <p:nvSpPr>
+          <p:cNvPr id="25" name="TextBox 24"/>
+          <p:cNvSpPr txBox="1"/>
+          <p:nvPr/>
+        </p:nvSpPr>
+        <p:spPr>
+          <a:xfrm>
+            <a:off x="7277007" y="2576837"/>
+            <a:ext cx="304892" cy="369332"/>
+          </a:xfrm>
+          <a:prstGeom prst="rect">
+            <a:avLst/>
+          </a:prstGeom>
+          <a:noFill/>
+        </p:spPr>
+        <p:txBody>
+          <a:bodyPr wrap="none" rtlCol="0">
+            <a:spAutoFit/>
+          </a:bodyPr>
+          <a:lstStyle/>
+          <a:p>
+            <a:r>
+              <a:rPr lang="de-DE" dirty="0"/>
+              <a:t>X</a:t>
+            </a:r>
+            <a:endParaRPr lang="en-US" dirty="0"/>
+          </a:p>
+        </p:txBody>
+      </p:sp>
+      <p:sp>
+        <p:nvSpPr>
+          <p:cNvPr id="33" name="TextBox 32"/>
+          <p:cNvSpPr txBox="1"/>
+          <p:nvPr/>
+        </p:nvSpPr>
+        <p:spPr>
+          <a:xfrm>
+            <a:off x="7582530" y="4248628"/>
+            <a:ext cx="394660" cy="369332"/>
+          </a:xfrm>
+          <a:prstGeom prst="rect">
+            <a:avLst/>
+          </a:prstGeom>
+          <a:noFill/>
+        </p:spPr>
+        <p:txBody>
+          <a:bodyPr wrap="none" rtlCol="0">
+            <a:spAutoFit/>
+          </a:bodyPr>
+          <a:lstStyle/>
+          <a:p>
+            <a:r>
+              <a:rPr lang="el-GR" dirty="0" smtClean="0"/>
+              <a:t>α</a:t>
+            </a:r>
+            <a:r>
+              <a:rPr lang="de-DE" baseline="-25000" dirty="0" smtClean="0"/>
+              <a:t>3</a:t>
+            </a:r>
+            <a:endParaRPr lang="en-US" baseline="-25000" dirty="0"/>
+          </a:p>
+        </p:txBody>
+      </p:sp>
+      <p:sp>
+        <p:nvSpPr>
+          <p:cNvPr id="26" name="TextBox 25"/>
+          <p:cNvSpPr txBox="1"/>
+          <p:nvPr/>
+        </p:nvSpPr>
+        <p:spPr>
+          <a:xfrm>
+            <a:off x="8907376" y="4019082"/>
+            <a:ext cx="349776" cy="369332"/>
+          </a:xfrm>
+          <a:prstGeom prst="rect">
+            <a:avLst/>
+          </a:prstGeom>
+          <a:noFill/>
+        </p:spPr>
+        <p:txBody>
+          <a:bodyPr wrap="none" rtlCol="0">
+            <a:spAutoFit/>
+          </a:bodyPr>
+          <a:lstStyle/>
+          <a:p>
+            <a:r>
+              <a:rPr lang="de-DE" dirty="0" smtClean="0"/>
+              <a:t>w</a:t>
+            </a:r>
+            <a:endParaRPr lang="en-US" baseline="-25000" dirty="0"/>
+          </a:p>
+        </p:txBody>
+      </p:sp>
+    </p:spTree>
+    <p:extLst>
+      <p:ext uri="{BB962C8B-B14F-4D97-AF65-F5344CB8AC3E}">
+        <p14:creationId xmlns:p14="http://schemas.microsoft.com/office/powerpoint/2010/main" val="1316100670"/>
+      </p:ext>
+    </p:extLst>
+  </p:cSld>
+  <p:clrMapOvr>
+    <a:masterClrMapping/>
+  </p:clrMapOvr>
+</p:sld>
+</file>
+
+<file path=ppt/slides/slide11.xml><?xml version="1.0" encoding="utf-8"?>
 <p:sld xmlns:a="http://schemas.openxmlformats.org/drawingml/2006/main" xmlns:r="http://schemas.openxmlformats.org/officeDocument/2006/relationships" xmlns:p="http://schemas.openxmlformats.org/presentationml/2006/main">
   <p:cSld>
     <p:spTree>
@@ -9373,14 +9918,507 @@
       </p:grpSpPr>
       <p:sp>
         <p:nvSpPr>
-          <p:cNvPr id="4" name="TextBox 3"/>
+          <p:cNvPr id="4" name="Isosceles Triangle 3"/>
+          <p:cNvSpPr/>
+          <p:nvPr/>
+        </p:nvSpPr>
+        <p:spPr>
+          <a:xfrm>
+            <a:off x="6191794" y="975361"/>
+            <a:ext cx="4545874" cy="1654628"/>
+          </a:xfrm>
+          <a:custGeom>
+            <a:avLst/>
+            <a:gdLst>
+              <a:gd name="connsiteX0" fmla="*/ 0 w 4545874"/>
+              <a:gd name="connsiteY0" fmla="*/ 1759131 h 1759131"/>
+              <a:gd name="connsiteX1" fmla="*/ 2272937 w 4545874"/>
+              <a:gd name="connsiteY1" fmla="*/ 0 h 1759131"/>
+              <a:gd name="connsiteX2" fmla="*/ 4545874 w 4545874"/>
+              <a:gd name="connsiteY2" fmla="*/ 1759131 h 1759131"/>
+              <a:gd name="connsiteX3" fmla="*/ 0 w 4545874"/>
+              <a:gd name="connsiteY3" fmla="*/ 1759131 h 1759131"/>
+              <a:gd name="connsiteX0" fmla="*/ 0 w 4545874"/>
+              <a:gd name="connsiteY0" fmla="*/ 1654628 h 1654628"/>
+              <a:gd name="connsiteX1" fmla="*/ 1306286 w 4545874"/>
+              <a:gd name="connsiteY1" fmla="*/ 0 h 1654628"/>
+              <a:gd name="connsiteX2" fmla="*/ 4545874 w 4545874"/>
+              <a:gd name="connsiteY2" fmla="*/ 1654628 h 1654628"/>
+              <a:gd name="connsiteX3" fmla="*/ 0 w 4545874"/>
+              <a:gd name="connsiteY3" fmla="*/ 1654628 h 1654628"/>
+            </a:gdLst>
+            <a:ahLst/>
+            <a:cxnLst>
+              <a:cxn ang="0">
+                <a:pos x="connsiteX0" y="connsiteY0"/>
+              </a:cxn>
+              <a:cxn ang="0">
+                <a:pos x="connsiteX1" y="connsiteY1"/>
+              </a:cxn>
+              <a:cxn ang="0">
+                <a:pos x="connsiteX2" y="connsiteY2"/>
+              </a:cxn>
+              <a:cxn ang="0">
+                <a:pos x="connsiteX3" y="connsiteY3"/>
+              </a:cxn>
+            </a:cxnLst>
+            <a:rect l="l" t="t" r="r" b="b"/>
+            <a:pathLst>
+              <a:path w="4545874" h="1654628">
+                <a:moveTo>
+                  <a:pt x="0" y="1654628"/>
+                </a:moveTo>
+                <a:lnTo>
+                  <a:pt x="1306286" y="0"/>
+                </a:lnTo>
+                <a:lnTo>
+                  <a:pt x="4545874" y="1654628"/>
+                </a:lnTo>
+                <a:lnTo>
+                  <a:pt x="0" y="1654628"/>
+                </a:lnTo>
+                <a:close/>
+              </a:path>
+            </a:pathLst>
+          </a:custGeom>
+        </p:spPr>
+        <p:style>
+          <a:lnRef idx="2">
+            <a:schemeClr val="accent1">
+              <a:shade val="50000"/>
+            </a:schemeClr>
+          </a:lnRef>
+          <a:fillRef idx="1">
+            <a:schemeClr val="accent1"/>
+          </a:fillRef>
+          <a:effectRef idx="0">
+            <a:schemeClr val="accent1"/>
+          </a:effectRef>
+          <a:fontRef idx="minor">
+            <a:schemeClr val="lt1"/>
+          </a:fontRef>
+        </p:style>
+        <p:txBody>
+          <a:bodyPr rtlCol="0" anchor="ctr"/>
+          <a:lstStyle/>
+          <a:p>
+            <a:pPr algn="ctr"/>
+            <a:endParaRPr lang="en-US"/>
+          </a:p>
+        </p:txBody>
+      </p:sp>
+      <p:sp>
+        <p:nvSpPr>
+          <p:cNvPr id="6" name="TextBox 5"/>
           <p:cNvSpPr txBox="1"/>
           <p:nvPr/>
         </p:nvSpPr>
         <p:spPr>
           <a:xfrm>
+            <a:off x="6540137" y="1363895"/>
+            <a:ext cx="350609" cy="369332"/>
+          </a:xfrm>
+          <a:prstGeom prst="rect">
+            <a:avLst/>
+          </a:prstGeom>
+          <a:noFill/>
+        </p:spPr>
+        <p:txBody>
+          <a:bodyPr wrap="none" rtlCol="0">
+            <a:spAutoFit/>
+          </a:bodyPr>
+          <a:lstStyle/>
+          <a:p>
+            <a:r>
+              <a:rPr lang="de-DE" dirty="0" err="1" smtClean="0"/>
+              <a:t>rs</a:t>
+            </a:r>
+            <a:endParaRPr lang="en-US" dirty="0"/>
+          </a:p>
+        </p:txBody>
+      </p:sp>
+      <p:sp>
+        <p:nvSpPr>
+          <p:cNvPr id="7" name="TextBox 6"/>
+          <p:cNvSpPr txBox="1"/>
+          <p:nvPr/>
+        </p:nvSpPr>
+        <p:spPr>
+          <a:xfrm>
+            <a:off x="8769531" y="1193074"/>
+            <a:ext cx="341760" cy="369332"/>
+          </a:xfrm>
+          <a:prstGeom prst="rect">
+            <a:avLst/>
+          </a:prstGeom>
+          <a:noFill/>
+        </p:spPr>
+        <p:txBody>
+          <a:bodyPr wrap="none" rtlCol="0">
+            <a:spAutoFit/>
+          </a:bodyPr>
+          <a:lstStyle/>
+          <a:p>
+            <a:r>
+              <a:rPr lang="de-DE" dirty="0" err="1" smtClean="0"/>
+              <a:t>rt</a:t>
+            </a:r>
+            <a:endParaRPr lang="en-US" dirty="0"/>
+          </a:p>
+        </p:txBody>
+      </p:sp>
+      <p:cxnSp>
+        <p:nvCxnSpPr>
+          <p:cNvPr id="10" name="Straight Connector 9"/>
+          <p:cNvCxnSpPr/>
+          <p:nvPr/>
+        </p:nvCxnSpPr>
+        <p:spPr>
+          <a:xfrm>
+            <a:off x="7493000" y="975361"/>
+            <a:ext cx="3265" cy="1654628"/>
+          </a:xfrm>
+          <a:prstGeom prst="line">
+            <a:avLst/>
+          </a:prstGeom>
+          <a:ln w="28575">
+            <a:solidFill>
+              <a:schemeClr val="tx1"/>
+            </a:solidFill>
+          </a:ln>
+        </p:spPr>
+        <p:style>
+          <a:lnRef idx="1">
+            <a:schemeClr val="accent1"/>
+          </a:lnRef>
+          <a:fillRef idx="0">
+            <a:schemeClr val="accent1"/>
+          </a:fillRef>
+          <a:effectRef idx="0">
+            <a:schemeClr val="accent1"/>
+          </a:effectRef>
+          <a:fontRef idx="minor">
+            <a:schemeClr val="tx1"/>
+          </a:fontRef>
+        </p:style>
+      </p:cxnSp>
+      <p:sp>
+        <p:nvSpPr>
+          <p:cNvPr id="15" name="TextBox 14"/>
+          <p:cNvSpPr txBox="1"/>
+          <p:nvPr/>
+        </p:nvSpPr>
+        <p:spPr>
+          <a:xfrm>
+            <a:off x="6738128" y="2260657"/>
+            <a:ext cx="396262" cy="369332"/>
+          </a:xfrm>
+          <a:prstGeom prst="rect">
+            <a:avLst/>
+          </a:prstGeom>
+          <a:noFill/>
+        </p:spPr>
+        <p:txBody>
+          <a:bodyPr wrap="none" rtlCol="0">
+            <a:spAutoFit/>
+          </a:bodyPr>
+          <a:lstStyle/>
+          <a:p>
+            <a:r>
+              <a:rPr lang="de-DE" dirty="0" err="1" smtClean="0"/>
+              <a:t>us</a:t>
+            </a:r>
+            <a:endParaRPr lang="en-US" dirty="0"/>
+          </a:p>
+        </p:txBody>
+      </p:sp>
+      <p:sp>
+        <p:nvSpPr>
+          <p:cNvPr id="16" name="TextBox 15"/>
+          <p:cNvSpPr txBox="1"/>
+          <p:nvPr/>
+        </p:nvSpPr>
+        <p:spPr>
+          <a:xfrm>
+            <a:off x="8576946" y="2260657"/>
+            <a:ext cx="383438" cy="369332"/>
+          </a:xfrm>
+          <a:prstGeom prst="rect">
+            <a:avLst/>
+          </a:prstGeom>
+          <a:noFill/>
+        </p:spPr>
+        <p:txBody>
+          <a:bodyPr wrap="none" rtlCol="0">
+            <a:spAutoFit/>
+          </a:bodyPr>
+          <a:lstStyle/>
+          <a:p>
+            <a:r>
+              <a:rPr lang="de-DE" dirty="0" err="1" smtClean="0"/>
+              <a:t>ut</a:t>
+            </a:r>
+            <a:endParaRPr lang="en-US" dirty="0"/>
+          </a:p>
+        </p:txBody>
+      </p:sp>
+      <p:sp>
+        <p:nvSpPr>
+          <p:cNvPr id="17" name="TextBox 16"/>
+          <p:cNvSpPr txBox="1"/>
+          <p:nvPr/>
+        </p:nvSpPr>
+        <p:spPr>
+          <a:xfrm>
+            <a:off x="7493000" y="1618009"/>
+            <a:ext cx="359201" cy="369332"/>
+          </a:xfrm>
+          <a:prstGeom prst="rect">
+            <a:avLst/>
+          </a:prstGeom>
+          <a:noFill/>
+        </p:spPr>
+        <p:txBody>
+          <a:bodyPr wrap="none" rtlCol="0">
+            <a:spAutoFit/>
+          </a:bodyPr>
+          <a:lstStyle/>
+          <a:p>
+            <a:r>
+              <a:rPr lang="de-DE" dirty="0" err="1" smtClean="0"/>
+              <a:t>rc</a:t>
+            </a:r>
+            <a:endParaRPr lang="en-US" dirty="0"/>
+          </a:p>
+        </p:txBody>
+      </p:sp>
+      <p:sp>
+        <p:nvSpPr>
+          <p:cNvPr id="20" name="TextBox 19"/>
+          <p:cNvSpPr txBox="1"/>
+          <p:nvPr/>
+        </p:nvSpPr>
+        <p:spPr>
+          <a:xfrm>
+            <a:off x="953114" y="1802675"/>
+            <a:ext cx="3485249" cy="4524315"/>
+          </a:xfrm>
+          <a:prstGeom prst="rect">
+            <a:avLst/>
+          </a:prstGeom>
+          <a:noFill/>
+        </p:spPr>
+        <p:txBody>
+          <a:bodyPr wrap="none" rtlCol="0">
+            <a:spAutoFit/>
+          </a:bodyPr>
+          <a:lstStyle/>
+          <a:p>
+            <a:pPr algn="ctr"/>
+            <a:r>
+              <a:rPr lang="de-DE" dirty="0" smtClean="0"/>
+              <a:t>rs</a:t>
+            </a:r>
+            <a:r>
+              <a:rPr lang="de-DE" dirty="0" smtClean="0"/>
+              <a:t>^2 </a:t>
+            </a:r>
+            <a:r>
+              <a:rPr lang="de-DE" dirty="0" smtClean="0"/>
+              <a:t>– </a:t>
+            </a:r>
+            <a:r>
+              <a:rPr lang="de-DE" dirty="0" smtClean="0"/>
+              <a:t>rs^2 </a:t>
+            </a:r>
+            <a:r>
+              <a:rPr lang="de-DE" dirty="0" smtClean="0"/>
+              <a:t>= b^2 – y^2</a:t>
+            </a:r>
+          </a:p>
+          <a:p>
+            <a:pPr algn="ctr"/>
+            <a:r>
+              <a:rPr lang="de-DE" dirty="0"/>
+              <a:t>x</a:t>
+            </a:r>
+            <a:r>
+              <a:rPr lang="de-DE" dirty="0" smtClean="0"/>
+              <a:t> + y = d</a:t>
+            </a:r>
+          </a:p>
+          <a:p>
+            <a:pPr algn="ctr"/>
+            <a:endParaRPr lang="de-DE" dirty="0"/>
+          </a:p>
+          <a:p>
+            <a:pPr algn="ctr"/>
+            <a:r>
+              <a:rPr lang="de-DE" dirty="0"/>
+              <a:t>x</a:t>
+            </a:r>
+            <a:r>
+              <a:rPr lang="de-DE" dirty="0" smtClean="0"/>
+              <a:t>^2 = a^2 </a:t>
+            </a:r>
+            <a:r>
+              <a:rPr lang="de-DE" dirty="0"/>
+              <a:t>–</a:t>
+            </a:r>
+            <a:r>
+              <a:rPr lang="de-DE" dirty="0" smtClean="0"/>
+              <a:t> b^2 + y^2</a:t>
+            </a:r>
+          </a:p>
+          <a:p>
+            <a:pPr algn="ctr"/>
+            <a:r>
+              <a:rPr lang="de-DE" dirty="0"/>
+              <a:t>y</a:t>
+            </a:r>
+            <a:r>
+              <a:rPr lang="de-DE" dirty="0" smtClean="0"/>
+              <a:t> = d - x</a:t>
+            </a:r>
+            <a:endParaRPr lang="de-DE" dirty="0"/>
+          </a:p>
+          <a:p>
+            <a:pPr algn="ctr"/>
+            <a:endParaRPr lang="de-DE" dirty="0" smtClean="0"/>
+          </a:p>
+          <a:p>
+            <a:pPr algn="ctr"/>
+            <a:r>
+              <a:rPr lang="de-DE" dirty="0"/>
+              <a:t>x^2 = a^2 – b^2 </a:t>
+            </a:r>
+            <a:r>
+              <a:rPr lang="de-DE" dirty="0" smtClean="0"/>
+              <a:t>+ (d-x)^</a:t>
+            </a:r>
+            <a:r>
+              <a:rPr lang="de-DE" dirty="0"/>
+              <a:t>2</a:t>
+            </a:r>
+          </a:p>
+          <a:p>
+            <a:pPr algn="ctr"/>
+            <a:endParaRPr lang="de-DE" dirty="0"/>
+          </a:p>
+          <a:p>
+            <a:pPr algn="ctr"/>
+            <a:r>
+              <a:rPr lang="de-DE" dirty="0"/>
+              <a:t>x^2 = a^2 – b^2 </a:t>
+            </a:r>
+            <a:r>
+              <a:rPr lang="de-DE" dirty="0" smtClean="0"/>
+              <a:t>+ (d^2 – 2dx + x^2)</a:t>
+            </a:r>
+            <a:endParaRPr lang="de-DE" dirty="0"/>
+          </a:p>
+          <a:p>
+            <a:pPr algn="ctr"/>
+            <a:endParaRPr lang="de-DE" dirty="0" smtClean="0"/>
+          </a:p>
+          <a:p>
+            <a:pPr algn="ctr"/>
+            <a:r>
+              <a:rPr lang="de-DE" dirty="0"/>
+              <a:t>x^2 = a^2 – b^2 </a:t>
+            </a:r>
+            <a:r>
+              <a:rPr lang="de-DE" dirty="0" smtClean="0"/>
+              <a:t>+ d^2 </a:t>
+            </a:r>
+            <a:r>
+              <a:rPr lang="de-DE" dirty="0"/>
+              <a:t>– </a:t>
+            </a:r>
+            <a:r>
+              <a:rPr lang="de-DE" dirty="0" smtClean="0"/>
+              <a:t>2dx </a:t>
+            </a:r>
+            <a:r>
+              <a:rPr lang="de-DE" dirty="0"/>
+              <a:t>+</a:t>
+            </a:r>
+            <a:r>
+              <a:rPr lang="de-DE" dirty="0" smtClean="0"/>
+              <a:t> x^2</a:t>
+            </a:r>
+            <a:endParaRPr lang="de-DE" dirty="0"/>
+          </a:p>
+          <a:p>
+            <a:pPr algn="ctr"/>
+            <a:endParaRPr lang="de-DE" dirty="0" smtClean="0"/>
+          </a:p>
+          <a:p>
+            <a:pPr algn="ctr"/>
+            <a:r>
+              <a:rPr lang="de-DE" dirty="0" smtClean="0"/>
+              <a:t>x </a:t>
+            </a:r>
+            <a:r>
+              <a:rPr lang="de-DE" dirty="0"/>
+              <a:t>= </a:t>
+            </a:r>
+            <a:r>
+              <a:rPr lang="de-DE" dirty="0" smtClean="0"/>
+              <a:t>(a^2 </a:t>
+            </a:r>
+            <a:r>
+              <a:rPr lang="de-DE" dirty="0"/>
+              <a:t>– b^2 + </a:t>
+            </a:r>
+            <a:r>
+              <a:rPr lang="de-DE" dirty="0" smtClean="0"/>
+              <a:t>d^2) / 2d</a:t>
+            </a:r>
+          </a:p>
+          <a:p>
+            <a:pPr algn="ctr"/>
+            <a:r>
+              <a:rPr lang="de-DE" dirty="0"/>
+              <a:t>y = (b^2 – a^2 + d^2)/</a:t>
+            </a:r>
+            <a:r>
+              <a:rPr lang="de-DE" dirty="0" smtClean="0"/>
+              <a:t>2d</a:t>
+            </a:r>
+          </a:p>
+          <a:p>
+            <a:pPr algn="ctr"/>
+            <a:endParaRPr lang="de-DE" dirty="0"/>
+          </a:p>
+          <a:p>
+            <a:pPr algn="ctr"/>
+            <a:r>
+              <a:rPr lang="de-DE" dirty="0" smtClean="0"/>
+              <a:t>h = </a:t>
+            </a:r>
+            <a:r>
+              <a:rPr lang="de-DE" dirty="0" err="1" smtClean="0"/>
+              <a:t>sqrt</a:t>
+            </a:r>
+            <a:r>
+              <a:rPr lang="de-DE" dirty="0" smtClean="0"/>
+              <a:t>(a^2 – x^2)</a:t>
+            </a:r>
+            <a:endParaRPr lang="en-US" dirty="0"/>
+          </a:p>
+        </p:txBody>
+      </p:sp>
+      <p:sp>
+        <p:nvSpPr>
+          <p:cNvPr id="2" name="TextBox 1"/>
+          <p:cNvSpPr txBox="1"/>
+          <p:nvPr/>
+        </p:nvSpPr>
+        <p:spPr>
+          <a:xfrm>
             <a:off x="1476073" y="341421"/>
-            <a:ext cx="3826449" cy="523220"/>
+            <a:ext cx="3826449" cy="954107"/>
           </a:xfrm>
           <a:prstGeom prst="rect">
             <a:avLst/>
@@ -9421,19 +10459,31 @@
             </a:r>
             <a:r>
               <a:rPr lang="de-DE" sz="2800" dirty="0" smtClean="0"/>
-              <a:t> </a:t>
+              <a:t> x </a:t>
             </a:r>
             <a:r>
               <a:rPr lang="de-DE" sz="2800" dirty="0" err="1" smtClean="0"/>
-              <a:t>elbow</a:t>
+              <a:t>and</a:t>
             </a:r>
             <a:r>
               <a:rPr lang="de-DE" sz="2800" dirty="0" smtClean="0"/>
-              <a:t> </a:t>
+              <a:t> y (Circle </a:t>
             </a:r>
             <a:r>
               <a:rPr lang="de-DE" sz="2800" dirty="0" err="1" smtClean="0"/>
-              <a:t>point</a:t>
+              <a:t>center</a:t>
+            </a:r>
+            <a:r>
+              <a:rPr lang="de-DE" sz="2800" dirty="0" smtClean="0"/>
+              <a:t>, h = </a:t>
+            </a:r>
+            <a:r>
+              <a:rPr lang="de-DE" sz="2800" dirty="0" err="1" smtClean="0"/>
+              <a:t>radius</a:t>
+            </a:r>
+            <a:r>
+              <a:rPr lang="de-DE" sz="2800" dirty="0" smtClean="0"/>
+              <a:t>)</a:t>
             </a:r>
             <a:endParaRPr lang="en-US" sz="2800" dirty="0"/>
           </a:p>
@@ -9441,26 +10491,289 @@
       </p:sp>
       <p:sp>
         <p:nvSpPr>
-          <p:cNvPr id="6" name="TextBox 5"/>
+          <p:cNvPr id="3" name="TextBox 2"/>
           <p:cNvSpPr txBox="1"/>
           <p:nvPr/>
         </p:nvSpPr>
         <p:spPr>
           <a:xfrm>
-            <a:off x="557348" y="1018904"/>
-            <a:ext cx="8107681" cy="5539978"/>
+            <a:off x="7270178" y="3087971"/>
+            <a:ext cx="1306768" cy="369332"/>
           </a:xfrm>
           <a:prstGeom prst="rect">
             <a:avLst/>
           </a:prstGeom>
           <a:noFill/>
         </p:spPr>
+        <p:txBody>
+          <a:bodyPr wrap="none" rtlCol="0">
+            <a:spAutoFit/>
+          </a:bodyPr>
+          <a:lstStyle/>
+          <a:p>
+            <a:r>
+              <a:rPr lang="de-DE" dirty="0" err="1" smtClean="0"/>
+              <a:t>circleCenter</a:t>
+            </a:r>
+            <a:endParaRPr lang="en-US" dirty="0"/>
+          </a:p>
+        </p:txBody>
+      </p:sp>
+      <p:cxnSp>
+        <p:nvCxnSpPr>
+          <p:cNvPr id="8" name="Straight Connector 7"/>
+          <p:cNvCxnSpPr/>
+          <p:nvPr/>
+        </p:nvCxnSpPr>
+        <p:spPr>
+          <a:xfrm flipH="1" flipV="1">
+            <a:off x="7493000" y="2629989"/>
+            <a:ext cx="153247" cy="489131"/>
+          </a:xfrm>
+          <a:prstGeom prst="line">
+            <a:avLst/>
+          </a:prstGeom>
+          <a:ln w="25400">
+            <a:solidFill>
+              <a:schemeClr val="tx1"/>
+            </a:solidFill>
+            <a:tailEnd type="oval" w="lg" len="lg"/>
+          </a:ln>
+        </p:spPr>
+        <p:style>
+          <a:lnRef idx="1">
+            <a:schemeClr val="accent1"/>
+          </a:lnRef>
+          <a:fillRef idx="0">
+            <a:schemeClr val="accent1"/>
+          </a:fillRef>
+          <a:effectRef idx="0">
+            <a:schemeClr val="accent1"/>
+          </a:effectRef>
+          <a:fontRef idx="minor">
+            <a:schemeClr val="tx1"/>
+          </a:fontRef>
+        </p:style>
+      </p:cxnSp>
+      <p:sp>
+        <p:nvSpPr>
+          <p:cNvPr id="5" name="TextBox 4"/>
+          <p:cNvSpPr txBox="1"/>
+          <p:nvPr/>
+        </p:nvSpPr>
+        <p:spPr>
+          <a:xfrm>
+            <a:off x="5399120" y="2629989"/>
+            <a:ext cx="1010213" cy="369332"/>
+          </a:xfrm>
+          <a:prstGeom prst="rect">
+            <a:avLst/>
+          </a:prstGeom>
+          <a:noFill/>
+        </p:spPr>
+        <p:txBody>
+          <a:bodyPr wrap="none" rtlCol="0">
+            <a:spAutoFit/>
+          </a:bodyPr>
+          <a:lstStyle/>
+          <a:p>
+            <a:r>
+              <a:rPr lang="de-DE" dirty="0" err="1" smtClean="0"/>
+              <a:t>shoulder</a:t>
+            </a:r>
+            <a:endParaRPr lang="en-US" dirty="0"/>
+          </a:p>
+        </p:txBody>
+      </p:sp>
+      <p:sp>
+        <p:nvSpPr>
+          <p:cNvPr id="14" name="TextBox 13"/>
+          <p:cNvSpPr txBox="1"/>
+          <p:nvPr/>
+        </p:nvSpPr>
+        <p:spPr>
+          <a:xfrm>
+            <a:off x="10467972" y="2629989"/>
+            <a:ext cx="534185" cy="369332"/>
+          </a:xfrm>
+          <a:prstGeom prst="rect">
+            <a:avLst/>
+          </a:prstGeom>
+          <a:noFill/>
+        </p:spPr>
+        <p:txBody>
+          <a:bodyPr wrap="none" rtlCol="0">
+            <a:spAutoFit/>
+          </a:bodyPr>
+          <a:lstStyle/>
+          <a:p>
+            <a:r>
+              <a:rPr lang="de-DE" dirty="0" smtClean="0"/>
+              <a:t>TCP</a:t>
+            </a:r>
+            <a:endParaRPr lang="en-US" dirty="0"/>
+          </a:p>
+        </p:txBody>
+      </p:sp>
+      <p:cxnSp>
+        <p:nvCxnSpPr>
+          <p:cNvPr id="18" name="Straight Connector 17"/>
+          <p:cNvCxnSpPr>
+            <a:stCxn id="4" idx="0"/>
+          </p:cNvCxnSpPr>
+          <p:nvPr/>
+        </p:nvCxnSpPr>
+        <p:spPr>
+          <a:xfrm>
+            <a:off x="6191794" y="2629989"/>
+            <a:ext cx="4564732" cy="18274"/>
+          </a:xfrm>
+          <a:prstGeom prst="line">
+            <a:avLst/>
+          </a:prstGeom>
+          <a:ln w="57150">
+            <a:solidFill>
+              <a:schemeClr val="accent4">
+                <a:lumMod val="75000"/>
+              </a:schemeClr>
+            </a:solidFill>
+          </a:ln>
+        </p:spPr>
+        <p:style>
+          <a:lnRef idx="1">
+            <a:schemeClr val="accent1"/>
+          </a:lnRef>
+          <a:fillRef idx="0">
+            <a:schemeClr val="accent1"/>
+          </a:fillRef>
+          <a:effectRef idx="0">
+            <a:schemeClr val="accent1"/>
+          </a:effectRef>
+          <a:fontRef idx="minor">
+            <a:schemeClr val="tx1"/>
+          </a:fontRef>
+        </p:style>
+      </p:cxnSp>
+    </p:spTree>
+    <p:extLst>
+      <p:ext uri="{BB962C8B-B14F-4D97-AF65-F5344CB8AC3E}">
+        <p14:creationId xmlns:p14="http://schemas.microsoft.com/office/powerpoint/2010/main" val="1412471349"/>
+      </p:ext>
+    </p:extLst>
+  </p:cSld>
+  <p:clrMapOvr>
+    <a:masterClrMapping/>
+  </p:clrMapOvr>
+</p:sld>
+</file>
+
+<file path=ppt/slides/slide6.xml><?xml version="1.0" encoding="utf-8"?>
+<p:sld xmlns:a="http://schemas.openxmlformats.org/drawingml/2006/main" xmlns:r="http://schemas.openxmlformats.org/officeDocument/2006/relationships" xmlns:p="http://schemas.openxmlformats.org/presentationml/2006/main">
+  <p:cSld>
+    <p:spTree>
+      <p:nvGrpSpPr>
+        <p:cNvPr id="1" name=""/>
+        <p:cNvGrpSpPr/>
+        <p:nvPr/>
+      </p:nvGrpSpPr>
+      <p:grpSpPr>
+        <a:xfrm>
+          <a:off x="0" y="0"/>
+          <a:ext cx="0" cy="0"/>
+          <a:chOff x="0" y="0"/>
+          <a:chExt cx="0" cy="0"/>
+        </a:xfrm>
+      </p:grpSpPr>
+      <p:sp>
+        <p:nvSpPr>
+          <p:cNvPr id="4" name="TextBox 3"/>
+          <p:cNvSpPr txBox="1"/>
+          <p:nvPr/>
+        </p:nvSpPr>
+        <p:spPr>
+          <a:xfrm>
+            <a:off x="1476073" y="341421"/>
+            <a:ext cx="3826449" cy="523220"/>
+          </a:xfrm>
+          <a:prstGeom prst="rect">
+            <a:avLst/>
+          </a:prstGeom>
+        </p:spPr>
+        <p:style>
+          <a:lnRef idx="2">
+            <a:schemeClr val="accent1"/>
+          </a:lnRef>
+          <a:fillRef idx="1">
+            <a:schemeClr val="lt1"/>
+          </a:fillRef>
+          <a:effectRef idx="0">
+            <a:schemeClr val="accent1"/>
+          </a:effectRef>
+          <a:fontRef idx="minor">
+            <a:schemeClr val="dk1"/>
+          </a:fontRef>
+        </p:style>
         <p:txBody>
           <a:bodyPr wrap="square" rtlCol="0">
             <a:spAutoFit/>
           </a:bodyPr>
           <a:lstStyle/>
           <a:p>
+            <a:pPr algn="ctr"/>
+            <a:r>
+              <a:rPr lang="de-DE" sz="2800" dirty="0" err="1" smtClean="0"/>
+              <a:t>Calulation</a:t>
+            </a:r>
+            <a:r>
+              <a:rPr lang="de-DE" sz="2800" dirty="0" smtClean="0"/>
+              <a:t> </a:t>
+            </a:r>
+            <a:r>
+              <a:rPr lang="de-DE" sz="2800" dirty="0" err="1" smtClean="0"/>
+              <a:t>of</a:t>
+            </a:r>
+            <a:r>
+              <a:rPr lang="de-DE" sz="2800" dirty="0" smtClean="0"/>
+              <a:t> </a:t>
+            </a:r>
+            <a:r>
+              <a:rPr lang="de-DE" sz="2800" dirty="0" err="1" smtClean="0"/>
+              <a:t>elbow</a:t>
+            </a:r>
+            <a:r>
+              <a:rPr lang="de-DE" sz="2800" dirty="0" smtClean="0"/>
+              <a:t> </a:t>
+            </a:r>
+            <a:r>
+              <a:rPr lang="de-DE" sz="2800" dirty="0" err="1" smtClean="0"/>
+              <a:t>point</a:t>
+            </a:r>
+            <a:endParaRPr lang="en-US" sz="2800" dirty="0"/>
+          </a:p>
+        </p:txBody>
+      </p:sp>
+      <p:sp>
+        <p:nvSpPr>
+          <p:cNvPr id="6" name="TextBox 5"/>
+          <p:cNvSpPr txBox="1"/>
+          <p:nvPr/>
+        </p:nvSpPr>
+        <p:spPr>
+          <a:xfrm>
+            <a:off x="557348" y="1018904"/>
+            <a:ext cx="8107681" cy="5539978"/>
+          </a:xfrm>
+          <a:prstGeom prst="rect">
+            <a:avLst/>
+          </a:prstGeom>
+          <a:noFill/>
+        </p:spPr>
+        <p:txBody>
+          <a:bodyPr wrap="square" rtlCol="0">
+            <a:spAutoFit/>
+          </a:bodyPr>
+          <a:lstStyle/>
+          <a:p>
             <a:r>
               <a:rPr lang="de-DE" dirty="0"/>
               <a:t>n</a:t>
@@ -9555,11 +10868,7 @@
             </a:r>
             <a:r>
               <a:rPr lang="de-DE" dirty="0" smtClean="0"/>
-              <a:t> </a:t>
-            </a:r>
-            <a:r>
-              <a:rPr lang="de-DE" dirty="0" smtClean="0"/>
-              <a:t>* x + </a:t>
+              <a:t> * x + </a:t>
             </a:r>
             <a:r>
               <a:rPr lang="de-DE" dirty="0" err="1" smtClean="0"/>
@@ -9587,11 +10896,7 @@
             </a:r>
             <a:r>
               <a:rPr lang="de-DE" dirty="0" smtClean="0"/>
-              <a:t> * z = </a:t>
-            </a:r>
-            <a:r>
-              <a:rPr lang="de-DE" dirty="0" smtClean="0"/>
-              <a:t>d    (</a:t>
+              <a:t> * z = d    (</a:t>
             </a:r>
             <a:r>
               <a:rPr lang="de-DE" dirty="0" err="1" smtClean="0"/>
@@ -9601,7 +10906,6 @@
               <a:rPr lang="de-DE" dirty="0" smtClean="0"/>
               <a:t>)</a:t>
             </a:r>
-            <a:endParaRPr lang="de-DE" dirty="0" smtClean="0"/>
           </a:p>
           <a:p>
             <a:r>
@@ -9638,11 +10942,7 @@
             </a:r>
             <a:r>
               <a:rPr lang="de-DE" dirty="0" smtClean="0"/>
-              <a:t>)^2 = </a:t>
-            </a:r>
-            <a:r>
-              <a:rPr lang="de-DE" dirty="0" smtClean="0"/>
-              <a:t>r^2  (Kugelgleichung)</a:t>
+              <a:t>)^2 = r^2  (Kugelgleichung)</a:t>
             </a:r>
           </a:p>
           <a:p>
@@ -10360,7 +11660,7 @@
 </p:sld>
 </file>
 
-<file path=ppt/slides/slide6.xml><?xml version="1.0" encoding="utf-8"?>
+<file path=ppt/slides/slide7.xml><?xml version="1.0" encoding="utf-8"?>
 <p:sld xmlns:a="http://schemas.openxmlformats.org/drawingml/2006/main" xmlns:r="http://schemas.openxmlformats.org/officeDocument/2006/relationships" xmlns:p="http://schemas.openxmlformats.org/presentationml/2006/main">
   <p:cSld>
     <p:spTree>
@@ -10921,7 +12221,7 @@
 </p:sld>
 </file>
 
-<file path=ppt/slides/slide7.xml><?xml version="1.0" encoding="utf-8"?>
+<file path=ppt/slides/slide8.xml><?xml version="1.0" encoding="utf-8"?>
 <p:sld xmlns:a="http://schemas.openxmlformats.org/drawingml/2006/main" xmlns:r="http://schemas.openxmlformats.org/officeDocument/2006/relationships" xmlns:p="http://schemas.openxmlformats.org/presentationml/2006/main">
   <p:cSld>
     <p:spTree>
@@ -11456,120 +12756,6 @@
 </p:sld>
 </file>
 
-<file path=ppt/slides/slide8.xml><?xml version="1.0" encoding="utf-8"?>
-<p:sld xmlns:a="http://schemas.openxmlformats.org/drawingml/2006/main" xmlns:r="http://schemas.openxmlformats.org/officeDocument/2006/relationships" xmlns:p="http://schemas.openxmlformats.org/presentationml/2006/main">
-  <p:cSld>
-    <p:spTree>
-      <p:nvGrpSpPr>
-        <p:cNvPr id="1" name=""/>
-        <p:cNvGrpSpPr/>
-        <p:nvPr/>
-      </p:nvGrpSpPr>
-      <p:grpSpPr>
-        <a:xfrm>
-          <a:off x="0" y="0"/>
-          <a:ext cx="0" cy="0"/>
-          <a:chOff x="0" y="0"/>
-          <a:chExt cx="0" cy="0"/>
-        </a:xfrm>
-      </p:grpSpPr>
-      <p:sp>
-        <p:nvSpPr>
-          <p:cNvPr id="2" name="Title 1"/>
-          <p:cNvSpPr>
-            <a:spLocks noGrp="1"/>
-          </p:cNvSpPr>
-          <p:nvPr>
-            <p:ph type="title"/>
-          </p:nvPr>
-        </p:nvSpPr>
-        <p:spPr/>
-        <p:txBody>
-          <a:bodyPr>
-            <a:normAutofit/>
-          </a:bodyPr>
-          <a:lstStyle/>
-          <a:p>
-            <a:r>
-              <a:rPr lang="de-DE" sz="4000" dirty="0" err="1" smtClean="0"/>
-              <a:t>angles</a:t>
-            </a:r>
-            <a:r>
-              <a:rPr lang="de-DE" sz="4000" dirty="0" smtClean="0"/>
-              <a:t>[2]</a:t>
-            </a:r>
-            <a:br>
-              <a:rPr lang="de-DE" sz="4000" dirty="0" smtClean="0"/>
-            </a:br>
-            <a:r>
-              <a:rPr lang="de-DE" sz="4000" dirty="0" err="1" smtClean="0"/>
-              <a:t>RElbowYaw</a:t>
-            </a:r>
-            <a:endParaRPr lang="en-US" sz="4000" dirty="0"/>
-          </a:p>
-        </p:txBody>
-      </p:sp>
-      <p:pic>
-        <p:nvPicPr>
-          <p:cNvPr id="4" name="Picture 3"/>
-          <p:cNvPicPr>
-            <a:picLocks noChangeAspect="1"/>
-          </p:cNvPicPr>
-          <p:nvPr/>
-        </p:nvPicPr>
-        <p:blipFill>
-          <a:blip r:embed="rId2"/>
-          <a:stretch>
-            <a:fillRect/>
-          </a:stretch>
-        </p:blipFill>
-        <p:spPr>
-          <a:xfrm>
-            <a:off x="5516463" y="365125"/>
-            <a:ext cx="5837337" cy="5829057"/>
-          </a:xfrm>
-          <a:prstGeom prst="rect">
-            <a:avLst/>
-          </a:prstGeom>
-        </p:spPr>
-      </p:pic>
-      <p:pic>
-        <p:nvPicPr>
-          <p:cNvPr id="5" name="Picture 4"/>
-          <p:cNvPicPr>
-            <a:picLocks noChangeAspect="1"/>
-          </p:cNvPicPr>
-          <p:nvPr/>
-        </p:nvPicPr>
-        <p:blipFill>
-          <a:blip r:embed="rId3"/>
-          <a:stretch>
-            <a:fillRect/>
-          </a:stretch>
-        </p:blipFill>
-        <p:spPr>
-          <a:xfrm>
-            <a:off x="191589" y="2324314"/>
-            <a:ext cx="5180569" cy="3094805"/>
-          </a:xfrm>
-          <a:prstGeom prst="rect">
-            <a:avLst/>
-          </a:prstGeom>
-        </p:spPr>
-      </p:pic>
-    </p:spTree>
-    <p:extLst>
-      <p:ext uri="{BB962C8B-B14F-4D97-AF65-F5344CB8AC3E}">
-        <p14:creationId xmlns:p14="http://schemas.microsoft.com/office/powerpoint/2010/main" val="782327868"/>
-      </p:ext>
-    </p:extLst>
-  </p:cSld>
-  <p:clrMapOvr>
-    <a:masterClrMapping/>
-  </p:clrMapOvr>
-</p:sld>
-</file>
-
 <file path=ppt/slides/slide9.xml><?xml version="1.0" encoding="utf-8"?>
 <p:sld xmlns:a="http://schemas.openxmlformats.org/drawingml/2006/main" xmlns:r="http://schemas.openxmlformats.org/officeDocument/2006/relationships" xmlns:p="http://schemas.openxmlformats.org/presentationml/2006/main">
   <p:cSld>
@@ -11587,9 +12773,45 @@
           <a:chExt cx="0" cy="0"/>
         </a:xfrm>
       </p:grpSpPr>
+      <p:sp>
+        <p:nvSpPr>
+          <p:cNvPr id="2" name="Title 1"/>
+          <p:cNvSpPr>
+            <a:spLocks noGrp="1"/>
+          </p:cNvSpPr>
+          <p:nvPr>
+            <p:ph type="title"/>
+          </p:nvPr>
+        </p:nvSpPr>
+        <p:spPr/>
+        <p:txBody>
+          <a:bodyPr>
+            <a:normAutofit/>
+          </a:bodyPr>
+          <a:lstStyle/>
+          <a:p>
+            <a:r>
+              <a:rPr lang="de-DE" sz="4000" dirty="0" err="1" smtClean="0"/>
+              <a:t>angles</a:t>
+            </a:r>
+            <a:r>
+              <a:rPr lang="de-DE" sz="4000" dirty="0" smtClean="0"/>
+              <a:t>[2]</a:t>
+            </a:r>
+            <a:br>
+              <a:rPr lang="de-DE" sz="4000" dirty="0" smtClean="0"/>
+            </a:br>
+            <a:r>
+              <a:rPr lang="de-DE" sz="4000" dirty="0" err="1" smtClean="0"/>
+              <a:t>RElbowYaw</a:t>
+            </a:r>
+            <a:endParaRPr lang="en-US" sz="4000" dirty="0"/>
+          </a:p>
+        </p:txBody>
+      </p:sp>
       <p:pic>
         <p:nvPicPr>
-          <p:cNvPr id="3" name="Picture 2"/>
+          <p:cNvPr id="4" name="Picture 3"/>
           <p:cNvPicPr>
             <a:picLocks noChangeAspect="1"/>
           </p:cNvPicPr>
@@ -11603,508 +12825,42 @@
         </p:blipFill>
         <p:spPr>
           <a:xfrm>
-            <a:off x="4711382" y="298185"/>
-            <a:ext cx="7077075" cy="6162675"/>
+            <a:off x="5516463" y="365125"/>
+            <a:ext cx="5837337" cy="5829057"/>
           </a:xfrm>
           <a:prstGeom prst="rect">
             <a:avLst/>
           </a:prstGeom>
         </p:spPr>
       </p:pic>
-      <p:sp>
-        <p:nvSpPr>
-          <p:cNvPr id="2" name="Title 1"/>
-          <p:cNvSpPr>
-            <a:spLocks noGrp="1"/>
-          </p:cNvSpPr>
-          <p:nvPr>
-            <p:ph type="title"/>
-          </p:nvPr>
-        </p:nvSpPr>
-        <p:spPr/>
-        <p:txBody>
-          <a:bodyPr>
-            <a:normAutofit/>
-          </a:bodyPr>
-          <a:lstStyle/>
-          <a:p>
-            <a:r>
-              <a:rPr lang="de-DE" sz="4000" dirty="0" err="1"/>
-              <a:t>angles</a:t>
-            </a:r>
-            <a:r>
-              <a:rPr lang="de-DE" sz="4000" dirty="0"/>
-              <a:t>[3]</a:t>
-            </a:r>
-            <a:br>
-              <a:rPr lang="de-DE" sz="4000" dirty="0"/>
-            </a:br>
-            <a:r>
-              <a:rPr lang="de-DE" sz="4000" dirty="0" err="1"/>
-              <a:t>RElbowRoll</a:t>
-            </a:r>
-            <a:endParaRPr lang="en-US" sz="4000" dirty="0"/>
-          </a:p>
-        </p:txBody>
-      </p:sp>
-      <p:sp>
-        <p:nvSpPr>
-          <p:cNvPr id="9" name="Freeform 8"/>
-          <p:cNvSpPr/>
-          <p:nvPr/>
-        </p:nvSpPr>
-        <p:spPr>
-          <a:xfrm>
-            <a:off x="7702547" y="4272124"/>
-            <a:ext cx="422656" cy="481330"/>
-          </a:xfrm>
-          <a:custGeom>
-            <a:avLst/>
-            <a:gdLst>
-              <a:gd name="connsiteX0" fmla="*/ 0 w 177800"/>
-              <a:gd name="connsiteY0" fmla="*/ 7088 h 80748"/>
-              <a:gd name="connsiteX1" fmla="*/ 76200 w 177800"/>
-              <a:gd name="connsiteY1" fmla="*/ 7088 h 80748"/>
-              <a:gd name="connsiteX2" fmla="*/ 177800 w 177800"/>
-              <a:gd name="connsiteY2" fmla="*/ 80748 h 80748"/>
-              <a:gd name="connsiteX0" fmla="*/ 0 w 177800"/>
-              <a:gd name="connsiteY0" fmla="*/ 0 h 73660"/>
-              <a:gd name="connsiteX1" fmla="*/ 177800 w 177800"/>
-              <a:gd name="connsiteY1" fmla="*/ 73660 h 73660"/>
-              <a:gd name="connsiteX0" fmla="*/ 0 w 177800"/>
-              <a:gd name="connsiteY0" fmla="*/ 1331 h 74991"/>
-              <a:gd name="connsiteX1" fmla="*/ 177800 w 177800"/>
-              <a:gd name="connsiteY1" fmla="*/ 74991 h 74991"/>
-              <a:gd name="connsiteX0" fmla="*/ 0 w 177800"/>
-              <a:gd name="connsiteY0" fmla="*/ 1851 h 75511"/>
-              <a:gd name="connsiteX1" fmla="*/ 177800 w 177800"/>
-              <a:gd name="connsiteY1" fmla="*/ 75511 h 75511"/>
-              <a:gd name="connsiteX0" fmla="*/ 31384 w 68335"/>
-              <a:gd name="connsiteY0" fmla="*/ 455 h 226515"/>
-              <a:gd name="connsiteX1" fmla="*/ 3444 w 68335"/>
-              <a:gd name="connsiteY1" fmla="*/ 226515 h 226515"/>
-              <a:gd name="connsiteX0" fmla="*/ 270708 w 288897"/>
-              <a:gd name="connsiteY0" fmla="*/ 570 h 185990"/>
-              <a:gd name="connsiteX1" fmla="*/ 1468 w 288897"/>
-              <a:gd name="connsiteY1" fmla="*/ 185990 h 185990"/>
-              <a:gd name="connsiteX0" fmla="*/ 270800 w 282446"/>
-              <a:gd name="connsiteY0" fmla="*/ 0 h 185420"/>
-              <a:gd name="connsiteX1" fmla="*/ 1560 w 282446"/>
-              <a:gd name="connsiteY1" fmla="*/ 185420 h 185420"/>
-              <a:gd name="connsiteX0" fmla="*/ 269240 w 285877"/>
-              <a:gd name="connsiteY0" fmla="*/ 0 h 209999"/>
-              <a:gd name="connsiteX1" fmla="*/ 0 w 285877"/>
-              <a:gd name="connsiteY1" fmla="*/ 185420 h 209999"/>
-              <a:gd name="connsiteX0" fmla="*/ 299720 w 314870"/>
-              <a:gd name="connsiteY0" fmla="*/ 0 h 196161"/>
-              <a:gd name="connsiteX1" fmla="*/ 0 w 314870"/>
-              <a:gd name="connsiteY1" fmla="*/ 170180 h 196161"/>
-              <a:gd name="connsiteX0" fmla="*/ 299720 w 318396"/>
-              <a:gd name="connsiteY0" fmla="*/ 0 h 170668"/>
-              <a:gd name="connsiteX1" fmla="*/ 0 w 318396"/>
-              <a:gd name="connsiteY1" fmla="*/ 170180 h 170668"/>
-              <a:gd name="connsiteX0" fmla="*/ 299720 w 299720"/>
-              <a:gd name="connsiteY0" fmla="*/ 0 h 170869"/>
-              <a:gd name="connsiteX1" fmla="*/ 0 w 299720"/>
-              <a:gd name="connsiteY1" fmla="*/ 170180 h 170869"/>
-              <a:gd name="connsiteX0" fmla="*/ 427736 w 427736"/>
-              <a:gd name="connsiteY0" fmla="*/ 122428 h 152138"/>
-              <a:gd name="connsiteX1" fmla="*/ 0 w 427736"/>
-              <a:gd name="connsiteY1" fmla="*/ 0 h 152138"/>
-              <a:gd name="connsiteX0" fmla="*/ 220472 w 220472"/>
-              <a:gd name="connsiteY0" fmla="*/ 134620 h 163165"/>
-              <a:gd name="connsiteX1" fmla="*/ 0 w 220472"/>
-              <a:gd name="connsiteY1" fmla="*/ 0 h 163165"/>
-              <a:gd name="connsiteX0" fmla="*/ 220472 w 220472"/>
-              <a:gd name="connsiteY0" fmla="*/ 134620 h 134620"/>
-              <a:gd name="connsiteX1" fmla="*/ 0 w 220472"/>
-              <a:gd name="connsiteY1" fmla="*/ 0 h 134620"/>
-              <a:gd name="connsiteX0" fmla="*/ 247142 w 247142"/>
-              <a:gd name="connsiteY0" fmla="*/ 22318 h 22318"/>
-              <a:gd name="connsiteX1" fmla="*/ 0 w 247142"/>
-              <a:gd name="connsiteY1" fmla="*/ 21048 h 22318"/>
-              <a:gd name="connsiteX0" fmla="*/ 247142 w 247142"/>
-              <a:gd name="connsiteY0" fmla="*/ 38978 h 38978"/>
-              <a:gd name="connsiteX1" fmla="*/ 0 w 247142"/>
-              <a:gd name="connsiteY1" fmla="*/ 37708 h 38978"/>
-              <a:gd name="connsiteX0" fmla="*/ 273812 w 273812"/>
-              <a:gd name="connsiteY0" fmla="*/ 40903 h 40903"/>
-              <a:gd name="connsiteX1" fmla="*/ 0 w 273812"/>
-              <a:gd name="connsiteY1" fmla="*/ 35823 h 40903"/>
-              <a:gd name="connsiteX0" fmla="*/ 273812 w 273812"/>
-              <a:gd name="connsiteY0" fmla="*/ 40903 h 40903"/>
-              <a:gd name="connsiteX1" fmla="*/ 0 w 273812"/>
-              <a:gd name="connsiteY1" fmla="*/ 35823 h 40903"/>
-              <a:gd name="connsiteX0" fmla="*/ 261620 w 261620"/>
-              <a:gd name="connsiteY0" fmla="*/ 267229 h 267229"/>
-              <a:gd name="connsiteX1" fmla="*/ 0 w 261620"/>
-              <a:gd name="connsiteY1" fmla="*/ 6117 h 267229"/>
-              <a:gd name="connsiteX0" fmla="*/ 9669 w 373549"/>
-              <a:gd name="connsiteY0" fmla="*/ 526462 h 526462"/>
-              <a:gd name="connsiteX1" fmla="*/ 363745 w 373549"/>
-              <a:gd name="connsiteY1" fmla="*/ 3222 h 526462"/>
-              <a:gd name="connsiteX0" fmla="*/ 8650 w 440077"/>
-              <a:gd name="connsiteY0" fmla="*/ 484815 h 484815"/>
-              <a:gd name="connsiteX1" fmla="*/ 431306 w 440077"/>
-              <a:gd name="connsiteY1" fmla="*/ 3485 h 484815"/>
-              <a:gd name="connsiteX0" fmla="*/ 0 w 438613"/>
-              <a:gd name="connsiteY0" fmla="*/ 484293 h 486109"/>
-              <a:gd name="connsiteX1" fmla="*/ 422656 w 438613"/>
-              <a:gd name="connsiteY1" fmla="*/ 2963 h 486109"/>
-              <a:gd name="connsiteX0" fmla="*/ 0 w 422656"/>
-              <a:gd name="connsiteY0" fmla="*/ 481330 h 484115"/>
-              <a:gd name="connsiteX1" fmla="*/ 422656 w 422656"/>
-              <a:gd name="connsiteY1" fmla="*/ 0 h 484115"/>
-              <a:gd name="connsiteX0" fmla="*/ 0 w 422656"/>
-              <a:gd name="connsiteY0" fmla="*/ 481330 h 481330"/>
-              <a:gd name="connsiteX1" fmla="*/ 422656 w 422656"/>
-              <a:gd name="connsiteY1" fmla="*/ 0 h 481330"/>
-            </a:gdLst>
-            <a:ahLst/>
-            <a:cxnLst>
-              <a:cxn ang="0">
-                <a:pos x="connsiteX0" y="connsiteY0"/>
-              </a:cxn>
-              <a:cxn ang="0">
-                <a:pos x="connsiteX1" y="connsiteY1"/>
-              </a:cxn>
-            </a:cxnLst>
-            <a:rect l="l" t="t" r="r" b="b"/>
-            <a:pathLst>
-              <a:path w="422656" h="481330">
-                <a:moveTo>
-                  <a:pt x="0" y="481330"/>
-                </a:moveTo>
-                <a:cubicBezTo>
-                  <a:pt x="252307" y="422063"/>
-                  <a:pt x="418634" y="160867"/>
-                  <a:pt x="422656" y="0"/>
-                </a:cubicBezTo>
-              </a:path>
-            </a:pathLst>
-          </a:custGeom>
-          <a:noFill/>
-          <a:ln>
-            <a:solidFill>
-              <a:schemeClr val="tx1"/>
-            </a:solidFill>
-          </a:ln>
-        </p:spPr>
-        <p:style>
-          <a:lnRef idx="2">
-            <a:schemeClr val="accent1">
-              <a:shade val="50000"/>
-            </a:schemeClr>
-          </a:lnRef>
-          <a:fillRef idx="1">
-            <a:schemeClr val="accent1"/>
-          </a:fillRef>
-          <a:effectRef idx="0">
-            <a:schemeClr val="accent1"/>
-          </a:effectRef>
-          <a:fontRef idx="minor">
-            <a:schemeClr val="lt1"/>
-          </a:fontRef>
-        </p:style>
-        <p:txBody>
-          <a:bodyPr rtlCol="0" anchor="ctr"/>
-          <a:lstStyle/>
-          <a:p>
-            <a:pPr algn="ctr"/>
-            <a:endParaRPr lang="en-US"/>
-          </a:p>
-        </p:txBody>
-      </p:sp>
-      <p:sp>
-        <p:nvSpPr>
-          <p:cNvPr id="11" name="TextBox 10"/>
-          <p:cNvSpPr txBox="1"/>
-          <p:nvPr/>
-        </p:nvSpPr>
-        <p:spPr>
-          <a:xfrm>
-            <a:off x="10012680" y="4074828"/>
-            <a:ext cx="534185" cy="369332"/>
+      <p:pic>
+        <p:nvPicPr>
+          <p:cNvPr id="5" name="Picture 4"/>
+          <p:cNvPicPr>
+            <a:picLocks noChangeAspect="1"/>
+          </p:cNvPicPr>
+          <p:nvPr/>
+        </p:nvPicPr>
+        <p:blipFill>
+          <a:blip r:embed="rId3"/>
+          <a:stretch>
+            <a:fillRect/>
+          </a:stretch>
+        </p:blipFill>
+        <p:spPr>
+          <a:xfrm>
+            <a:off x="191589" y="2324314"/>
+            <a:ext cx="5180569" cy="3094805"/>
           </a:xfrm>
           <a:prstGeom prst="rect">
             <a:avLst/>
           </a:prstGeom>
-          <a:noFill/>
-        </p:spPr>
-        <p:txBody>
-          <a:bodyPr wrap="none" rtlCol="0">
-            <a:spAutoFit/>
-          </a:bodyPr>
-          <a:lstStyle/>
-          <a:p>
-            <a:r>
-              <a:rPr lang="de-DE" dirty="0" smtClean="0"/>
-              <a:t>TCP</a:t>
-            </a:r>
-            <a:endParaRPr lang="en-US" dirty="0"/>
-          </a:p>
-        </p:txBody>
-      </p:sp>
-      <p:sp>
-        <p:nvSpPr>
-          <p:cNvPr id="12" name="TextBox 11"/>
-          <p:cNvSpPr txBox="1"/>
-          <p:nvPr/>
-        </p:nvSpPr>
-        <p:spPr>
-          <a:xfrm>
-            <a:off x="6621625" y="4134515"/>
-            <a:ext cx="760849" cy="369332"/>
-          </a:xfrm>
-          <a:prstGeom prst="rect">
-            <a:avLst/>
-          </a:prstGeom>
-          <a:noFill/>
-        </p:spPr>
-        <p:txBody>
-          <a:bodyPr wrap="none" rtlCol="0">
-            <a:spAutoFit/>
-          </a:bodyPr>
-          <a:lstStyle/>
-          <a:p>
-            <a:r>
-              <a:rPr lang="de-DE" dirty="0" err="1" smtClean="0"/>
-              <a:t>elbow</a:t>
-            </a:r>
-            <a:endParaRPr lang="en-US" dirty="0"/>
-          </a:p>
-        </p:txBody>
-      </p:sp>
-      <p:sp>
-        <p:nvSpPr>
-          <p:cNvPr id="13" name="TextBox 12"/>
-          <p:cNvSpPr txBox="1"/>
-          <p:nvPr/>
-        </p:nvSpPr>
-        <p:spPr>
-          <a:xfrm>
-            <a:off x="8137576" y="3010191"/>
-            <a:ext cx="1306768" cy="369332"/>
-          </a:xfrm>
-          <a:prstGeom prst="rect">
-            <a:avLst/>
-          </a:prstGeom>
-          <a:noFill/>
-        </p:spPr>
-        <p:txBody>
-          <a:bodyPr wrap="none" rtlCol="0">
-            <a:spAutoFit/>
-          </a:bodyPr>
-          <a:lstStyle/>
-          <a:p>
-            <a:r>
-              <a:rPr lang="de-DE" dirty="0" err="1" smtClean="0"/>
-              <a:t>circleCenter</a:t>
-            </a:r>
-            <a:endParaRPr lang="en-US" dirty="0"/>
-          </a:p>
-        </p:txBody>
-      </p:sp>
-      <p:cxnSp>
-        <p:nvCxnSpPr>
-          <p:cNvPr id="14" name="Straight Arrow Connector 13"/>
-          <p:cNvCxnSpPr/>
-          <p:nvPr/>
-        </p:nvCxnSpPr>
-        <p:spPr>
-          <a:xfrm>
-            <a:off x="7359015" y="4185285"/>
-            <a:ext cx="680085" cy="1148715"/>
-          </a:xfrm>
-          <a:prstGeom prst="straightConnector1">
-            <a:avLst/>
-          </a:prstGeom>
-          <a:ln w="12700">
-            <a:solidFill>
-              <a:srgbClr val="FF0000"/>
-            </a:solidFill>
-            <a:tailEnd type="triangle"/>
-          </a:ln>
-        </p:spPr>
-        <p:style>
-          <a:lnRef idx="1">
-            <a:schemeClr val="accent1"/>
-          </a:lnRef>
-          <a:fillRef idx="0">
-            <a:schemeClr val="accent1"/>
-          </a:fillRef>
-          <a:effectRef idx="0">
-            <a:schemeClr val="accent1"/>
-          </a:effectRef>
-          <a:fontRef idx="minor">
-            <a:schemeClr val="tx1"/>
-          </a:fontRef>
-        </p:style>
-      </p:cxnSp>
-      <p:cxnSp>
-        <p:nvCxnSpPr>
-          <p:cNvPr id="15" name="Straight Arrow Connector 14"/>
-          <p:cNvCxnSpPr/>
-          <p:nvPr/>
-        </p:nvCxnSpPr>
-        <p:spPr>
-          <a:xfrm>
-            <a:off x="7359015" y="4185285"/>
-            <a:ext cx="2663190" cy="297180"/>
-          </a:xfrm>
-          <a:prstGeom prst="straightConnector1">
-            <a:avLst/>
-          </a:prstGeom>
-          <a:ln w="12700">
-            <a:solidFill>
-              <a:schemeClr val="tx1"/>
-            </a:solidFill>
-            <a:tailEnd type="triangle"/>
-          </a:ln>
-        </p:spPr>
-        <p:style>
-          <a:lnRef idx="1">
-            <a:schemeClr val="accent1"/>
-          </a:lnRef>
-          <a:fillRef idx="0">
-            <a:schemeClr val="accent1"/>
-          </a:fillRef>
-          <a:effectRef idx="0">
-            <a:schemeClr val="accent1"/>
-          </a:effectRef>
-          <a:fontRef idx="minor">
-            <a:schemeClr val="tx1"/>
-          </a:fontRef>
-        </p:style>
-      </p:cxnSp>
-      <p:sp>
-        <p:nvSpPr>
-          <p:cNvPr id="24" name="TextBox 23"/>
-          <p:cNvSpPr txBox="1"/>
-          <p:nvPr/>
-        </p:nvSpPr>
-        <p:spPr>
-          <a:xfrm>
-            <a:off x="6246964" y="1393343"/>
-            <a:ext cx="292068" cy="369332"/>
-          </a:xfrm>
-          <a:prstGeom prst="rect">
-            <a:avLst/>
-          </a:prstGeom>
-          <a:noFill/>
-        </p:spPr>
-        <p:txBody>
-          <a:bodyPr wrap="none" rtlCol="0">
-            <a:spAutoFit/>
-          </a:bodyPr>
-          <a:lstStyle/>
-          <a:p>
-            <a:r>
-              <a:rPr lang="de-DE" dirty="0" smtClean="0"/>
-              <a:t>Z</a:t>
-            </a:r>
-            <a:endParaRPr lang="en-US" dirty="0"/>
-          </a:p>
-        </p:txBody>
-      </p:sp>
-      <p:sp>
-        <p:nvSpPr>
-          <p:cNvPr id="25" name="TextBox 24"/>
-          <p:cNvSpPr txBox="1"/>
-          <p:nvPr/>
-        </p:nvSpPr>
-        <p:spPr>
-          <a:xfrm>
-            <a:off x="7277007" y="2576837"/>
-            <a:ext cx="304892" cy="369332"/>
-          </a:xfrm>
-          <a:prstGeom prst="rect">
-            <a:avLst/>
-          </a:prstGeom>
-          <a:noFill/>
-        </p:spPr>
-        <p:txBody>
-          <a:bodyPr wrap="none" rtlCol="0">
-            <a:spAutoFit/>
-          </a:bodyPr>
-          <a:lstStyle/>
-          <a:p>
-            <a:r>
-              <a:rPr lang="de-DE" dirty="0"/>
-              <a:t>X</a:t>
-            </a:r>
-            <a:endParaRPr lang="en-US" dirty="0"/>
-          </a:p>
-        </p:txBody>
-      </p:sp>
-      <p:sp>
-        <p:nvSpPr>
-          <p:cNvPr id="33" name="TextBox 32"/>
-          <p:cNvSpPr txBox="1"/>
-          <p:nvPr/>
-        </p:nvSpPr>
-        <p:spPr>
-          <a:xfrm>
-            <a:off x="7582530" y="4248628"/>
-            <a:ext cx="394660" cy="369332"/>
-          </a:xfrm>
-          <a:prstGeom prst="rect">
-            <a:avLst/>
-          </a:prstGeom>
-          <a:noFill/>
-        </p:spPr>
-        <p:txBody>
-          <a:bodyPr wrap="none" rtlCol="0">
-            <a:spAutoFit/>
-          </a:bodyPr>
-          <a:lstStyle/>
-          <a:p>
-            <a:r>
-              <a:rPr lang="el-GR" dirty="0" smtClean="0"/>
-              <a:t>α</a:t>
-            </a:r>
-            <a:r>
-              <a:rPr lang="de-DE" baseline="-25000" dirty="0" smtClean="0"/>
-              <a:t>3</a:t>
-            </a:r>
-            <a:endParaRPr lang="en-US" baseline="-25000" dirty="0"/>
-          </a:p>
-        </p:txBody>
-      </p:sp>
-      <p:sp>
-        <p:nvSpPr>
-          <p:cNvPr id="26" name="TextBox 25"/>
-          <p:cNvSpPr txBox="1"/>
-          <p:nvPr/>
-        </p:nvSpPr>
-        <p:spPr>
-          <a:xfrm>
-            <a:off x="8907376" y="4019082"/>
-            <a:ext cx="349776" cy="369332"/>
-          </a:xfrm>
-          <a:prstGeom prst="rect">
-            <a:avLst/>
-          </a:prstGeom>
-          <a:noFill/>
-        </p:spPr>
-        <p:txBody>
-          <a:bodyPr wrap="none" rtlCol="0">
-            <a:spAutoFit/>
-          </a:bodyPr>
-          <a:lstStyle/>
-          <a:p>
-            <a:r>
-              <a:rPr lang="de-DE" dirty="0" smtClean="0"/>
-              <a:t>w</a:t>
-            </a:r>
-            <a:endParaRPr lang="en-US" baseline="-25000" dirty="0"/>
-          </a:p>
-        </p:txBody>
-      </p:sp>
+        </p:spPr>
+      </p:pic>
     </p:spTree>
     <p:extLst>
       <p:ext uri="{BB962C8B-B14F-4D97-AF65-F5344CB8AC3E}">
-        <p14:creationId xmlns:p14="http://schemas.microsoft.com/office/powerpoint/2010/main" val="1316100670"/>
+        <p14:creationId xmlns:p14="http://schemas.microsoft.com/office/powerpoint/2010/main" val="782327868"/>
       </p:ext>
     </p:extLst>
   </p:cSld>

</xml_diff>